<commit_message>
Add board-app AbstractHandler class
</commit_message>
<xml_diff>
--- a/study-note/자바/2022-08-04 내용정리 .pptx
+++ b/study-note/자바/2022-08-04 내용정리 .pptx
@@ -5,16 +5,11 @@
     <p:sldMasterId id="2147483648" r:id="rId1"/>
   </p:sldMasterIdLst>
   <p:notesMasterIdLst>
-    <p:notesMasterId r:id="rId9"/>
+    <p:notesMasterId r:id="rId4"/>
   </p:notesMasterIdLst>
   <p:sldIdLst>
     <p:sldId id="256" r:id="rId2"/>
-    <p:sldId id="273" r:id="rId3"/>
-    <p:sldId id="274" r:id="rId4"/>
-    <p:sldId id="272" r:id="rId5"/>
-    <p:sldId id="271" r:id="rId6"/>
-    <p:sldId id="275" r:id="rId7"/>
-    <p:sldId id="276" r:id="rId8"/>
+    <p:sldId id="276" r:id="rId3"/>
   </p:sldIdLst>
   <p:sldSz cx="12192000" cy="6858000"/>
   <p:notesSz cx="6858000" cy="9144000"/>
@@ -3709,7 +3704,7 @@
           <a:lstStyle/>
           <a:p>
             <a:r>
-              <a:rPr lang="en-US" altLang="ko-KR"/>
+              <a:rPr lang="en-US" altLang="ko-KR" dirty="0"/>
               <a:t>2022-08-04 </a:t>
             </a:r>
             <a:r>
@@ -3776,10 +3771,10 @@
       </p:grpSpPr>
       <p:sp>
         <p:nvSpPr>
-          <p:cNvPr id="20" name="직사각형 19">
-            <a:extLst>
-              <a:ext uri="{FF2B5EF4-FFF2-40B4-BE49-F238E27FC236}">
-                <a16:creationId xmlns:a16="http://schemas.microsoft.com/office/drawing/2014/main" id="{A5D91493-3D40-5959-F45E-27828396AB97}"/>
+          <p:cNvPr id="2" name="직사각형 1">
+            <a:extLst>
+              <a:ext uri="{FF2B5EF4-FFF2-40B4-BE49-F238E27FC236}">
+                <a16:creationId xmlns:a16="http://schemas.microsoft.com/office/drawing/2014/main" id="{01CA0D7D-5EDB-0FF9-8973-AA1A5206BCDC}"/>
               </a:ext>
             </a:extLst>
           </p:cNvPr>
@@ -3788,7 +3783,64 @@
         </p:nvSpPr>
         <p:spPr>
           <a:xfrm>
-            <a:off x="843048" y="1587209"/>
+            <a:off x="80436" y="2825503"/>
+            <a:ext cx="1324304" cy="1072055"/>
+          </a:xfrm>
+          <a:prstGeom prst="rect">
+            <a:avLst/>
+          </a:prstGeom>
+        </p:spPr>
+        <p:style>
+          <a:lnRef idx="2">
+            <a:schemeClr val="accent1">
+              <a:shade val="50000"/>
+            </a:schemeClr>
+          </a:lnRef>
+          <a:fillRef idx="1">
+            <a:schemeClr val="accent1"/>
+          </a:fillRef>
+          <a:effectRef idx="0">
+            <a:schemeClr val="accent1"/>
+          </a:effectRef>
+          <a:fontRef idx="minor">
+            <a:schemeClr val="lt1"/>
+          </a:fontRef>
+        </p:style>
+        <p:txBody>
+          <a:bodyPr rtlCol="0" anchor="ctr"/>
+          <a:lstStyle/>
+          <a:p>
+            <a:pPr algn="ctr"/>
+            <a:r>
+              <a:rPr kumimoji="1" lang="en-US" altLang="ko-Kore-KR" dirty="0"/>
+              <a:t>App</a:t>
+            </a:r>
+          </a:p>
+          <a:p>
+            <a:pPr algn="ctr"/>
+            <a:r>
+              <a:rPr kumimoji="1" lang="en-US" altLang="ko-Kore-KR" dirty="0"/>
+              <a:t>class</a:t>
+            </a:r>
+            <a:endParaRPr kumimoji="1" lang="ko-Kore-KR" altLang="en-US" dirty="0"/>
+          </a:p>
+        </p:txBody>
+      </p:sp>
+      <p:sp>
+        <p:nvSpPr>
+          <p:cNvPr id="9" name="직사각형 8">
+            <a:extLst>
+              <a:ext uri="{FF2B5EF4-FFF2-40B4-BE49-F238E27FC236}">
+                <a16:creationId xmlns:a16="http://schemas.microsoft.com/office/drawing/2014/main" id="{440E7F1B-8FEC-C5DF-68F0-A4A0DE25C1EA}"/>
+              </a:ext>
+            </a:extLst>
+          </p:cNvPr>
+          <p:cNvSpPr/>
+          <p:nvPr/>
+        </p:nvSpPr>
+        <p:spPr>
+          <a:xfrm>
+            <a:off x="2121304" y="301981"/>
             <a:ext cx="2186152" cy="1072055"/>
           </a:xfrm>
           <a:prstGeom prst="rect">
@@ -3817,19 +3869,77 @@
           <a:p>
             <a:pPr algn="ctr"/>
             <a:r>
+              <a:rPr kumimoji="1" lang="en-US" altLang="ko-Kore-KR" dirty="0"/>
+              <a:t>&lt;&lt;Concrete&gt;&gt;</a:t>
+            </a:r>
+          </a:p>
+          <a:p>
+            <a:pPr algn="ctr"/>
+            <a:r>
               <a:rPr kumimoji="1" lang="en-US" altLang="ko-Kore-KR" dirty="0" err="1"/>
-              <a:t>ProtocolA</a:t>
+              <a:t>BoardHandler</a:t>
+            </a:r>
+            <a:endParaRPr kumimoji="1" lang="en-US" altLang="ko-Kore-KR" dirty="0"/>
+          </a:p>
+          <a:p>
+            <a:pPr algn="ctr"/>
+            <a:r>
+              <a:rPr kumimoji="1" lang="en-US" altLang="ko-Kore-KR" dirty="0"/>
+              <a:t>class</a:t>
             </a:r>
             <a:endParaRPr kumimoji="1" lang="ko-Kore-KR" altLang="en-US" dirty="0"/>
           </a:p>
         </p:txBody>
       </p:sp>
-      <p:sp>
-        <p:nvSpPr>
-          <p:cNvPr id="25" name="직사각형 24">
-            <a:extLst>
-              <a:ext uri="{FF2B5EF4-FFF2-40B4-BE49-F238E27FC236}">
-                <a16:creationId xmlns:a16="http://schemas.microsoft.com/office/drawing/2014/main" id="{AA843219-B5B5-D6ED-4ED9-900121BB2A5B}"/>
+      <p:cxnSp>
+        <p:nvCxnSpPr>
+          <p:cNvPr id="11" name="직선 화살표 연결선 10">
+            <a:extLst>
+              <a:ext uri="{FF2B5EF4-FFF2-40B4-BE49-F238E27FC236}">
+                <a16:creationId xmlns:a16="http://schemas.microsoft.com/office/drawing/2014/main" id="{8AB7B69B-0DE7-B72F-2F3A-A7E4F62EAA73}"/>
+              </a:ext>
+            </a:extLst>
+          </p:cNvPr>
+          <p:cNvCxnSpPr>
+            <a:cxnSpLocks/>
+            <a:stCxn id="2" idx="3"/>
+            <a:endCxn id="9" idx="1"/>
+          </p:cNvCxnSpPr>
+          <p:nvPr/>
+        </p:nvCxnSpPr>
+        <p:spPr>
+          <a:xfrm flipV="1">
+            <a:off x="1404740" y="838009"/>
+            <a:ext cx="716564" cy="2523522"/>
+          </a:xfrm>
+          <a:prstGeom prst="straightConnector1">
+            <a:avLst/>
+          </a:prstGeom>
+          <a:ln>
+            <a:tailEnd type="triangle"/>
+          </a:ln>
+        </p:spPr>
+        <p:style>
+          <a:lnRef idx="3">
+            <a:schemeClr val="accent1"/>
+          </a:lnRef>
+          <a:fillRef idx="0">
+            <a:schemeClr val="accent1"/>
+          </a:fillRef>
+          <a:effectRef idx="2">
+            <a:schemeClr val="accent1"/>
+          </a:effectRef>
+          <a:fontRef idx="minor">
+            <a:schemeClr val="tx1"/>
+          </a:fontRef>
+        </p:style>
+      </p:cxnSp>
+      <p:sp>
+        <p:nvSpPr>
+          <p:cNvPr id="15" name="직사각형 14">
+            <a:extLst>
+              <a:ext uri="{FF2B5EF4-FFF2-40B4-BE49-F238E27FC236}">
+                <a16:creationId xmlns:a16="http://schemas.microsoft.com/office/drawing/2014/main" id="{69DC84EC-5B76-671D-9EA5-A6A8DF098DC7}"/>
               </a:ext>
             </a:extLst>
           </p:cNvPr>
@@ -3838,7 +3948,7 @@
         </p:nvSpPr>
         <p:spPr>
           <a:xfrm>
-            <a:off x="843048" y="3890752"/>
+            <a:off x="5871183" y="301982"/>
             <a:ext cx="2186152" cy="1072055"/>
           </a:xfrm>
           <a:prstGeom prst="rect">
@@ -3868,1561 +3978,6 @@
             <a:pPr algn="ctr"/>
             <a:r>
               <a:rPr kumimoji="1" lang="en-US" altLang="ko-Kore-KR" dirty="0" err="1"/>
-              <a:t>MyClass</a:t>
-            </a:r>
-            <a:endParaRPr kumimoji="1" lang="en-US" altLang="ko-Kore-KR" dirty="0"/>
-          </a:p>
-          <a:p>
-            <a:pPr algn="ctr"/>
-            <a:r>
-              <a:rPr kumimoji="1" lang="en-US" altLang="ko-Kore-KR" dirty="0"/>
-              <a:t>class</a:t>
-            </a:r>
-            <a:endParaRPr kumimoji="1" lang="ko-Kore-KR" altLang="en-US" dirty="0"/>
-          </a:p>
-        </p:txBody>
-      </p:sp>
-      <p:cxnSp>
-        <p:nvCxnSpPr>
-          <p:cNvPr id="32" name="직선 화살표 연결선 31">
-            <a:extLst>
-              <a:ext uri="{FF2B5EF4-FFF2-40B4-BE49-F238E27FC236}">
-                <a16:creationId xmlns:a16="http://schemas.microsoft.com/office/drawing/2014/main" id="{A17D4700-9BAC-0B87-DD68-51C04FA272DF}"/>
-              </a:ext>
-            </a:extLst>
-          </p:cNvPr>
-          <p:cNvCxnSpPr>
-            <a:cxnSpLocks/>
-            <a:stCxn id="25" idx="0"/>
-            <a:endCxn id="20" idx="2"/>
-          </p:cNvCxnSpPr>
-          <p:nvPr/>
-        </p:nvCxnSpPr>
-        <p:spPr>
-          <a:xfrm flipV="1">
-            <a:off x="1936124" y="2659264"/>
-            <a:ext cx="0" cy="1231488"/>
-          </a:xfrm>
-          <a:prstGeom prst="straightConnector1">
-            <a:avLst/>
-          </a:prstGeom>
-          <a:ln w="9525" cap="flat" cmpd="sng" algn="ctr">
-            <a:solidFill>
-              <a:schemeClr val="accent1"/>
-            </a:solidFill>
-            <a:prstDash val="dash"/>
-            <a:round/>
-            <a:headEnd type="none" w="med" len="med"/>
-            <a:tailEnd type="none" w="med" len="med"/>
-          </a:ln>
-        </p:spPr>
-        <p:style>
-          <a:lnRef idx="0">
-            <a:scrgbClr r="0" g="0" b="0"/>
-          </a:lnRef>
-          <a:fillRef idx="0">
-            <a:scrgbClr r="0" g="0" b="0"/>
-          </a:fillRef>
-          <a:effectRef idx="0">
-            <a:scrgbClr r="0" g="0" b="0"/>
-          </a:effectRef>
-          <a:fontRef idx="minor">
-            <a:schemeClr val="tx1"/>
-          </a:fontRef>
-        </p:style>
-      </p:cxnSp>
-      <p:sp>
-        <p:nvSpPr>
-          <p:cNvPr id="36" name="삼각형 35">
-            <a:extLst>
-              <a:ext uri="{FF2B5EF4-FFF2-40B4-BE49-F238E27FC236}">
-                <a16:creationId xmlns:a16="http://schemas.microsoft.com/office/drawing/2014/main" id="{D89647EE-DBA6-34E6-E991-9414BC135FAB}"/>
-              </a:ext>
-            </a:extLst>
-          </p:cNvPr>
-          <p:cNvSpPr/>
-          <p:nvPr/>
-        </p:nvSpPr>
-        <p:spPr>
-          <a:xfrm>
-            <a:off x="1845490" y="2662432"/>
-            <a:ext cx="181267" cy="156265"/>
-          </a:xfrm>
-          <a:prstGeom prst="triangle">
-            <a:avLst/>
-          </a:prstGeom>
-        </p:spPr>
-        <p:style>
-          <a:lnRef idx="2">
-            <a:schemeClr val="accent1">
-              <a:shade val="50000"/>
-            </a:schemeClr>
-          </a:lnRef>
-          <a:fillRef idx="1">
-            <a:schemeClr val="accent1"/>
-          </a:fillRef>
-          <a:effectRef idx="0">
-            <a:schemeClr val="accent1"/>
-          </a:effectRef>
-          <a:fontRef idx="minor">
-            <a:schemeClr val="lt1"/>
-          </a:fontRef>
-        </p:style>
-        <p:txBody>
-          <a:bodyPr rtlCol="0" anchor="ctr"/>
-          <a:lstStyle/>
-          <a:p>
-            <a:pPr algn="ctr"/>
-            <a:endParaRPr kumimoji="1" lang="ko-Kore-KR" altLang="en-US"/>
-          </a:p>
-        </p:txBody>
-      </p:sp>
-      <p:sp>
-        <p:nvSpPr>
-          <p:cNvPr id="51" name="TextBox 50">
-            <a:extLst>
-              <a:ext uri="{FF2B5EF4-FFF2-40B4-BE49-F238E27FC236}">
-                <a16:creationId xmlns:a16="http://schemas.microsoft.com/office/drawing/2014/main" id="{2667BFCB-93CF-B674-167C-FF441C1B5081}"/>
-              </a:ext>
-            </a:extLst>
-          </p:cNvPr>
-          <p:cNvSpPr txBox="1"/>
-          <p:nvPr/>
-        </p:nvSpPr>
-        <p:spPr>
-          <a:xfrm>
-            <a:off x="3665244" y="1523071"/>
-            <a:ext cx="1545276" cy="1200329"/>
-          </a:xfrm>
-          <a:prstGeom prst="rect">
-            <a:avLst/>
-          </a:prstGeom>
-        </p:spPr>
-        <p:style>
-          <a:lnRef idx="2">
-            <a:schemeClr val="accent1"/>
-          </a:lnRef>
-          <a:fillRef idx="1">
-            <a:schemeClr val="lt1"/>
-          </a:fillRef>
-          <a:effectRef idx="0">
-            <a:schemeClr val="accent1"/>
-          </a:effectRef>
-          <a:fontRef idx="minor">
-            <a:schemeClr val="dk1"/>
-          </a:fontRef>
-        </p:style>
-        <p:txBody>
-          <a:bodyPr wrap="square" rtlCol="0">
-            <a:spAutoFit/>
-          </a:bodyPr>
-          <a:lstStyle/>
-          <a:p>
-            <a:pPr marL="285750" indent="-285750">
-              <a:buFont typeface="Arial" panose="020B0604020202020204" pitchFamily="34" charset="0"/>
-              <a:buChar char="•"/>
-            </a:pPr>
-            <a:r>
-              <a:rPr kumimoji="1" lang="en-US" altLang="ko-Kore-KR" dirty="0"/>
-              <a:t>rule1()</a:t>
-            </a:r>
-          </a:p>
-          <a:p>
-            <a:pPr marL="285750" indent="-285750">
-              <a:buFont typeface="Arial" panose="020B0604020202020204" pitchFamily="34" charset="0"/>
-              <a:buChar char="•"/>
-            </a:pPr>
-            <a:r>
-              <a:rPr kumimoji="1" lang="en-US" altLang="ko-Kore-KR" dirty="0"/>
-              <a:t>rule2()</a:t>
-            </a:r>
-          </a:p>
-          <a:p>
-            <a:pPr marL="285750" indent="-285750">
-              <a:buFont typeface="Arial" panose="020B0604020202020204" pitchFamily="34" charset="0"/>
-              <a:buChar char="•"/>
-            </a:pPr>
-            <a:r>
-              <a:rPr kumimoji="1" lang="en-US" altLang="ko-Kore-KR" dirty="0"/>
-              <a:t>rule3()</a:t>
-            </a:r>
-          </a:p>
-          <a:p>
-            <a:pPr marL="285750" indent="-285750">
-              <a:buFont typeface="Arial" panose="020B0604020202020204" pitchFamily="34" charset="0"/>
-              <a:buChar char="•"/>
-            </a:pPr>
-            <a:r>
-              <a:rPr kumimoji="1" lang="en-US" altLang="ko-Kore-KR" dirty="0"/>
-              <a:t>rule4()</a:t>
-            </a:r>
-          </a:p>
-        </p:txBody>
-      </p:sp>
-      <p:sp>
-        <p:nvSpPr>
-          <p:cNvPr id="3" name="TextBox 2">
-            <a:extLst>
-              <a:ext uri="{FF2B5EF4-FFF2-40B4-BE49-F238E27FC236}">
-                <a16:creationId xmlns:a16="http://schemas.microsoft.com/office/drawing/2014/main" id="{7317B25F-FC8A-1985-00BD-40CDB0E2CF18}"/>
-              </a:ext>
-            </a:extLst>
-          </p:cNvPr>
-          <p:cNvSpPr txBox="1"/>
-          <p:nvPr/>
-        </p:nvSpPr>
-        <p:spPr>
-          <a:xfrm>
-            <a:off x="3665244" y="3890752"/>
-            <a:ext cx="1545276" cy="1200329"/>
-          </a:xfrm>
-          <a:prstGeom prst="rect">
-            <a:avLst/>
-          </a:prstGeom>
-        </p:spPr>
-        <p:style>
-          <a:lnRef idx="2">
-            <a:schemeClr val="accent1"/>
-          </a:lnRef>
-          <a:fillRef idx="1">
-            <a:schemeClr val="lt1"/>
-          </a:fillRef>
-          <a:effectRef idx="0">
-            <a:schemeClr val="accent1"/>
-          </a:effectRef>
-          <a:fontRef idx="minor">
-            <a:schemeClr val="dk1"/>
-          </a:fontRef>
-        </p:style>
-        <p:txBody>
-          <a:bodyPr wrap="square" rtlCol="0">
-            <a:spAutoFit/>
-          </a:bodyPr>
-          <a:lstStyle/>
-          <a:p>
-            <a:pPr marL="285750" indent="-285750">
-              <a:buFont typeface="Arial" panose="020B0604020202020204" pitchFamily="34" charset="0"/>
-              <a:buChar char="•"/>
-            </a:pPr>
-            <a:r>
-              <a:rPr kumimoji="1" lang="en-US" altLang="ko-Kore-KR" dirty="0"/>
-              <a:t>rule1(){}</a:t>
-            </a:r>
-          </a:p>
-          <a:p>
-            <a:pPr marL="285750" indent="-285750">
-              <a:buFont typeface="Arial" panose="020B0604020202020204" pitchFamily="34" charset="0"/>
-              <a:buChar char="•"/>
-            </a:pPr>
-            <a:r>
-              <a:rPr kumimoji="1" lang="en-US" altLang="ko-Kore-KR" dirty="0"/>
-              <a:t>rule2(){}</a:t>
-            </a:r>
-          </a:p>
-          <a:p>
-            <a:pPr marL="285750" indent="-285750">
-              <a:buFont typeface="Arial" panose="020B0604020202020204" pitchFamily="34" charset="0"/>
-              <a:buChar char="•"/>
-            </a:pPr>
-            <a:r>
-              <a:rPr kumimoji="1" lang="en-US" altLang="ko-Kore-KR" dirty="0"/>
-              <a:t>rule3(){}</a:t>
-            </a:r>
-          </a:p>
-          <a:p>
-            <a:pPr marL="285750" indent="-285750">
-              <a:buFont typeface="Arial" panose="020B0604020202020204" pitchFamily="34" charset="0"/>
-              <a:buChar char="•"/>
-            </a:pPr>
-            <a:r>
-              <a:rPr kumimoji="1" lang="en-US" altLang="ko-Kore-KR" dirty="0"/>
-              <a:t>rule4(){}</a:t>
-            </a:r>
-          </a:p>
-        </p:txBody>
-      </p:sp>
-      <p:sp>
-        <p:nvSpPr>
-          <p:cNvPr id="5" name="직사각형 4">
-            <a:extLst>
-              <a:ext uri="{FF2B5EF4-FFF2-40B4-BE49-F238E27FC236}">
-                <a16:creationId xmlns:a16="http://schemas.microsoft.com/office/drawing/2014/main" id="{048A6D7A-4EE0-CA82-94F4-3BDB5D9CCDCC}"/>
-              </a:ext>
-            </a:extLst>
-          </p:cNvPr>
-          <p:cNvSpPr/>
-          <p:nvPr/>
-        </p:nvSpPr>
-        <p:spPr>
-          <a:xfrm>
-            <a:off x="6939639" y="515154"/>
-            <a:ext cx="2186152" cy="1072055"/>
-          </a:xfrm>
-          <a:prstGeom prst="rect">
-            <a:avLst/>
-          </a:prstGeom>
-        </p:spPr>
-        <p:style>
-          <a:lnRef idx="2">
-            <a:schemeClr val="accent1">
-              <a:shade val="50000"/>
-            </a:schemeClr>
-          </a:lnRef>
-          <a:fillRef idx="1">
-            <a:schemeClr val="accent1"/>
-          </a:fillRef>
-          <a:effectRef idx="0">
-            <a:schemeClr val="accent1"/>
-          </a:effectRef>
-          <a:fontRef idx="minor">
-            <a:schemeClr val="lt1"/>
-          </a:fontRef>
-        </p:style>
-        <p:txBody>
-          <a:bodyPr rtlCol="0" anchor="ctr"/>
-          <a:lstStyle/>
-          <a:p>
-            <a:pPr algn="ctr"/>
-            <a:r>
-              <a:rPr kumimoji="1" lang="en-US" altLang="ko-Kore-KR" dirty="0" err="1"/>
-              <a:t>ProtocolA</a:t>
-            </a:r>
-            <a:endParaRPr kumimoji="1" lang="ko-Kore-KR" altLang="en-US" dirty="0"/>
-          </a:p>
-        </p:txBody>
-      </p:sp>
-      <p:sp>
-        <p:nvSpPr>
-          <p:cNvPr id="6" name="직사각형 5">
-            <a:extLst>
-              <a:ext uri="{FF2B5EF4-FFF2-40B4-BE49-F238E27FC236}">
-                <a16:creationId xmlns:a16="http://schemas.microsoft.com/office/drawing/2014/main" id="{528CD21A-CE4D-9478-C8CD-7C403C2D5712}"/>
-              </a:ext>
-            </a:extLst>
-          </p:cNvPr>
-          <p:cNvSpPr/>
-          <p:nvPr/>
-        </p:nvSpPr>
-        <p:spPr>
-          <a:xfrm>
-            <a:off x="6939639" y="2818697"/>
-            <a:ext cx="2186152" cy="1072055"/>
-          </a:xfrm>
-          <a:prstGeom prst="rect">
-            <a:avLst/>
-          </a:prstGeom>
-        </p:spPr>
-        <p:style>
-          <a:lnRef idx="2">
-            <a:schemeClr val="accent1">
-              <a:shade val="50000"/>
-            </a:schemeClr>
-          </a:lnRef>
-          <a:fillRef idx="1">
-            <a:schemeClr val="accent1"/>
-          </a:fillRef>
-          <a:effectRef idx="0">
-            <a:schemeClr val="accent1"/>
-          </a:effectRef>
-          <a:fontRef idx="minor">
-            <a:schemeClr val="lt1"/>
-          </a:fontRef>
-        </p:style>
-        <p:txBody>
-          <a:bodyPr rtlCol="0" anchor="ctr"/>
-          <a:lstStyle/>
-          <a:p>
-            <a:pPr algn="ctr"/>
-            <a:r>
-              <a:rPr kumimoji="1" lang="en-US" altLang="ko-Kore-KR" dirty="0" err="1"/>
-              <a:t>AbstractClass</a:t>
-            </a:r>
-            <a:endParaRPr kumimoji="1" lang="en-US" altLang="ko-Kore-KR" dirty="0"/>
-          </a:p>
-          <a:p>
-            <a:pPr algn="ctr"/>
-            <a:r>
-              <a:rPr kumimoji="1" lang="en-US" altLang="ko-Kore-KR" dirty="0"/>
-              <a:t>class</a:t>
-            </a:r>
-            <a:endParaRPr kumimoji="1" lang="ko-Kore-KR" altLang="en-US" dirty="0"/>
-          </a:p>
-        </p:txBody>
-      </p:sp>
-      <p:cxnSp>
-        <p:nvCxnSpPr>
-          <p:cNvPr id="7" name="직선 화살표 연결선 6">
-            <a:extLst>
-              <a:ext uri="{FF2B5EF4-FFF2-40B4-BE49-F238E27FC236}">
-                <a16:creationId xmlns:a16="http://schemas.microsoft.com/office/drawing/2014/main" id="{7276A822-272B-1F43-EDFA-94A5B76B777E}"/>
-              </a:ext>
-            </a:extLst>
-          </p:cNvPr>
-          <p:cNvCxnSpPr>
-            <a:cxnSpLocks/>
-            <a:stCxn id="6" idx="0"/>
-            <a:endCxn id="5" idx="2"/>
-          </p:cNvCxnSpPr>
-          <p:nvPr/>
-        </p:nvCxnSpPr>
-        <p:spPr>
-          <a:xfrm flipV="1">
-            <a:off x="8032715" y="1587209"/>
-            <a:ext cx="0" cy="1231488"/>
-          </a:xfrm>
-          <a:prstGeom prst="straightConnector1">
-            <a:avLst/>
-          </a:prstGeom>
-          <a:ln w="9525" cap="flat" cmpd="sng" algn="ctr">
-            <a:solidFill>
-              <a:schemeClr val="accent1"/>
-            </a:solidFill>
-            <a:prstDash val="dash"/>
-            <a:round/>
-            <a:headEnd type="none" w="med" len="med"/>
-            <a:tailEnd type="none" w="med" len="med"/>
-          </a:ln>
-        </p:spPr>
-        <p:style>
-          <a:lnRef idx="0">
-            <a:scrgbClr r="0" g="0" b="0"/>
-          </a:lnRef>
-          <a:fillRef idx="0">
-            <a:scrgbClr r="0" g="0" b="0"/>
-          </a:fillRef>
-          <a:effectRef idx="0">
-            <a:scrgbClr r="0" g="0" b="0"/>
-          </a:effectRef>
-          <a:fontRef idx="minor">
-            <a:schemeClr val="tx1"/>
-          </a:fontRef>
-        </p:style>
-      </p:cxnSp>
-      <p:sp>
-        <p:nvSpPr>
-          <p:cNvPr id="8" name="삼각형 7">
-            <a:extLst>
-              <a:ext uri="{FF2B5EF4-FFF2-40B4-BE49-F238E27FC236}">
-                <a16:creationId xmlns:a16="http://schemas.microsoft.com/office/drawing/2014/main" id="{9CF1C7AD-6C94-1498-2795-73E512E3461B}"/>
-              </a:ext>
-            </a:extLst>
-          </p:cNvPr>
-          <p:cNvSpPr/>
-          <p:nvPr/>
-        </p:nvSpPr>
-        <p:spPr>
-          <a:xfrm>
-            <a:off x="7942081" y="1590377"/>
-            <a:ext cx="181267" cy="156265"/>
-          </a:xfrm>
-          <a:prstGeom prst="triangle">
-            <a:avLst/>
-          </a:prstGeom>
-        </p:spPr>
-        <p:style>
-          <a:lnRef idx="2">
-            <a:schemeClr val="accent1">
-              <a:shade val="50000"/>
-            </a:schemeClr>
-          </a:lnRef>
-          <a:fillRef idx="1">
-            <a:schemeClr val="accent1"/>
-          </a:fillRef>
-          <a:effectRef idx="0">
-            <a:schemeClr val="accent1"/>
-          </a:effectRef>
-          <a:fontRef idx="minor">
-            <a:schemeClr val="lt1"/>
-          </a:fontRef>
-        </p:style>
-        <p:txBody>
-          <a:bodyPr rtlCol="0" anchor="ctr"/>
-          <a:lstStyle/>
-          <a:p>
-            <a:pPr algn="ctr"/>
-            <a:endParaRPr kumimoji="1" lang="ko-Kore-KR" altLang="en-US"/>
-          </a:p>
-        </p:txBody>
-      </p:sp>
-      <p:sp>
-        <p:nvSpPr>
-          <p:cNvPr id="10" name="TextBox 9">
-            <a:extLst>
-              <a:ext uri="{FF2B5EF4-FFF2-40B4-BE49-F238E27FC236}">
-                <a16:creationId xmlns:a16="http://schemas.microsoft.com/office/drawing/2014/main" id="{15188DC5-41B3-575A-2C63-0C2411C101F0}"/>
-              </a:ext>
-            </a:extLst>
-          </p:cNvPr>
-          <p:cNvSpPr txBox="1"/>
-          <p:nvPr/>
-        </p:nvSpPr>
-        <p:spPr>
-          <a:xfrm>
-            <a:off x="9761835" y="451016"/>
-            <a:ext cx="1545276" cy="1200329"/>
-          </a:xfrm>
-          <a:prstGeom prst="rect">
-            <a:avLst/>
-          </a:prstGeom>
-        </p:spPr>
-        <p:style>
-          <a:lnRef idx="2">
-            <a:schemeClr val="accent1"/>
-          </a:lnRef>
-          <a:fillRef idx="1">
-            <a:schemeClr val="lt1"/>
-          </a:fillRef>
-          <a:effectRef idx="0">
-            <a:schemeClr val="accent1"/>
-          </a:effectRef>
-          <a:fontRef idx="minor">
-            <a:schemeClr val="dk1"/>
-          </a:fontRef>
-        </p:style>
-        <p:txBody>
-          <a:bodyPr wrap="square" rtlCol="0">
-            <a:spAutoFit/>
-          </a:bodyPr>
-          <a:lstStyle/>
-          <a:p>
-            <a:pPr marL="285750" indent="-285750">
-              <a:buFont typeface="Arial" panose="020B0604020202020204" pitchFamily="34" charset="0"/>
-              <a:buChar char="•"/>
-            </a:pPr>
-            <a:r>
-              <a:rPr kumimoji="1" lang="en-US" altLang="ko-Kore-KR" dirty="0"/>
-              <a:t>rule1()</a:t>
-            </a:r>
-          </a:p>
-          <a:p>
-            <a:pPr marL="285750" indent="-285750">
-              <a:buFont typeface="Arial" panose="020B0604020202020204" pitchFamily="34" charset="0"/>
-              <a:buChar char="•"/>
-            </a:pPr>
-            <a:r>
-              <a:rPr kumimoji="1" lang="en-US" altLang="ko-Kore-KR" dirty="0"/>
-              <a:t>rule2()</a:t>
-            </a:r>
-          </a:p>
-          <a:p>
-            <a:pPr marL="285750" indent="-285750">
-              <a:buFont typeface="Arial" panose="020B0604020202020204" pitchFamily="34" charset="0"/>
-              <a:buChar char="•"/>
-            </a:pPr>
-            <a:r>
-              <a:rPr kumimoji="1" lang="en-US" altLang="ko-Kore-KR" dirty="0"/>
-              <a:t>rule3()</a:t>
-            </a:r>
-          </a:p>
-          <a:p>
-            <a:pPr marL="285750" indent="-285750">
-              <a:buFont typeface="Arial" panose="020B0604020202020204" pitchFamily="34" charset="0"/>
-              <a:buChar char="•"/>
-            </a:pPr>
-            <a:r>
-              <a:rPr kumimoji="1" lang="en-US" altLang="ko-Kore-KR" dirty="0"/>
-              <a:t>rule4()</a:t>
-            </a:r>
-          </a:p>
-        </p:txBody>
-      </p:sp>
-      <p:sp>
-        <p:nvSpPr>
-          <p:cNvPr id="12" name="TextBox 11">
-            <a:extLst>
-              <a:ext uri="{FF2B5EF4-FFF2-40B4-BE49-F238E27FC236}">
-                <a16:creationId xmlns:a16="http://schemas.microsoft.com/office/drawing/2014/main" id="{C658F6B7-5182-EC68-C6B8-F334C29B75A0}"/>
-              </a:ext>
-            </a:extLst>
-          </p:cNvPr>
-          <p:cNvSpPr txBox="1"/>
-          <p:nvPr/>
-        </p:nvSpPr>
-        <p:spPr>
-          <a:xfrm>
-            <a:off x="9761835" y="2818697"/>
-            <a:ext cx="1545276" cy="1200329"/>
-          </a:xfrm>
-          <a:prstGeom prst="rect">
-            <a:avLst/>
-          </a:prstGeom>
-        </p:spPr>
-        <p:style>
-          <a:lnRef idx="2">
-            <a:schemeClr val="accent1"/>
-          </a:lnRef>
-          <a:fillRef idx="1">
-            <a:schemeClr val="lt1"/>
-          </a:fillRef>
-          <a:effectRef idx="0">
-            <a:schemeClr val="accent1"/>
-          </a:effectRef>
-          <a:fontRef idx="minor">
-            <a:schemeClr val="dk1"/>
-          </a:fontRef>
-        </p:style>
-        <p:txBody>
-          <a:bodyPr wrap="square" rtlCol="0">
-            <a:spAutoFit/>
-          </a:bodyPr>
-          <a:lstStyle/>
-          <a:p>
-            <a:pPr marL="285750" indent="-285750">
-              <a:buFont typeface="Arial" panose="020B0604020202020204" pitchFamily="34" charset="0"/>
-              <a:buChar char="•"/>
-            </a:pPr>
-            <a:r>
-              <a:rPr kumimoji="1" lang="en-US" altLang="ko-Kore-KR" dirty="0"/>
-              <a:t>rule1(){}</a:t>
-            </a:r>
-          </a:p>
-          <a:p>
-            <a:pPr marL="285750" indent="-285750">
-              <a:buFont typeface="Arial" panose="020B0604020202020204" pitchFamily="34" charset="0"/>
-              <a:buChar char="•"/>
-            </a:pPr>
-            <a:r>
-              <a:rPr kumimoji="1" lang="en-US" altLang="ko-Kore-KR" dirty="0"/>
-              <a:t>rule2(){}</a:t>
-            </a:r>
-          </a:p>
-          <a:p>
-            <a:pPr marL="285750" indent="-285750">
-              <a:buFont typeface="Arial" panose="020B0604020202020204" pitchFamily="34" charset="0"/>
-              <a:buChar char="•"/>
-            </a:pPr>
-            <a:r>
-              <a:rPr kumimoji="1" lang="en-US" altLang="ko-Kore-KR" dirty="0"/>
-              <a:t>rule3(){}</a:t>
-            </a:r>
-          </a:p>
-          <a:p>
-            <a:pPr marL="285750" indent="-285750">
-              <a:buFont typeface="Arial" panose="020B0604020202020204" pitchFamily="34" charset="0"/>
-              <a:buChar char="•"/>
-            </a:pPr>
-            <a:r>
-              <a:rPr kumimoji="1" lang="en-US" altLang="ko-Kore-KR" dirty="0"/>
-              <a:t>rule4(){}</a:t>
-            </a:r>
-          </a:p>
-        </p:txBody>
-      </p:sp>
-      <p:sp>
-        <p:nvSpPr>
-          <p:cNvPr id="13" name="직사각형 12">
-            <a:extLst>
-              <a:ext uri="{FF2B5EF4-FFF2-40B4-BE49-F238E27FC236}">
-                <a16:creationId xmlns:a16="http://schemas.microsoft.com/office/drawing/2014/main" id="{C7511225-1BF9-2F16-2BBE-A2A7F33ABD30}"/>
-              </a:ext>
-            </a:extLst>
-          </p:cNvPr>
-          <p:cNvSpPr/>
-          <p:nvPr/>
-        </p:nvSpPr>
-        <p:spPr>
-          <a:xfrm>
-            <a:off x="6939639" y="5122240"/>
-            <a:ext cx="2186152" cy="1072055"/>
-          </a:xfrm>
-          <a:prstGeom prst="rect">
-            <a:avLst/>
-          </a:prstGeom>
-        </p:spPr>
-        <p:style>
-          <a:lnRef idx="2">
-            <a:schemeClr val="accent1">
-              <a:shade val="50000"/>
-            </a:schemeClr>
-          </a:lnRef>
-          <a:fillRef idx="1">
-            <a:schemeClr val="accent1"/>
-          </a:fillRef>
-          <a:effectRef idx="0">
-            <a:schemeClr val="accent1"/>
-          </a:effectRef>
-          <a:fontRef idx="minor">
-            <a:schemeClr val="lt1"/>
-          </a:fontRef>
-        </p:style>
-        <p:txBody>
-          <a:bodyPr rtlCol="0" anchor="ctr"/>
-          <a:lstStyle/>
-          <a:p>
-            <a:pPr algn="ctr"/>
-            <a:r>
-              <a:rPr kumimoji="1" lang="en-US" altLang="ko-Kore-KR" dirty="0" err="1"/>
-              <a:t>MyClass</a:t>
-            </a:r>
-            <a:endParaRPr kumimoji="1" lang="en-US" altLang="ko-Kore-KR" dirty="0"/>
-          </a:p>
-          <a:p>
-            <a:pPr algn="ctr"/>
-            <a:r>
-              <a:rPr kumimoji="1" lang="en-US" altLang="ko-Kore-KR" dirty="0"/>
-              <a:t>class</a:t>
-            </a:r>
-            <a:endParaRPr kumimoji="1" lang="ko-Kore-KR" altLang="en-US" dirty="0"/>
-          </a:p>
-        </p:txBody>
-      </p:sp>
-      <p:sp>
-        <p:nvSpPr>
-          <p:cNvPr id="14" name="TextBox 13">
-            <a:extLst>
-              <a:ext uri="{FF2B5EF4-FFF2-40B4-BE49-F238E27FC236}">
-                <a16:creationId xmlns:a16="http://schemas.microsoft.com/office/drawing/2014/main" id="{1B1A366C-AC5C-EC0D-46E9-6C38DB69E073}"/>
-              </a:ext>
-            </a:extLst>
-          </p:cNvPr>
-          <p:cNvSpPr txBox="1"/>
-          <p:nvPr/>
-        </p:nvSpPr>
-        <p:spPr>
-          <a:xfrm>
-            <a:off x="9761835" y="5473601"/>
-            <a:ext cx="1545276" cy="369332"/>
-          </a:xfrm>
-          <a:prstGeom prst="rect">
-            <a:avLst/>
-          </a:prstGeom>
-        </p:spPr>
-        <p:style>
-          <a:lnRef idx="2">
-            <a:schemeClr val="accent1"/>
-          </a:lnRef>
-          <a:fillRef idx="1">
-            <a:schemeClr val="lt1"/>
-          </a:fillRef>
-          <a:effectRef idx="0">
-            <a:schemeClr val="accent1"/>
-          </a:effectRef>
-          <a:fontRef idx="minor">
-            <a:schemeClr val="dk1"/>
-          </a:fontRef>
-        </p:style>
-        <p:txBody>
-          <a:bodyPr wrap="square" rtlCol="0">
-            <a:spAutoFit/>
-          </a:bodyPr>
-          <a:lstStyle/>
-          <a:p>
-            <a:pPr marL="285750" indent="-285750">
-              <a:buFont typeface="Arial" panose="020B0604020202020204" pitchFamily="34" charset="0"/>
-              <a:buChar char="•"/>
-            </a:pPr>
-            <a:r>
-              <a:rPr kumimoji="1" lang="en-US" altLang="ko-Kore-KR" dirty="0"/>
-              <a:t>rule1(){}</a:t>
-            </a:r>
-          </a:p>
-        </p:txBody>
-      </p:sp>
-      <p:cxnSp>
-        <p:nvCxnSpPr>
-          <p:cNvPr id="17" name="직선 화살표 연결선 16">
-            <a:extLst>
-              <a:ext uri="{FF2B5EF4-FFF2-40B4-BE49-F238E27FC236}">
-                <a16:creationId xmlns:a16="http://schemas.microsoft.com/office/drawing/2014/main" id="{DC8DB87C-B298-A90F-1C48-85E040F2C9CE}"/>
-              </a:ext>
-            </a:extLst>
-          </p:cNvPr>
-          <p:cNvCxnSpPr>
-            <a:cxnSpLocks/>
-            <a:stCxn id="13" idx="0"/>
-            <a:endCxn id="6" idx="2"/>
-          </p:cNvCxnSpPr>
-          <p:nvPr/>
-        </p:nvCxnSpPr>
-        <p:spPr>
-          <a:xfrm flipV="1">
-            <a:off x="8032715" y="3890752"/>
-            <a:ext cx="0" cy="1231488"/>
-          </a:xfrm>
-          <a:prstGeom prst="straightConnector1">
-            <a:avLst/>
-          </a:prstGeom>
-          <a:ln>
-            <a:tailEnd type="triangle"/>
-          </a:ln>
-        </p:spPr>
-        <p:style>
-          <a:lnRef idx="3">
-            <a:schemeClr val="accent1"/>
-          </a:lnRef>
-          <a:fillRef idx="0">
-            <a:schemeClr val="accent1"/>
-          </a:fillRef>
-          <a:effectRef idx="2">
-            <a:schemeClr val="accent1"/>
-          </a:effectRef>
-          <a:fontRef idx="minor">
-            <a:schemeClr val="tx1"/>
-          </a:fontRef>
-        </p:style>
-      </p:cxnSp>
-    </p:spTree>
-    <p:extLst>
-      <p:ext uri="{BB962C8B-B14F-4D97-AF65-F5344CB8AC3E}">
-        <p14:creationId xmlns:p14="http://schemas.microsoft.com/office/powerpoint/2010/main" val="3763992447"/>
-      </p:ext>
-    </p:extLst>
-  </p:cSld>
-  <p:clrMapOvr>
-    <a:masterClrMapping/>
-  </p:clrMapOvr>
-</p:sld>
-</file>
-
-<file path=ppt/slides/slide3.xml><?xml version="1.0" encoding="utf-8"?>
-<p:sld xmlns:a="http://schemas.openxmlformats.org/drawingml/2006/main" xmlns:r="http://schemas.openxmlformats.org/officeDocument/2006/relationships" xmlns:p="http://schemas.openxmlformats.org/presentationml/2006/main">
-  <p:cSld>
-    <p:spTree>
-      <p:nvGrpSpPr>
-        <p:cNvPr id="1" name=""/>
-        <p:cNvGrpSpPr/>
-        <p:nvPr/>
-      </p:nvGrpSpPr>
-      <p:grpSpPr>
-        <a:xfrm>
-          <a:off x="0" y="0"/>
-          <a:ext cx="0" cy="0"/>
-          <a:chOff x="0" y="0"/>
-          <a:chExt cx="0" cy="0"/>
-        </a:xfrm>
-      </p:grpSpPr>
-      <p:sp>
-        <p:nvSpPr>
-          <p:cNvPr id="5" name="직사각형 4">
-            <a:extLst>
-              <a:ext uri="{FF2B5EF4-FFF2-40B4-BE49-F238E27FC236}">
-                <a16:creationId xmlns:a16="http://schemas.microsoft.com/office/drawing/2014/main" id="{048A6D7A-4EE0-CA82-94F4-3BDB5D9CCDCC}"/>
-              </a:ext>
-            </a:extLst>
-          </p:cNvPr>
-          <p:cNvSpPr/>
-          <p:nvPr/>
-        </p:nvSpPr>
-        <p:spPr>
-          <a:xfrm>
-            <a:off x="538839" y="257576"/>
-            <a:ext cx="2186152" cy="1072055"/>
-          </a:xfrm>
-          <a:prstGeom prst="rect">
-            <a:avLst/>
-          </a:prstGeom>
-        </p:spPr>
-        <p:style>
-          <a:lnRef idx="2">
-            <a:schemeClr val="accent1">
-              <a:shade val="50000"/>
-            </a:schemeClr>
-          </a:lnRef>
-          <a:fillRef idx="1">
-            <a:schemeClr val="accent1"/>
-          </a:fillRef>
-          <a:effectRef idx="0">
-            <a:schemeClr val="accent1"/>
-          </a:effectRef>
-          <a:fontRef idx="minor">
-            <a:schemeClr val="lt1"/>
-          </a:fontRef>
-        </p:style>
-        <p:txBody>
-          <a:bodyPr rtlCol="0" anchor="ctr"/>
-          <a:lstStyle/>
-          <a:p>
-            <a:pPr algn="ctr"/>
-            <a:r>
-              <a:rPr kumimoji="1" lang="en-US" altLang="ko-Kore-KR" dirty="0" err="1"/>
-              <a:t>CarSpec</a:t>
-            </a:r>
-            <a:endParaRPr kumimoji="1" lang="ko-Kore-KR" altLang="en-US" dirty="0"/>
-          </a:p>
-        </p:txBody>
-      </p:sp>
-      <p:sp>
-        <p:nvSpPr>
-          <p:cNvPr id="6" name="직사각형 5">
-            <a:extLst>
-              <a:ext uri="{FF2B5EF4-FFF2-40B4-BE49-F238E27FC236}">
-                <a16:creationId xmlns:a16="http://schemas.microsoft.com/office/drawing/2014/main" id="{528CD21A-CE4D-9478-C8CD-7C403C2D5712}"/>
-              </a:ext>
-            </a:extLst>
-          </p:cNvPr>
-          <p:cNvSpPr/>
-          <p:nvPr/>
-        </p:nvSpPr>
-        <p:spPr>
-          <a:xfrm>
-            <a:off x="538839" y="2561119"/>
-            <a:ext cx="2186152" cy="1072055"/>
-          </a:xfrm>
-          <a:prstGeom prst="rect">
-            <a:avLst/>
-          </a:prstGeom>
-        </p:spPr>
-        <p:style>
-          <a:lnRef idx="2">
-            <a:schemeClr val="accent1">
-              <a:shade val="50000"/>
-            </a:schemeClr>
-          </a:lnRef>
-          <a:fillRef idx="1">
-            <a:schemeClr val="accent1"/>
-          </a:fillRef>
-          <a:effectRef idx="0">
-            <a:schemeClr val="accent1"/>
-          </a:effectRef>
-          <a:fontRef idx="minor">
-            <a:schemeClr val="lt1"/>
-          </a:fontRef>
-        </p:style>
-        <p:txBody>
-          <a:bodyPr rtlCol="0" anchor="ctr"/>
-          <a:lstStyle/>
-          <a:p>
-            <a:pPr algn="ctr"/>
-            <a:r>
-              <a:rPr kumimoji="1" lang="en-US" altLang="ko-Kore-KR" dirty="0" err="1"/>
-              <a:t>AbstractCar</a:t>
-            </a:r>
-            <a:endParaRPr kumimoji="1" lang="en-US" altLang="ko-Kore-KR" dirty="0"/>
-          </a:p>
-          <a:p>
-            <a:pPr algn="ctr"/>
-            <a:r>
-              <a:rPr kumimoji="1" lang="en-US" altLang="ko-Kore-KR" dirty="0"/>
-              <a:t>class</a:t>
-            </a:r>
-            <a:endParaRPr kumimoji="1" lang="ko-Kore-KR" altLang="en-US" dirty="0"/>
-          </a:p>
-        </p:txBody>
-      </p:sp>
-      <p:cxnSp>
-        <p:nvCxnSpPr>
-          <p:cNvPr id="7" name="직선 화살표 연결선 6">
-            <a:extLst>
-              <a:ext uri="{FF2B5EF4-FFF2-40B4-BE49-F238E27FC236}">
-                <a16:creationId xmlns:a16="http://schemas.microsoft.com/office/drawing/2014/main" id="{7276A822-272B-1F43-EDFA-94A5B76B777E}"/>
-              </a:ext>
-            </a:extLst>
-          </p:cNvPr>
-          <p:cNvCxnSpPr>
-            <a:cxnSpLocks/>
-            <a:stCxn id="6" idx="0"/>
-            <a:endCxn id="5" idx="2"/>
-          </p:cNvCxnSpPr>
-          <p:nvPr/>
-        </p:nvCxnSpPr>
-        <p:spPr>
-          <a:xfrm flipV="1">
-            <a:off x="1631915" y="1329631"/>
-            <a:ext cx="0" cy="1231488"/>
-          </a:xfrm>
-          <a:prstGeom prst="straightConnector1">
-            <a:avLst/>
-          </a:prstGeom>
-          <a:ln w="9525" cap="flat" cmpd="sng" algn="ctr">
-            <a:solidFill>
-              <a:schemeClr val="accent1"/>
-            </a:solidFill>
-            <a:prstDash val="dash"/>
-            <a:round/>
-            <a:headEnd type="none" w="med" len="med"/>
-            <a:tailEnd type="none" w="med" len="med"/>
-          </a:ln>
-        </p:spPr>
-        <p:style>
-          <a:lnRef idx="0">
-            <a:scrgbClr r="0" g="0" b="0"/>
-          </a:lnRef>
-          <a:fillRef idx="0">
-            <a:scrgbClr r="0" g="0" b="0"/>
-          </a:fillRef>
-          <a:effectRef idx="0">
-            <a:scrgbClr r="0" g="0" b="0"/>
-          </a:effectRef>
-          <a:fontRef idx="minor">
-            <a:schemeClr val="tx1"/>
-          </a:fontRef>
-        </p:style>
-      </p:cxnSp>
-      <p:sp>
-        <p:nvSpPr>
-          <p:cNvPr id="8" name="삼각형 7">
-            <a:extLst>
-              <a:ext uri="{FF2B5EF4-FFF2-40B4-BE49-F238E27FC236}">
-                <a16:creationId xmlns:a16="http://schemas.microsoft.com/office/drawing/2014/main" id="{9CF1C7AD-6C94-1498-2795-73E512E3461B}"/>
-              </a:ext>
-            </a:extLst>
-          </p:cNvPr>
-          <p:cNvSpPr/>
-          <p:nvPr/>
-        </p:nvSpPr>
-        <p:spPr>
-          <a:xfrm>
-            <a:off x="1541281" y="1332799"/>
-            <a:ext cx="181267" cy="156265"/>
-          </a:xfrm>
-          <a:prstGeom prst="triangle">
-            <a:avLst/>
-          </a:prstGeom>
-        </p:spPr>
-        <p:style>
-          <a:lnRef idx="2">
-            <a:schemeClr val="accent1">
-              <a:shade val="50000"/>
-            </a:schemeClr>
-          </a:lnRef>
-          <a:fillRef idx="1">
-            <a:schemeClr val="accent1"/>
-          </a:fillRef>
-          <a:effectRef idx="0">
-            <a:schemeClr val="accent1"/>
-          </a:effectRef>
-          <a:fontRef idx="minor">
-            <a:schemeClr val="lt1"/>
-          </a:fontRef>
-        </p:style>
-        <p:txBody>
-          <a:bodyPr rtlCol="0" anchor="ctr"/>
-          <a:lstStyle/>
-          <a:p>
-            <a:pPr algn="ctr"/>
-            <a:endParaRPr kumimoji="1" lang="ko-Kore-KR" altLang="en-US"/>
-          </a:p>
-        </p:txBody>
-      </p:sp>
-      <p:sp>
-        <p:nvSpPr>
-          <p:cNvPr id="10" name="TextBox 9">
-            <a:extLst>
-              <a:ext uri="{FF2B5EF4-FFF2-40B4-BE49-F238E27FC236}">
-                <a16:creationId xmlns:a16="http://schemas.microsoft.com/office/drawing/2014/main" id="{15188DC5-41B3-575A-2C63-0C2411C101F0}"/>
-              </a:ext>
-            </a:extLst>
-          </p:cNvPr>
-          <p:cNvSpPr txBox="1"/>
-          <p:nvPr/>
-        </p:nvSpPr>
-        <p:spPr>
-          <a:xfrm>
-            <a:off x="3361035" y="322518"/>
-            <a:ext cx="1545276" cy="923330"/>
-          </a:xfrm>
-          <a:prstGeom prst="rect">
-            <a:avLst/>
-          </a:prstGeom>
-        </p:spPr>
-        <p:style>
-          <a:lnRef idx="2">
-            <a:schemeClr val="accent1"/>
-          </a:lnRef>
-          <a:fillRef idx="1">
-            <a:schemeClr val="lt1"/>
-          </a:fillRef>
-          <a:effectRef idx="0">
-            <a:schemeClr val="accent1"/>
-          </a:effectRef>
-          <a:fontRef idx="minor">
-            <a:schemeClr val="dk1"/>
-          </a:fontRef>
-        </p:style>
-        <p:txBody>
-          <a:bodyPr wrap="square" rtlCol="0">
-            <a:spAutoFit/>
-          </a:bodyPr>
-          <a:lstStyle/>
-          <a:p>
-            <a:pPr marL="285750" indent="-285750">
-              <a:buFont typeface="Arial" panose="020B0604020202020204" pitchFamily="34" charset="0"/>
-              <a:buChar char="•"/>
-            </a:pPr>
-            <a:r>
-              <a:rPr kumimoji="1" lang="en-US" altLang="ko-Kore-KR" dirty="0"/>
-              <a:t>on()</a:t>
-            </a:r>
-          </a:p>
-          <a:p>
-            <a:pPr marL="285750" indent="-285750">
-              <a:buFont typeface="Arial" panose="020B0604020202020204" pitchFamily="34" charset="0"/>
-              <a:buChar char="•"/>
-            </a:pPr>
-            <a:r>
-              <a:rPr kumimoji="1" lang="en-US" altLang="ko-Kore-KR" dirty="0"/>
-              <a:t>off()</a:t>
-            </a:r>
-          </a:p>
-          <a:p>
-            <a:pPr marL="285750" indent="-285750">
-              <a:buFont typeface="Arial" panose="020B0604020202020204" pitchFamily="34" charset="0"/>
-              <a:buChar char="•"/>
-            </a:pPr>
-            <a:r>
-              <a:rPr kumimoji="1" lang="en-US" altLang="ko-Kore-KR" dirty="0"/>
-              <a:t>run()</a:t>
-            </a:r>
-          </a:p>
-        </p:txBody>
-      </p:sp>
-      <p:sp>
-        <p:nvSpPr>
-          <p:cNvPr id="12" name="TextBox 11">
-            <a:extLst>
-              <a:ext uri="{FF2B5EF4-FFF2-40B4-BE49-F238E27FC236}">
-                <a16:creationId xmlns:a16="http://schemas.microsoft.com/office/drawing/2014/main" id="{C658F6B7-5182-EC68-C6B8-F334C29B75A0}"/>
-              </a:ext>
-            </a:extLst>
-          </p:cNvPr>
-          <p:cNvSpPr txBox="1"/>
-          <p:nvPr/>
-        </p:nvSpPr>
-        <p:spPr>
-          <a:xfrm>
-            <a:off x="3361035" y="2773980"/>
-            <a:ext cx="1545276" cy="646331"/>
-          </a:xfrm>
-          <a:prstGeom prst="rect">
-            <a:avLst/>
-          </a:prstGeom>
-        </p:spPr>
-        <p:style>
-          <a:lnRef idx="2">
-            <a:schemeClr val="accent1"/>
-          </a:lnRef>
-          <a:fillRef idx="1">
-            <a:schemeClr val="lt1"/>
-          </a:fillRef>
-          <a:effectRef idx="0">
-            <a:schemeClr val="accent1"/>
-          </a:effectRef>
-          <a:fontRef idx="minor">
-            <a:schemeClr val="dk1"/>
-          </a:fontRef>
-        </p:style>
-        <p:txBody>
-          <a:bodyPr wrap="square" rtlCol="0">
-            <a:spAutoFit/>
-          </a:bodyPr>
-          <a:lstStyle/>
-          <a:p>
-            <a:pPr marL="285750" indent="-285750">
-              <a:buFont typeface="Arial" panose="020B0604020202020204" pitchFamily="34" charset="0"/>
-              <a:buChar char="•"/>
-            </a:pPr>
-            <a:r>
-              <a:rPr kumimoji="1" lang="en-US" altLang="ko-Kore-KR" dirty="0"/>
-              <a:t>on(){}</a:t>
-            </a:r>
-          </a:p>
-          <a:p>
-            <a:pPr marL="285750" indent="-285750">
-              <a:buFont typeface="Arial" panose="020B0604020202020204" pitchFamily="34" charset="0"/>
-              <a:buChar char="•"/>
-            </a:pPr>
-            <a:r>
-              <a:rPr kumimoji="1" lang="en-US" altLang="ko-Kore-KR" dirty="0"/>
-              <a:t>off(){}</a:t>
-            </a:r>
-          </a:p>
-        </p:txBody>
-      </p:sp>
-      <p:sp>
-        <p:nvSpPr>
-          <p:cNvPr id="13" name="직사각형 12">
-            <a:extLst>
-              <a:ext uri="{FF2B5EF4-FFF2-40B4-BE49-F238E27FC236}">
-                <a16:creationId xmlns:a16="http://schemas.microsoft.com/office/drawing/2014/main" id="{C7511225-1BF9-2F16-2BBE-A2A7F33ABD30}"/>
-              </a:ext>
-            </a:extLst>
-          </p:cNvPr>
-          <p:cNvSpPr/>
-          <p:nvPr/>
-        </p:nvSpPr>
-        <p:spPr>
-          <a:xfrm>
-            <a:off x="538839" y="4864662"/>
-            <a:ext cx="2186152" cy="1072055"/>
-          </a:xfrm>
-          <a:prstGeom prst="rect">
-            <a:avLst/>
-          </a:prstGeom>
-        </p:spPr>
-        <p:style>
-          <a:lnRef idx="2">
-            <a:schemeClr val="accent1">
-              <a:shade val="50000"/>
-            </a:schemeClr>
-          </a:lnRef>
-          <a:fillRef idx="1">
-            <a:schemeClr val="accent1"/>
-          </a:fillRef>
-          <a:effectRef idx="0">
-            <a:schemeClr val="accent1"/>
-          </a:effectRef>
-          <a:fontRef idx="minor">
-            <a:schemeClr val="lt1"/>
-          </a:fontRef>
-        </p:style>
-        <p:txBody>
-          <a:bodyPr rtlCol="0" anchor="ctr"/>
-          <a:lstStyle/>
-          <a:p>
-            <a:pPr algn="ctr"/>
-            <a:r>
-              <a:rPr kumimoji="1" lang="en-US" altLang="ko-Kore-KR" dirty="0" err="1"/>
-              <a:t>MyCar</a:t>
-            </a:r>
-            <a:endParaRPr kumimoji="1" lang="en-US" altLang="ko-Kore-KR" dirty="0"/>
-          </a:p>
-          <a:p>
-            <a:pPr algn="ctr"/>
-            <a:r>
-              <a:rPr kumimoji="1" lang="en-US" altLang="ko-Kore-KR" dirty="0"/>
-              <a:t>class</a:t>
-            </a:r>
-            <a:endParaRPr kumimoji="1" lang="ko-Kore-KR" altLang="en-US" dirty="0"/>
-          </a:p>
-        </p:txBody>
-      </p:sp>
-      <p:sp>
-        <p:nvSpPr>
-          <p:cNvPr id="14" name="TextBox 13">
-            <a:extLst>
-              <a:ext uri="{FF2B5EF4-FFF2-40B4-BE49-F238E27FC236}">
-                <a16:creationId xmlns:a16="http://schemas.microsoft.com/office/drawing/2014/main" id="{1B1A366C-AC5C-EC0D-46E9-6C38DB69E073}"/>
-              </a:ext>
-            </a:extLst>
-          </p:cNvPr>
-          <p:cNvSpPr txBox="1"/>
-          <p:nvPr/>
-        </p:nvSpPr>
-        <p:spPr>
-          <a:xfrm>
-            <a:off x="3361035" y="5216023"/>
-            <a:ext cx="1545276" cy="646331"/>
-          </a:xfrm>
-          <a:prstGeom prst="rect">
-            <a:avLst/>
-          </a:prstGeom>
-        </p:spPr>
-        <p:style>
-          <a:lnRef idx="2">
-            <a:schemeClr val="accent1"/>
-          </a:lnRef>
-          <a:fillRef idx="1">
-            <a:schemeClr val="lt1"/>
-          </a:fillRef>
-          <a:effectRef idx="0">
-            <a:schemeClr val="accent1"/>
-          </a:effectRef>
-          <a:fontRef idx="minor">
-            <a:schemeClr val="dk1"/>
-          </a:fontRef>
-        </p:style>
-        <p:txBody>
-          <a:bodyPr wrap="square" rtlCol="0">
-            <a:spAutoFit/>
-          </a:bodyPr>
-          <a:lstStyle/>
-          <a:p>
-            <a:pPr marL="285750" indent="-285750">
-              <a:buFont typeface="Arial" panose="020B0604020202020204" pitchFamily="34" charset="0"/>
-              <a:buChar char="•"/>
-            </a:pPr>
-            <a:r>
-              <a:rPr kumimoji="1" lang="en-US" altLang="ko-Kore-KR" dirty="0"/>
-              <a:t>run(){}</a:t>
-            </a:r>
-          </a:p>
-          <a:p>
-            <a:pPr marL="285750" indent="-285750">
-              <a:buFont typeface="Arial" panose="020B0604020202020204" pitchFamily="34" charset="0"/>
-              <a:buChar char="•"/>
-            </a:pPr>
-            <a:r>
-              <a:rPr kumimoji="1" lang="en-US" altLang="ko-Kore-KR" dirty="0"/>
-              <a:t>m1(){}</a:t>
-            </a:r>
-          </a:p>
-        </p:txBody>
-      </p:sp>
-      <p:cxnSp>
-        <p:nvCxnSpPr>
-          <p:cNvPr id="17" name="직선 화살표 연결선 16">
-            <a:extLst>
-              <a:ext uri="{FF2B5EF4-FFF2-40B4-BE49-F238E27FC236}">
-                <a16:creationId xmlns:a16="http://schemas.microsoft.com/office/drawing/2014/main" id="{DC8DB87C-B298-A90F-1C48-85E040F2C9CE}"/>
-              </a:ext>
-            </a:extLst>
-          </p:cNvPr>
-          <p:cNvCxnSpPr>
-            <a:cxnSpLocks/>
-            <a:stCxn id="13" idx="0"/>
-            <a:endCxn id="6" idx="2"/>
-          </p:cNvCxnSpPr>
-          <p:nvPr/>
-        </p:nvCxnSpPr>
-        <p:spPr>
-          <a:xfrm flipV="1">
-            <a:off x="1631915" y="3633174"/>
-            <a:ext cx="0" cy="1231488"/>
-          </a:xfrm>
-          <a:prstGeom prst="straightConnector1">
-            <a:avLst/>
-          </a:prstGeom>
-          <a:ln>
-            <a:tailEnd type="triangle"/>
-          </a:ln>
-        </p:spPr>
-        <p:style>
-          <a:lnRef idx="3">
-            <a:schemeClr val="accent1"/>
-          </a:lnRef>
-          <a:fillRef idx="0">
-            <a:schemeClr val="accent1"/>
-          </a:fillRef>
-          <a:effectRef idx="2">
-            <a:schemeClr val="accent1"/>
-          </a:effectRef>
-          <a:fontRef idx="minor">
-            <a:schemeClr val="tx1"/>
-          </a:fontRef>
-        </p:style>
-      </p:cxnSp>
-    </p:spTree>
-    <p:extLst>
-      <p:ext uri="{BB962C8B-B14F-4D97-AF65-F5344CB8AC3E}">
-        <p14:creationId xmlns:p14="http://schemas.microsoft.com/office/powerpoint/2010/main" val="4082772308"/>
-      </p:ext>
-    </p:extLst>
-  </p:cSld>
-  <p:clrMapOvr>
-    <a:masterClrMapping/>
-  </p:clrMapOvr>
-</p:sld>
-</file>
-
-<file path=ppt/slides/slide4.xml><?xml version="1.0" encoding="utf-8"?>
-<p:sld xmlns:a="http://schemas.openxmlformats.org/drawingml/2006/main" xmlns:r="http://schemas.openxmlformats.org/officeDocument/2006/relationships" xmlns:p="http://schemas.openxmlformats.org/presentationml/2006/main">
-  <p:cSld>
-    <p:spTree>
-      <p:nvGrpSpPr>
-        <p:cNvPr id="1" name=""/>
-        <p:cNvGrpSpPr/>
-        <p:nvPr/>
-      </p:nvGrpSpPr>
-      <p:grpSpPr>
-        <a:xfrm>
-          <a:off x="0" y="0"/>
-          <a:ext cx="0" cy="0"/>
-          <a:chOff x="0" y="0"/>
-          <a:chExt cx="0" cy="0"/>
-        </a:xfrm>
-      </p:grpSpPr>
-      <p:sp>
-        <p:nvSpPr>
-          <p:cNvPr id="2" name="직사각형 1">
-            <a:extLst>
-              <a:ext uri="{FF2B5EF4-FFF2-40B4-BE49-F238E27FC236}">
-                <a16:creationId xmlns:a16="http://schemas.microsoft.com/office/drawing/2014/main" id="{01CA0D7D-5EDB-0FF9-8973-AA1A5206BCDC}"/>
-              </a:ext>
-            </a:extLst>
-          </p:cNvPr>
-          <p:cNvSpPr/>
-          <p:nvPr/>
-        </p:nvSpPr>
-        <p:spPr>
-          <a:xfrm>
-            <a:off x="80436" y="3880317"/>
-            <a:ext cx="1324304" cy="1072055"/>
-          </a:xfrm>
-          <a:prstGeom prst="rect">
-            <a:avLst/>
-          </a:prstGeom>
-        </p:spPr>
-        <p:style>
-          <a:lnRef idx="2">
-            <a:schemeClr val="accent1">
-              <a:shade val="50000"/>
-            </a:schemeClr>
-          </a:lnRef>
-          <a:fillRef idx="1">
-            <a:schemeClr val="accent1"/>
-          </a:fillRef>
-          <a:effectRef idx="0">
-            <a:schemeClr val="accent1"/>
-          </a:effectRef>
-          <a:fontRef idx="minor">
-            <a:schemeClr val="lt1"/>
-          </a:fontRef>
-        </p:style>
-        <p:txBody>
-          <a:bodyPr rtlCol="0" anchor="ctr"/>
-          <a:lstStyle/>
-          <a:p>
-            <a:pPr algn="ctr"/>
-            <a:r>
-              <a:rPr kumimoji="1" lang="en-US" altLang="ko-Kore-KR" dirty="0"/>
-              <a:t>App</a:t>
-            </a:r>
-          </a:p>
-          <a:p>
-            <a:pPr algn="ctr"/>
-            <a:r>
-              <a:rPr kumimoji="1" lang="en-US" altLang="ko-Kore-KR" dirty="0"/>
-              <a:t>class</a:t>
-            </a:r>
-            <a:endParaRPr kumimoji="1" lang="ko-Kore-KR" altLang="en-US" dirty="0"/>
-          </a:p>
-        </p:txBody>
-      </p:sp>
-      <p:sp>
-        <p:nvSpPr>
-          <p:cNvPr id="9" name="직사각형 8">
-            <a:extLst>
-              <a:ext uri="{FF2B5EF4-FFF2-40B4-BE49-F238E27FC236}">
-                <a16:creationId xmlns:a16="http://schemas.microsoft.com/office/drawing/2014/main" id="{440E7F1B-8FEC-C5DF-68F0-A4A0DE25C1EA}"/>
-              </a:ext>
-            </a:extLst>
-          </p:cNvPr>
-          <p:cNvSpPr/>
-          <p:nvPr/>
-        </p:nvSpPr>
-        <p:spPr>
-          <a:xfrm>
-            <a:off x="2009085" y="3880317"/>
-            <a:ext cx="2186152" cy="1072055"/>
-          </a:xfrm>
-          <a:prstGeom prst="rect">
-            <a:avLst/>
-          </a:prstGeom>
-        </p:spPr>
-        <p:style>
-          <a:lnRef idx="2">
-            <a:schemeClr val="accent1">
-              <a:shade val="50000"/>
-            </a:schemeClr>
-          </a:lnRef>
-          <a:fillRef idx="1">
-            <a:schemeClr val="accent1"/>
-          </a:fillRef>
-          <a:effectRef idx="0">
-            <a:schemeClr val="accent1"/>
-          </a:effectRef>
-          <a:fontRef idx="minor">
-            <a:schemeClr val="lt1"/>
-          </a:fontRef>
-        </p:style>
-        <p:txBody>
-          <a:bodyPr rtlCol="0" anchor="ctr"/>
-          <a:lstStyle/>
-          <a:p>
-            <a:pPr algn="ctr"/>
-            <a:r>
-              <a:rPr kumimoji="1" lang="en-US" altLang="ko-Kore-KR" dirty="0" err="1"/>
-              <a:t>BoardHandler</a:t>
-            </a:r>
-            <a:endParaRPr kumimoji="1" lang="en-US" altLang="ko-Kore-KR" dirty="0"/>
-          </a:p>
-          <a:p>
-            <a:pPr algn="ctr"/>
-            <a:r>
-              <a:rPr kumimoji="1" lang="en-US" altLang="ko-Kore-KR" dirty="0"/>
-              <a:t>class</a:t>
-            </a:r>
-            <a:endParaRPr kumimoji="1" lang="ko-Kore-KR" altLang="en-US" dirty="0"/>
-          </a:p>
-        </p:txBody>
-      </p:sp>
-      <p:cxnSp>
-        <p:nvCxnSpPr>
-          <p:cNvPr id="11" name="직선 화살표 연결선 10">
-            <a:extLst>
-              <a:ext uri="{FF2B5EF4-FFF2-40B4-BE49-F238E27FC236}">
-                <a16:creationId xmlns:a16="http://schemas.microsoft.com/office/drawing/2014/main" id="{8AB7B69B-0DE7-B72F-2F3A-A7E4F62EAA73}"/>
-              </a:ext>
-            </a:extLst>
-          </p:cNvPr>
-          <p:cNvCxnSpPr>
-            <a:cxnSpLocks/>
-            <a:stCxn id="2" idx="3"/>
-            <a:endCxn id="9" idx="1"/>
-          </p:cNvCxnSpPr>
-          <p:nvPr/>
-        </p:nvCxnSpPr>
-        <p:spPr>
-          <a:xfrm>
-            <a:off x="1404740" y="4416345"/>
-            <a:ext cx="604345" cy="0"/>
-          </a:xfrm>
-          <a:prstGeom prst="straightConnector1">
-            <a:avLst/>
-          </a:prstGeom>
-          <a:ln>
-            <a:tailEnd type="triangle"/>
-          </a:ln>
-        </p:spPr>
-        <p:style>
-          <a:lnRef idx="3">
-            <a:schemeClr val="accent1"/>
-          </a:lnRef>
-          <a:fillRef idx="0">
-            <a:schemeClr val="accent1"/>
-          </a:fillRef>
-          <a:effectRef idx="2">
-            <a:schemeClr val="accent1"/>
-          </a:effectRef>
-          <a:fontRef idx="minor">
-            <a:schemeClr val="tx1"/>
-          </a:fontRef>
-        </p:style>
-      </p:cxnSp>
-      <p:sp>
-        <p:nvSpPr>
-          <p:cNvPr id="15" name="직사각형 14">
-            <a:extLst>
-              <a:ext uri="{FF2B5EF4-FFF2-40B4-BE49-F238E27FC236}">
-                <a16:creationId xmlns:a16="http://schemas.microsoft.com/office/drawing/2014/main" id="{69DC84EC-5B76-671D-9EA5-A6A8DF098DC7}"/>
-              </a:ext>
-            </a:extLst>
-          </p:cNvPr>
-          <p:cNvSpPr/>
-          <p:nvPr/>
-        </p:nvSpPr>
-        <p:spPr>
-          <a:xfrm>
-            <a:off x="4799582" y="3880317"/>
-            <a:ext cx="2186152" cy="1072055"/>
-          </a:xfrm>
-          <a:prstGeom prst="rect">
-            <a:avLst/>
-          </a:prstGeom>
-        </p:spPr>
-        <p:style>
-          <a:lnRef idx="2">
-            <a:schemeClr val="accent1">
-              <a:shade val="50000"/>
-            </a:schemeClr>
-          </a:lnRef>
-          <a:fillRef idx="1">
-            <a:schemeClr val="accent1"/>
-          </a:fillRef>
-          <a:effectRef idx="0">
-            <a:schemeClr val="accent1"/>
-          </a:effectRef>
-          <a:fontRef idx="minor">
-            <a:schemeClr val="lt1"/>
-          </a:fontRef>
-        </p:style>
-        <p:txBody>
-          <a:bodyPr rtlCol="0" anchor="ctr"/>
-          <a:lstStyle/>
-          <a:p>
-            <a:pPr algn="ctr"/>
-            <a:r>
-              <a:rPr kumimoji="1" lang="en-US" altLang="ko-Kore-KR" dirty="0" err="1"/>
               <a:t>BoardDao</a:t>
             </a:r>
             <a:endParaRPr kumimoji="1" lang="en-US" altLang="ko-Kore-KR" dirty="0"/>
@@ -5455,8 +4010,8 @@
         </p:nvCxnSpPr>
         <p:spPr>
           <a:xfrm>
-            <a:off x="4195237" y="4416345"/>
-            <a:ext cx="604345" cy="0"/>
+            <a:off x="4307456" y="838009"/>
+            <a:ext cx="1563727" cy="1"/>
           </a:xfrm>
           <a:prstGeom prst="straightConnector1">
             <a:avLst/>
@@ -5555,8 +4110,8 @@
         </p:nvCxnSpPr>
         <p:spPr>
           <a:xfrm>
-            <a:off x="6985734" y="4416345"/>
-            <a:ext cx="680267" cy="0"/>
+            <a:off x="8057335" y="838010"/>
+            <a:ext cx="235358" cy="3578335"/>
           </a:xfrm>
           <a:prstGeom prst="straightConnector1">
             <a:avLst/>
@@ -5652,8 +4207,8 @@
         </p:nvSpPr>
         <p:spPr>
           <a:xfrm>
-            <a:off x="9931536" y="3885422"/>
-            <a:ext cx="2186152" cy="1072055"/>
+            <a:off x="10322868" y="3885422"/>
+            <a:ext cx="1794819" cy="1072055"/>
           </a:xfrm>
           <a:prstGeom prst="rect">
             <a:avLst/>
@@ -5702,8 +4257,8 @@
         </p:nvSpPr>
         <p:spPr>
           <a:xfrm>
-            <a:off x="7666001" y="3880317"/>
-            <a:ext cx="2186152" cy="1072055"/>
+            <a:off x="8292693" y="3880317"/>
+            <a:ext cx="1794818" cy="1072055"/>
           </a:xfrm>
           <a:prstGeom prst="rect">
             <a:avLst/>
@@ -5852,7 +4407,7 @@
         <p:spPr>
           <a:xfrm flipH="1" flipV="1">
             <a:off x="9852153" y="3043855"/>
-            <a:ext cx="1172459" cy="841567"/>
+            <a:ext cx="1368125" cy="841567"/>
           </a:xfrm>
           <a:prstGeom prst="straightConnector1">
             <a:avLst/>
@@ -5894,8 +4449,8 @@
         </p:nvCxnSpPr>
         <p:spPr>
           <a:xfrm flipV="1">
-            <a:off x="8759077" y="3043855"/>
-            <a:ext cx="1093076" cy="836462"/>
+            <a:off x="9190102" y="3043855"/>
+            <a:ext cx="662051" cy="836462"/>
           </a:xfrm>
           <a:prstGeom prst="straightConnector1">
             <a:avLst/>
@@ -5921,1503 +4476,19 @@
       </p:cxnSp>
       <p:sp>
         <p:nvSpPr>
-          <p:cNvPr id="51" name="TextBox 50">
-            <a:extLst>
-              <a:ext uri="{FF2B5EF4-FFF2-40B4-BE49-F238E27FC236}">
-                <a16:creationId xmlns:a16="http://schemas.microsoft.com/office/drawing/2014/main" id="{2667BFCB-93CF-B674-167C-FF441C1B5081}"/>
-              </a:ext>
-            </a:extLst>
-          </p:cNvPr>
-          <p:cNvSpPr txBox="1"/>
+          <p:cNvPr id="4" name="직사각형 3">
+            <a:extLst>
+              <a:ext uri="{FF2B5EF4-FFF2-40B4-BE49-F238E27FC236}">
+                <a16:creationId xmlns:a16="http://schemas.microsoft.com/office/drawing/2014/main" id="{8281B416-959B-2160-1391-6C77AAF98A90}"/>
+              </a:ext>
+            </a:extLst>
+          </p:cNvPr>
+          <p:cNvSpPr/>
           <p:nvPr/>
         </p:nvSpPr>
         <p:spPr>
           <a:xfrm>
-            <a:off x="6893363" y="2184661"/>
-            <a:ext cx="1545276" cy="646331"/>
-          </a:xfrm>
-          <a:prstGeom prst="rect">
-            <a:avLst/>
-          </a:prstGeom>
-        </p:spPr>
-        <p:style>
-          <a:lnRef idx="2">
-            <a:schemeClr val="accent1"/>
-          </a:lnRef>
-          <a:fillRef idx="1">
-            <a:schemeClr val="lt1"/>
-          </a:fillRef>
-          <a:effectRef idx="0">
-            <a:schemeClr val="accent1"/>
-          </a:effectRef>
-          <a:fontRef idx="minor">
-            <a:schemeClr val="dk1"/>
-          </a:fontRef>
-        </p:style>
-        <p:txBody>
-          <a:bodyPr wrap="square" rtlCol="0">
-            <a:spAutoFit/>
-          </a:bodyPr>
-          <a:lstStyle/>
-          <a:p>
-            <a:pPr marL="285750" indent="-285750">
-              <a:buFont typeface="Arial" panose="020B0604020202020204" pitchFamily="34" charset="0"/>
-              <a:buChar char="•"/>
-            </a:pPr>
-            <a:r>
-              <a:rPr kumimoji="1" lang="en-US" altLang="ko-Kore-KR" dirty="0"/>
-              <a:t>int size;</a:t>
-            </a:r>
-          </a:p>
-          <a:p>
-            <a:pPr marL="285750" indent="-285750">
-              <a:buFont typeface="Arial" panose="020B0604020202020204" pitchFamily="34" charset="0"/>
-              <a:buChar char="•"/>
-            </a:pPr>
-            <a:r>
-              <a:rPr kumimoji="1" lang="en-US" altLang="ko-Kore-KR" dirty="0"/>
-              <a:t>size(){}</a:t>
-            </a:r>
-          </a:p>
-        </p:txBody>
-      </p:sp>
-      <p:cxnSp>
-        <p:nvCxnSpPr>
-          <p:cNvPr id="52" name="직선 화살표 연결선 51">
-            <a:extLst>
-              <a:ext uri="{FF2B5EF4-FFF2-40B4-BE49-F238E27FC236}">
-                <a16:creationId xmlns:a16="http://schemas.microsoft.com/office/drawing/2014/main" id="{9F1D72C5-CBDC-329A-477E-53AA8192B899}"/>
-              </a:ext>
-            </a:extLst>
-          </p:cNvPr>
-          <p:cNvCxnSpPr>
-            <a:cxnSpLocks/>
-            <a:stCxn id="53" idx="3"/>
-            <a:endCxn id="51" idx="1"/>
-          </p:cNvCxnSpPr>
-          <p:nvPr/>
-        </p:nvCxnSpPr>
-        <p:spPr>
-          <a:xfrm>
-            <a:off x="5991083" y="2507827"/>
-            <a:ext cx="902280" cy="0"/>
-          </a:xfrm>
-          <a:prstGeom prst="straightConnector1">
-            <a:avLst/>
-          </a:prstGeom>
-          <a:ln>
-            <a:tailEnd type="triangle"/>
-          </a:ln>
-        </p:spPr>
-        <p:style>
-          <a:lnRef idx="2">
-            <a:schemeClr val="accent2"/>
-          </a:lnRef>
-          <a:fillRef idx="1">
-            <a:schemeClr val="lt1"/>
-          </a:fillRef>
-          <a:effectRef idx="0">
-            <a:schemeClr val="accent2"/>
-          </a:effectRef>
-          <a:fontRef idx="minor">
-            <a:schemeClr val="dk1"/>
-          </a:fontRef>
-        </p:style>
-      </p:cxnSp>
-      <p:sp>
-        <p:nvSpPr>
-          <p:cNvPr id="53" name="TextBox 52">
-            <a:extLst>
-              <a:ext uri="{FF2B5EF4-FFF2-40B4-BE49-F238E27FC236}">
-                <a16:creationId xmlns:a16="http://schemas.microsoft.com/office/drawing/2014/main" id="{0A3174DA-966A-6A61-78C6-F41A0E9A57F4}"/>
-              </a:ext>
-            </a:extLst>
-          </p:cNvPr>
-          <p:cNvSpPr txBox="1"/>
-          <p:nvPr/>
-        </p:nvSpPr>
-        <p:spPr>
-          <a:xfrm>
-            <a:off x="2399391" y="2046162"/>
-            <a:ext cx="3591692" cy="923330"/>
-          </a:xfrm>
-          <a:prstGeom prst="rect">
-            <a:avLst/>
-          </a:prstGeom>
-        </p:spPr>
-        <p:style>
-          <a:lnRef idx="2">
-            <a:schemeClr val="accent2"/>
-          </a:lnRef>
-          <a:fillRef idx="1">
-            <a:schemeClr val="lt1"/>
-          </a:fillRef>
-          <a:effectRef idx="0">
-            <a:schemeClr val="accent2"/>
-          </a:effectRef>
-          <a:fontRef idx="minor">
-            <a:schemeClr val="dk1"/>
-          </a:fontRef>
-        </p:style>
-        <p:txBody>
-          <a:bodyPr wrap="square" rtlCol="0">
-            <a:spAutoFit/>
-          </a:bodyPr>
-          <a:lstStyle/>
-          <a:p>
-            <a:r>
-              <a:rPr kumimoji="1" lang="ko-Kore-KR" altLang="en-US" dirty="0"/>
-              <a:t>인터페이스의</a:t>
-            </a:r>
-            <a:r>
-              <a:rPr kumimoji="1" lang="ko-KR" altLang="en-US" dirty="0"/>
-              <a:t> 메서드 중에서</a:t>
-            </a:r>
-            <a:endParaRPr kumimoji="1" lang="en-US" altLang="ko-KR" dirty="0"/>
-          </a:p>
-          <a:p>
-            <a:r>
-              <a:rPr kumimoji="1" lang="ko-KR" altLang="en-US" dirty="0"/>
-              <a:t>서브 클래스에 공통으로 물려줄</a:t>
-            </a:r>
-            <a:endParaRPr kumimoji="1" lang="en-US" altLang="ko-KR" dirty="0"/>
-          </a:p>
-          <a:p>
-            <a:r>
-              <a:rPr kumimoji="1" lang="ko-KR" altLang="en-US" dirty="0"/>
-              <a:t>메서드를 미리 구현한다</a:t>
-            </a:r>
-            <a:r>
-              <a:rPr kumimoji="1" lang="en-US" altLang="ko-KR" dirty="0"/>
-              <a:t>.</a:t>
-            </a:r>
-            <a:endParaRPr kumimoji="1" lang="en-US" altLang="ko-Kore-KR" dirty="0"/>
-          </a:p>
-        </p:txBody>
-      </p:sp>
-      <p:cxnSp>
-        <p:nvCxnSpPr>
-          <p:cNvPr id="59" name="직선 화살표 연결선 58">
-            <a:extLst>
-              <a:ext uri="{FF2B5EF4-FFF2-40B4-BE49-F238E27FC236}">
-                <a16:creationId xmlns:a16="http://schemas.microsoft.com/office/drawing/2014/main" id="{9A7F74CD-4B7A-4A21-6A45-168F5A586911}"/>
-              </a:ext>
-            </a:extLst>
-          </p:cNvPr>
-          <p:cNvCxnSpPr>
-            <a:cxnSpLocks/>
-            <a:stCxn id="60" idx="0"/>
-            <a:endCxn id="28" idx="2"/>
-          </p:cNvCxnSpPr>
-          <p:nvPr/>
-        </p:nvCxnSpPr>
-        <p:spPr>
-          <a:xfrm flipH="1" flipV="1">
-            <a:off x="8759077" y="4952372"/>
-            <a:ext cx="1172459" cy="726159"/>
-          </a:xfrm>
-          <a:prstGeom prst="straightConnector1">
-            <a:avLst/>
-          </a:prstGeom>
-          <a:ln>
-            <a:tailEnd type="triangle"/>
-          </a:ln>
-        </p:spPr>
-        <p:style>
-          <a:lnRef idx="2">
-            <a:schemeClr val="accent2"/>
-          </a:lnRef>
-          <a:fillRef idx="1">
-            <a:schemeClr val="lt1"/>
-          </a:fillRef>
-          <a:effectRef idx="0">
-            <a:schemeClr val="accent2"/>
-          </a:effectRef>
-          <a:fontRef idx="minor">
-            <a:schemeClr val="dk1"/>
-          </a:fontRef>
-        </p:style>
-      </p:cxnSp>
-      <p:sp>
-        <p:nvSpPr>
-          <p:cNvPr id="60" name="TextBox 59">
-            <a:extLst>
-              <a:ext uri="{FF2B5EF4-FFF2-40B4-BE49-F238E27FC236}">
-                <a16:creationId xmlns:a16="http://schemas.microsoft.com/office/drawing/2014/main" id="{034B91BA-6CB8-35B6-FAB7-6D6723E6397E}"/>
-              </a:ext>
-            </a:extLst>
-          </p:cNvPr>
-          <p:cNvSpPr txBox="1"/>
-          <p:nvPr/>
-        </p:nvSpPr>
-        <p:spPr>
-          <a:xfrm>
-            <a:off x="7855528" y="5678531"/>
-            <a:ext cx="4152015" cy="646331"/>
-          </a:xfrm>
-          <a:prstGeom prst="rect">
-            <a:avLst/>
-          </a:prstGeom>
-        </p:spPr>
-        <p:style>
-          <a:lnRef idx="2">
-            <a:schemeClr val="accent2"/>
-          </a:lnRef>
-          <a:fillRef idx="1">
-            <a:schemeClr val="lt1"/>
-          </a:fillRef>
-          <a:effectRef idx="0">
-            <a:schemeClr val="accent2"/>
-          </a:effectRef>
-          <a:fontRef idx="minor">
-            <a:schemeClr val="dk1"/>
-          </a:fontRef>
-        </p:style>
-        <p:txBody>
-          <a:bodyPr wrap="square" rtlCol="0">
-            <a:spAutoFit/>
-          </a:bodyPr>
-          <a:lstStyle/>
-          <a:p>
-            <a:r>
-              <a:rPr kumimoji="1" lang="en-US" altLang="ko-Kore-KR" dirty="0" err="1"/>
-              <a:t>AbstractList</a:t>
-            </a:r>
-            <a:r>
-              <a:rPr kumimoji="1" lang="ko-KR" altLang="en-US" dirty="0"/>
-              <a:t>에서 구현한 것을 제외한</a:t>
-            </a:r>
-            <a:r>
-              <a:rPr kumimoji="1" lang="en-US" altLang="ko-KR" dirty="0"/>
-              <a:t>,</a:t>
-            </a:r>
-          </a:p>
-          <a:p>
-            <a:r>
-              <a:rPr kumimoji="1" lang="en-US" altLang="ko-KR" dirty="0"/>
-              <a:t>List </a:t>
-            </a:r>
-            <a:r>
-              <a:rPr kumimoji="1" lang="ko-KR" altLang="en-US" dirty="0"/>
-              <a:t>인터페이스의 나머지 메서드 구현</a:t>
-            </a:r>
-            <a:endParaRPr kumimoji="1" lang="en-US" altLang="ko-Kore-KR" dirty="0"/>
-          </a:p>
-        </p:txBody>
-      </p:sp>
-      <p:cxnSp>
-        <p:nvCxnSpPr>
-          <p:cNvPr id="63" name="직선 화살표 연결선 62">
-            <a:extLst>
-              <a:ext uri="{FF2B5EF4-FFF2-40B4-BE49-F238E27FC236}">
-                <a16:creationId xmlns:a16="http://schemas.microsoft.com/office/drawing/2014/main" id="{2A370B60-2203-D173-0F47-3A2B7F427286}"/>
-              </a:ext>
-            </a:extLst>
-          </p:cNvPr>
-          <p:cNvCxnSpPr>
-            <a:cxnSpLocks/>
-            <a:stCxn id="60" idx="0"/>
-            <a:endCxn id="26" idx="2"/>
-          </p:cNvCxnSpPr>
-          <p:nvPr/>
-        </p:nvCxnSpPr>
-        <p:spPr>
-          <a:xfrm flipV="1">
-            <a:off x="9931536" y="4957477"/>
-            <a:ext cx="1093076" cy="721054"/>
-          </a:xfrm>
-          <a:prstGeom prst="straightConnector1">
-            <a:avLst/>
-          </a:prstGeom>
-          <a:ln>
-            <a:tailEnd type="triangle"/>
-          </a:ln>
-        </p:spPr>
-        <p:style>
-          <a:lnRef idx="2">
-            <a:schemeClr val="accent2"/>
-          </a:lnRef>
-          <a:fillRef idx="1">
-            <a:schemeClr val="lt1"/>
-          </a:fillRef>
-          <a:effectRef idx="0">
-            <a:schemeClr val="accent2"/>
-          </a:effectRef>
-          <a:fontRef idx="minor">
-            <a:schemeClr val="dk1"/>
-          </a:fontRef>
-        </p:style>
-      </p:cxnSp>
-    </p:spTree>
-    <p:extLst>
-      <p:ext uri="{BB962C8B-B14F-4D97-AF65-F5344CB8AC3E}">
-        <p14:creationId xmlns:p14="http://schemas.microsoft.com/office/powerpoint/2010/main" val="1986258448"/>
-      </p:ext>
-    </p:extLst>
-  </p:cSld>
-  <p:clrMapOvr>
-    <a:masterClrMapping/>
-  </p:clrMapOvr>
-</p:sld>
-</file>
-
-<file path=ppt/slides/slide5.xml><?xml version="1.0" encoding="utf-8"?>
-<p:sld xmlns:a="http://schemas.openxmlformats.org/drawingml/2006/main" xmlns:r="http://schemas.openxmlformats.org/officeDocument/2006/relationships" xmlns:p="http://schemas.openxmlformats.org/presentationml/2006/main">
-  <p:cSld>
-    <p:spTree>
-      <p:nvGrpSpPr>
-        <p:cNvPr id="1" name=""/>
-        <p:cNvGrpSpPr/>
-        <p:nvPr/>
-      </p:nvGrpSpPr>
-      <p:grpSpPr>
-        <a:xfrm>
-          <a:off x="0" y="0"/>
-          <a:ext cx="0" cy="0"/>
-          <a:chOff x="0" y="0"/>
-          <a:chExt cx="0" cy="0"/>
-        </a:xfrm>
-      </p:grpSpPr>
-      <p:sp>
-        <p:nvSpPr>
-          <p:cNvPr id="5" name="직사각형 4">
-            <a:extLst>
-              <a:ext uri="{FF2B5EF4-FFF2-40B4-BE49-F238E27FC236}">
-                <a16:creationId xmlns:a16="http://schemas.microsoft.com/office/drawing/2014/main" id="{9310ACA1-DE0E-4E1C-ACA4-945A3B6FBD1A}"/>
-              </a:ext>
-            </a:extLst>
-          </p:cNvPr>
-          <p:cNvSpPr/>
-          <p:nvPr/>
-        </p:nvSpPr>
-        <p:spPr>
-          <a:xfrm>
-            <a:off x="2779986" y="1072055"/>
-            <a:ext cx="2186152" cy="1135118"/>
-          </a:xfrm>
-          <a:prstGeom prst="rect">
-            <a:avLst/>
-          </a:prstGeom>
-        </p:spPr>
-        <p:style>
-          <a:lnRef idx="2">
-            <a:schemeClr val="accent1">
-              <a:shade val="50000"/>
-            </a:schemeClr>
-          </a:lnRef>
-          <a:fillRef idx="1">
-            <a:schemeClr val="accent1"/>
-          </a:fillRef>
-          <a:effectRef idx="0">
-            <a:schemeClr val="accent1"/>
-          </a:effectRef>
-          <a:fontRef idx="minor">
-            <a:schemeClr val="lt1"/>
-          </a:fontRef>
-        </p:style>
-        <p:txBody>
-          <a:bodyPr rtlCol="0" anchor="ctr"/>
-          <a:lstStyle/>
-          <a:p>
-            <a:pPr algn="ctr"/>
-            <a:r>
-              <a:rPr kumimoji="1" lang="en-US" altLang="ko-Kore-KR" dirty="0"/>
-              <a:t>LinkedList</a:t>
-            </a:r>
-          </a:p>
-          <a:p>
-            <a:pPr algn="ctr"/>
-            <a:r>
-              <a:rPr kumimoji="1" lang="en-US" altLang="ko-Kore-KR" dirty="0"/>
-              <a:t>class</a:t>
-            </a:r>
-            <a:endParaRPr kumimoji="1" lang="ko-Kore-KR" altLang="en-US" dirty="0"/>
-          </a:p>
-        </p:txBody>
-      </p:sp>
-      <p:sp>
-        <p:nvSpPr>
-          <p:cNvPr id="10" name="직사각형 9">
-            <a:extLst>
-              <a:ext uri="{FF2B5EF4-FFF2-40B4-BE49-F238E27FC236}">
-                <a16:creationId xmlns:a16="http://schemas.microsoft.com/office/drawing/2014/main" id="{62AAE4F7-4F0B-81DB-D297-35693DED6847}"/>
-              </a:ext>
-            </a:extLst>
-          </p:cNvPr>
-          <p:cNvSpPr/>
-          <p:nvPr/>
-        </p:nvSpPr>
-        <p:spPr>
-          <a:xfrm>
-            <a:off x="5754413" y="1072055"/>
-            <a:ext cx="2349062" cy="1135118"/>
-          </a:xfrm>
-          <a:prstGeom prst="rect">
-            <a:avLst/>
-          </a:prstGeom>
-        </p:spPr>
-        <p:style>
-          <a:lnRef idx="2">
-            <a:schemeClr val="accent1">
-              <a:shade val="50000"/>
-            </a:schemeClr>
-          </a:lnRef>
-          <a:fillRef idx="1">
-            <a:schemeClr val="accent1"/>
-          </a:fillRef>
-          <a:effectRef idx="0">
-            <a:schemeClr val="accent1"/>
-          </a:effectRef>
-          <a:fontRef idx="minor">
-            <a:schemeClr val="lt1"/>
-          </a:fontRef>
-        </p:style>
-        <p:txBody>
-          <a:bodyPr rtlCol="0" anchor="ctr"/>
-          <a:lstStyle/>
-          <a:p>
-            <a:pPr algn="ctr"/>
-            <a:r>
-              <a:rPr kumimoji="1" lang="en-US" altLang="ko-Kore-KR" dirty="0"/>
-              <a:t>Node</a:t>
-            </a:r>
-          </a:p>
-          <a:p>
-            <a:pPr algn="ctr"/>
-            <a:r>
-              <a:rPr kumimoji="1" lang="en-US" altLang="ko-Kore-KR" dirty="0"/>
-              <a:t>class</a:t>
-            </a:r>
-            <a:endParaRPr kumimoji="1" lang="ko-Kore-KR" altLang="en-US" dirty="0"/>
-          </a:p>
-        </p:txBody>
-      </p:sp>
-      <p:cxnSp>
-        <p:nvCxnSpPr>
-          <p:cNvPr id="19" name="직선 화살표 연결선 18">
-            <a:extLst>
-              <a:ext uri="{FF2B5EF4-FFF2-40B4-BE49-F238E27FC236}">
-                <a16:creationId xmlns:a16="http://schemas.microsoft.com/office/drawing/2014/main" id="{740A34E6-73C1-1FAA-6647-4E8BBD9E3C54}"/>
-              </a:ext>
-            </a:extLst>
-          </p:cNvPr>
-          <p:cNvCxnSpPr>
-            <a:cxnSpLocks/>
-            <a:stCxn id="5" idx="3"/>
-            <a:endCxn id="10" idx="1"/>
-          </p:cNvCxnSpPr>
-          <p:nvPr/>
-        </p:nvCxnSpPr>
-        <p:spPr>
-          <a:xfrm>
-            <a:off x="4966138" y="1639614"/>
-            <a:ext cx="788275" cy="0"/>
-          </a:xfrm>
-          <a:prstGeom prst="straightConnector1">
-            <a:avLst/>
-          </a:prstGeom>
-          <a:ln>
-            <a:tailEnd type="triangle"/>
-          </a:ln>
-        </p:spPr>
-        <p:style>
-          <a:lnRef idx="3">
-            <a:schemeClr val="accent1"/>
-          </a:lnRef>
-          <a:fillRef idx="0">
-            <a:schemeClr val="accent1"/>
-          </a:fillRef>
-          <a:effectRef idx="2">
-            <a:schemeClr val="accent1"/>
-          </a:effectRef>
-          <a:fontRef idx="minor">
-            <a:schemeClr val="tx1"/>
-          </a:fontRef>
-        </p:style>
-      </p:cxnSp>
-      <p:sp>
-        <p:nvSpPr>
-          <p:cNvPr id="3" name="TextBox 2">
-            <a:extLst>
-              <a:ext uri="{FF2B5EF4-FFF2-40B4-BE49-F238E27FC236}">
-                <a16:creationId xmlns:a16="http://schemas.microsoft.com/office/drawing/2014/main" id="{E5822AB9-F3D8-5E86-985B-6EABCD1D5F90}"/>
-              </a:ext>
-            </a:extLst>
-          </p:cNvPr>
-          <p:cNvSpPr txBox="1"/>
-          <p:nvPr/>
-        </p:nvSpPr>
-        <p:spPr>
-          <a:xfrm>
-            <a:off x="199697" y="1039449"/>
-            <a:ext cx="2322786" cy="1200329"/>
-          </a:xfrm>
-          <a:prstGeom prst="rect">
-            <a:avLst/>
-          </a:prstGeom>
-        </p:spPr>
-        <p:style>
-          <a:lnRef idx="2">
-            <a:schemeClr val="accent1"/>
-          </a:lnRef>
-          <a:fillRef idx="1">
-            <a:schemeClr val="lt1"/>
-          </a:fillRef>
-          <a:effectRef idx="0">
-            <a:schemeClr val="accent1"/>
-          </a:effectRef>
-          <a:fontRef idx="minor">
-            <a:schemeClr val="dk1"/>
-          </a:fontRef>
-        </p:style>
-        <p:txBody>
-          <a:bodyPr wrap="square" rtlCol="0">
-            <a:spAutoFit/>
-          </a:bodyPr>
-          <a:lstStyle/>
-          <a:p>
-            <a:r>
-              <a:rPr kumimoji="1" lang="ko-KR" altLang="en-US" dirty="0"/>
-              <a:t>이전</a:t>
-            </a:r>
-            <a:r>
-              <a:rPr kumimoji="1" lang="en-US" altLang="ko-KR" dirty="0"/>
-              <a:t>:</a:t>
-            </a:r>
-          </a:p>
-          <a:p>
-            <a:r>
-              <a:rPr kumimoji="1" lang="en-US" altLang="ko-Kore-KR" dirty="0"/>
-              <a:t>class LinkedList{</a:t>
-            </a:r>
-            <a:r>
-              <a:rPr kumimoji="1" lang="en-US" altLang="ko-KR" dirty="0"/>
-              <a:t>}</a:t>
-            </a:r>
-            <a:endParaRPr kumimoji="1" lang="en-US" altLang="ko-Kore-KR" dirty="0"/>
-          </a:p>
-          <a:p>
-            <a:r>
-              <a:rPr kumimoji="1" lang="en-US" altLang="ko-Kore-KR" dirty="0"/>
-              <a:t>class Node{}</a:t>
-            </a:r>
-          </a:p>
-          <a:p>
-            <a:endParaRPr kumimoji="1" lang="ko-Kore-KR" altLang="en-US" dirty="0"/>
-          </a:p>
-        </p:txBody>
-      </p:sp>
-      <p:sp>
-        <p:nvSpPr>
-          <p:cNvPr id="4" name="직사각형 3">
-            <a:extLst>
-              <a:ext uri="{FF2B5EF4-FFF2-40B4-BE49-F238E27FC236}">
-                <a16:creationId xmlns:a16="http://schemas.microsoft.com/office/drawing/2014/main" id="{E94F2918-91B3-1F7D-BFEE-FA66D17F7309}"/>
-              </a:ext>
-            </a:extLst>
-          </p:cNvPr>
-          <p:cNvSpPr/>
-          <p:nvPr/>
-        </p:nvSpPr>
-        <p:spPr>
-          <a:xfrm>
-            <a:off x="2779986" y="3610303"/>
-            <a:ext cx="2186152" cy="1135118"/>
-          </a:xfrm>
-          <a:prstGeom prst="rect">
-            <a:avLst/>
-          </a:prstGeom>
-        </p:spPr>
-        <p:style>
-          <a:lnRef idx="2">
-            <a:schemeClr val="accent1">
-              <a:shade val="50000"/>
-            </a:schemeClr>
-          </a:lnRef>
-          <a:fillRef idx="1">
-            <a:schemeClr val="accent1"/>
-          </a:fillRef>
-          <a:effectRef idx="0">
-            <a:schemeClr val="accent1"/>
-          </a:effectRef>
-          <a:fontRef idx="minor">
-            <a:schemeClr val="lt1"/>
-          </a:fontRef>
-        </p:style>
-        <p:txBody>
-          <a:bodyPr rtlCol="0" anchor="ctr"/>
-          <a:lstStyle/>
-          <a:p>
-            <a:pPr algn="ctr"/>
-            <a:r>
-              <a:rPr kumimoji="1" lang="en-US" altLang="ko-Kore-KR" dirty="0"/>
-              <a:t>LinkedList</a:t>
-            </a:r>
-          </a:p>
-          <a:p>
-            <a:pPr algn="ctr"/>
-            <a:r>
-              <a:rPr kumimoji="1" lang="en-US" altLang="ko-Kore-KR" dirty="0"/>
-              <a:t>class</a:t>
-            </a:r>
-            <a:endParaRPr kumimoji="1" lang="ko-Kore-KR" altLang="en-US" dirty="0"/>
-          </a:p>
-        </p:txBody>
-      </p:sp>
-      <p:sp>
-        <p:nvSpPr>
-          <p:cNvPr id="6" name="직사각형 5">
-            <a:extLst>
-              <a:ext uri="{FF2B5EF4-FFF2-40B4-BE49-F238E27FC236}">
-                <a16:creationId xmlns:a16="http://schemas.microsoft.com/office/drawing/2014/main" id="{634D7437-EA42-FB52-D702-E4E794B67810}"/>
-              </a:ext>
-            </a:extLst>
-          </p:cNvPr>
-          <p:cNvSpPr/>
-          <p:nvPr/>
-        </p:nvSpPr>
-        <p:spPr>
-          <a:xfrm>
-            <a:off x="5754412" y="3610303"/>
-            <a:ext cx="2349063" cy="1135118"/>
-          </a:xfrm>
-          <a:prstGeom prst="rect">
-            <a:avLst/>
-          </a:prstGeom>
-        </p:spPr>
-        <p:style>
-          <a:lnRef idx="2">
-            <a:schemeClr val="accent1">
-              <a:shade val="50000"/>
-            </a:schemeClr>
-          </a:lnRef>
-          <a:fillRef idx="1">
-            <a:schemeClr val="accent1"/>
-          </a:fillRef>
-          <a:effectRef idx="0">
-            <a:schemeClr val="accent1"/>
-          </a:effectRef>
-          <a:fontRef idx="minor">
-            <a:schemeClr val="lt1"/>
-          </a:fontRef>
-        </p:style>
-        <p:txBody>
-          <a:bodyPr rtlCol="0" anchor="ctr"/>
-          <a:lstStyle/>
-          <a:p>
-            <a:pPr algn="ctr"/>
-            <a:r>
-              <a:rPr kumimoji="1" lang="en-US" altLang="ko-Kore-KR" dirty="0"/>
-              <a:t>&lt;&lt;static nested&gt;&gt;</a:t>
-            </a:r>
-          </a:p>
-          <a:p>
-            <a:pPr algn="ctr"/>
-            <a:r>
-              <a:rPr kumimoji="1" lang="en-US" altLang="ko-Kore-KR" dirty="0"/>
-              <a:t>Node</a:t>
-            </a:r>
-          </a:p>
-          <a:p>
-            <a:pPr algn="ctr"/>
-            <a:r>
-              <a:rPr kumimoji="1" lang="en-US" altLang="ko-Kore-KR" dirty="0"/>
-              <a:t>class</a:t>
-            </a:r>
-            <a:endParaRPr kumimoji="1" lang="ko-Kore-KR" altLang="en-US" dirty="0"/>
-          </a:p>
-        </p:txBody>
-      </p:sp>
-      <p:cxnSp>
-        <p:nvCxnSpPr>
-          <p:cNvPr id="7" name="직선 화살표 연결선 6">
-            <a:extLst>
-              <a:ext uri="{FF2B5EF4-FFF2-40B4-BE49-F238E27FC236}">
-                <a16:creationId xmlns:a16="http://schemas.microsoft.com/office/drawing/2014/main" id="{A0780E25-DCD5-749C-A7EA-645D31457CC2}"/>
-              </a:ext>
-            </a:extLst>
-          </p:cNvPr>
-          <p:cNvCxnSpPr>
-            <a:cxnSpLocks/>
-            <a:stCxn id="4" idx="3"/>
-            <a:endCxn id="6" idx="1"/>
-          </p:cNvCxnSpPr>
-          <p:nvPr/>
-        </p:nvCxnSpPr>
-        <p:spPr>
-          <a:xfrm>
-            <a:off x="4966138" y="4177862"/>
-            <a:ext cx="788274" cy="0"/>
-          </a:xfrm>
-          <a:prstGeom prst="straightConnector1">
-            <a:avLst/>
-          </a:prstGeom>
-          <a:ln>
-            <a:tailEnd type="triangle"/>
-          </a:ln>
-        </p:spPr>
-        <p:style>
-          <a:lnRef idx="3">
-            <a:schemeClr val="accent1"/>
-          </a:lnRef>
-          <a:fillRef idx="0">
-            <a:schemeClr val="accent1"/>
-          </a:fillRef>
-          <a:effectRef idx="2">
-            <a:schemeClr val="accent1"/>
-          </a:effectRef>
-          <a:fontRef idx="minor">
-            <a:schemeClr val="tx1"/>
-          </a:fontRef>
-        </p:style>
-      </p:cxnSp>
-      <p:sp>
-        <p:nvSpPr>
-          <p:cNvPr id="8" name="TextBox 7">
-            <a:extLst>
-              <a:ext uri="{FF2B5EF4-FFF2-40B4-BE49-F238E27FC236}">
-                <a16:creationId xmlns:a16="http://schemas.microsoft.com/office/drawing/2014/main" id="{E1F34294-AB51-010A-78ED-3B4C9F0C8182}"/>
-              </a:ext>
-            </a:extLst>
-          </p:cNvPr>
-          <p:cNvSpPr txBox="1"/>
-          <p:nvPr/>
-        </p:nvSpPr>
-        <p:spPr>
-          <a:xfrm>
-            <a:off x="199696" y="3577697"/>
-            <a:ext cx="2322787" cy="1200329"/>
-          </a:xfrm>
-          <a:prstGeom prst="rect">
-            <a:avLst/>
-          </a:prstGeom>
-        </p:spPr>
-        <p:style>
-          <a:lnRef idx="2">
-            <a:schemeClr val="accent1"/>
-          </a:lnRef>
-          <a:fillRef idx="1">
-            <a:schemeClr val="lt1"/>
-          </a:fillRef>
-          <a:effectRef idx="0">
-            <a:schemeClr val="accent1"/>
-          </a:effectRef>
-          <a:fontRef idx="minor">
-            <a:schemeClr val="dk1"/>
-          </a:fontRef>
-        </p:style>
-        <p:txBody>
-          <a:bodyPr wrap="square" rtlCol="0">
-            <a:spAutoFit/>
-          </a:bodyPr>
-          <a:lstStyle/>
-          <a:p>
-            <a:r>
-              <a:rPr kumimoji="1" lang="ko-KR" altLang="en-US" dirty="0"/>
-              <a:t>이후</a:t>
-            </a:r>
-            <a:r>
-              <a:rPr kumimoji="1" lang="en-US" altLang="ko-KR" dirty="0"/>
-              <a:t>:</a:t>
-            </a:r>
-          </a:p>
-          <a:p>
-            <a:r>
-              <a:rPr kumimoji="1" lang="en-US" altLang="ko-Kore-KR" dirty="0"/>
-              <a:t>class LinkedList{</a:t>
-            </a:r>
-          </a:p>
-          <a:p>
-            <a:r>
-              <a:rPr kumimoji="1" lang="en-US" altLang="ko-Kore-KR" dirty="0"/>
-              <a:t>  static class Node{}</a:t>
-            </a:r>
-          </a:p>
-          <a:p>
-            <a:r>
-              <a:rPr kumimoji="1" lang="en-US" altLang="ko-Kore-KR" dirty="0"/>
-              <a:t>}</a:t>
-            </a:r>
-            <a:endParaRPr kumimoji="1" lang="ko-Kore-KR" altLang="en-US" dirty="0"/>
-          </a:p>
-        </p:txBody>
-      </p:sp>
-      <p:sp>
-        <p:nvSpPr>
-          <p:cNvPr id="13" name="아래쪽 화살표[D] 12">
-            <a:extLst>
-              <a:ext uri="{FF2B5EF4-FFF2-40B4-BE49-F238E27FC236}">
-                <a16:creationId xmlns:a16="http://schemas.microsoft.com/office/drawing/2014/main" id="{8D8545D0-ED24-3E16-A91B-417CE666FD01}"/>
-              </a:ext>
-            </a:extLst>
-          </p:cNvPr>
-          <p:cNvSpPr/>
-          <p:nvPr/>
-        </p:nvSpPr>
-        <p:spPr>
-          <a:xfrm>
-            <a:off x="1077309" y="2423948"/>
-            <a:ext cx="567559" cy="969579"/>
-          </a:xfrm>
-          <a:prstGeom prst="downArrow">
-            <a:avLst/>
-          </a:prstGeom>
-        </p:spPr>
-        <p:style>
-          <a:lnRef idx="2">
-            <a:schemeClr val="accent2">
-              <a:shade val="50000"/>
-            </a:schemeClr>
-          </a:lnRef>
-          <a:fillRef idx="1">
-            <a:schemeClr val="accent2"/>
-          </a:fillRef>
-          <a:effectRef idx="0">
-            <a:schemeClr val="accent2"/>
-          </a:effectRef>
-          <a:fontRef idx="minor">
-            <a:schemeClr val="lt1"/>
-          </a:fontRef>
-        </p:style>
-        <p:txBody>
-          <a:bodyPr rtlCol="0" anchor="ctr"/>
-          <a:lstStyle/>
-          <a:p>
-            <a:pPr algn="ctr"/>
-            <a:endParaRPr kumimoji="1" lang="ko-Kore-KR" altLang="en-US"/>
-          </a:p>
-        </p:txBody>
-      </p:sp>
-      <p:cxnSp>
-        <p:nvCxnSpPr>
-          <p:cNvPr id="23" name="직선 화살표 연결선 22">
-            <a:extLst>
-              <a:ext uri="{FF2B5EF4-FFF2-40B4-BE49-F238E27FC236}">
-                <a16:creationId xmlns:a16="http://schemas.microsoft.com/office/drawing/2014/main" id="{71FECA3E-3244-2F24-7075-08968D8108BA}"/>
-              </a:ext>
-            </a:extLst>
-          </p:cNvPr>
-          <p:cNvCxnSpPr>
-            <a:cxnSpLocks/>
-            <a:stCxn id="27" idx="2"/>
-            <a:endCxn id="5" idx="0"/>
-          </p:cNvCxnSpPr>
-          <p:nvPr/>
-        </p:nvCxnSpPr>
-        <p:spPr>
-          <a:xfrm flipH="1">
-            <a:off x="3873062" y="555156"/>
-            <a:ext cx="1487213" cy="516899"/>
-          </a:xfrm>
-          <a:prstGeom prst="straightConnector1">
-            <a:avLst/>
-          </a:prstGeom>
-          <a:ln>
-            <a:tailEnd type="triangle"/>
-          </a:ln>
-        </p:spPr>
-        <p:style>
-          <a:lnRef idx="3">
-            <a:schemeClr val="accent4"/>
-          </a:lnRef>
-          <a:fillRef idx="0">
-            <a:schemeClr val="accent4"/>
-          </a:fillRef>
-          <a:effectRef idx="2">
-            <a:schemeClr val="accent4"/>
-          </a:effectRef>
-          <a:fontRef idx="minor">
-            <a:schemeClr val="tx1"/>
-          </a:fontRef>
-        </p:style>
-      </p:cxnSp>
-      <p:cxnSp>
-        <p:nvCxnSpPr>
-          <p:cNvPr id="24" name="직선 화살표 연결선 23">
-            <a:extLst>
-              <a:ext uri="{FF2B5EF4-FFF2-40B4-BE49-F238E27FC236}">
-                <a16:creationId xmlns:a16="http://schemas.microsoft.com/office/drawing/2014/main" id="{6FA29C97-80F2-3217-E406-275F6B467886}"/>
-              </a:ext>
-            </a:extLst>
-          </p:cNvPr>
-          <p:cNvCxnSpPr>
-            <a:cxnSpLocks/>
-            <a:stCxn id="27" idx="2"/>
-            <a:endCxn id="10" idx="0"/>
-          </p:cNvCxnSpPr>
-          <p:nvPr/>
-        </p:nvCxnSpPr>
-        <p:spPr>
-          <a:xfrm>
-            <a:off x="5360275" y="555156"/>
-            <a:ext cx="1568669" cy="516899"/>
-          </a:xfrm>
-          <a:prstGeom prst="straightConnector1">
-            <a:avLst/>
-          </a:prstGeom>
-          <a:ln>
-            <a:tailEnd type="triangle"/>
-          </a:ln>
-        </p:spPr>
-        <p:style>
-          <a:lnRef idx="3">
-            <a:schemeClr val="accent4"/>
-          </a:lnRef>
-          <a:fillRef idx="0">
-            <a:schemeClr val="accent4"/>
-          </a:fillRef>
-          <a:effectRef idx="2">
-            <a:schemeClr val="accent4"/>
-          </a:effectRef>
-          <a:fontRef idx="minor">
-            <a:schemeClr val="tx1"/>
-          </a:fontRef>
-        </p:style>
-      </p:cxnSp>
-      <p:sp>
-        <p:nvSpPr>
-          <p:cNvPr id="27" name="TextBox 26">
-            <a:extLst>
-              <a:ext uri="{FF2B5EF4-FFF2-40B4-BE49-F238E27FC236}">
-                <a16:creationId xmlns:a16="http://schemas.microsoft.com/office/drawing/2014/main" id="{BA1F2152-5378-471B-AC24-954ACB39FEB3}"/>
-              </a:ext>
-            </a:extLst>
-          </p:cNvPr>
-          <p:cNvSpPr txBox="1"/>
-          <p:nvPr/>
-        </p:nvSpPr>
-        <p:spPr>
-          <a:xfrm>
-            <a:off x="4579882" y="185824"/>
-            <a:ext cx="1560786" cy="369332"/>
-          </a:xfrm>
-          <a:prstGeom prst="rect">
-            <a:avLst/>
-          </a:prstGeom>
-        </p:spPr>
-        <p:style>
-          <a:lnRef idx="2">
-            <a:schemeClr val="accent4"/>
-          </a:lnRef>
-          <a:fillRef idx="1">
-            <a:schemeClr val="lt1"/>
-          </a:fillRef>
-          <a:effectRef idx="0">
-            <a:schemeClr val="accent4"/>
-          </a:effectRef>
-          <a:fontRef idx="minor">
-            <a:schemeClr val="dk1"/>
-          </a:fontRef>
-        </p:style>
-        <p:txBody>
-          <a:bodyPr wrap="square" rtlCol="0">
-            <a:spAutoFit/>
-          </a:bodyPr>
-          <a:lstStyle/>
-          <a:p>
-            <a:r>
-              <a:rPr kumimoji="1" lang="ko-KR" altLang="en-US" dirty="0"/>
-              <a:t>패키지 멤버</a:t>
-            </a:r>
-            <a:endParaRPr kumimoji="1" lang="en-US" altLang="ko-KR" dirty="0"/>
-          </a:p>
-        </p:txBody>
-      </p:sp>
-    </p:spTree>
-    <p:extLst>
-      <p:ext uri="{BB962C8B-B14F-4D97-AF65-F5344CB8AC3E}">
-        <p14:creationId xmlns:p14="http://schemas.microsoft.com/office/powerpoint/2010/main" val="499515515"/>
-      </p:ext>
-    </p:extLst>
-  </p:cSld>
-  <p:clrMapOvr>
-    <a:masterClrMapping/>
-  </p:clrMapOvr>
-</p:sld>
-</file>
-
-<file path=ppt/slides/slide6.xml><?xml version="1.0" encoding="utf-8"?>
-<p:sld xmlns:a="http://schemas.openxmlformats.org/drawingml/2006/main" xmlns:r="http://schemas.openxmlformats.org/officeDocument/2006/relationships" xmlns:p="http://schemas.openxmlformats.org/presentationml/2006/main">
-  <p:cSld>
-    <p:spTree>
-      <p:nvGrpSpPr>
-        <p:cNvPr id="1" name=""/>
-        <p:cNvGrpSpPr/>
-        <p:nvPr/>
-      </p:nvGrpSpPr>
-      <p:grpSpPr>
-        <a:xfrm>
-          <a:off x="0" y="0"/>
-          <a:ext cx="0" cy="0"/>
-          <a:chOff x="0" y="0"/>
-          <a:chExt cx="0" cy="0"/>
-        </a:xfrm>
-      </p:grpSpPr>
-      <p:sp>
-        <p:nvSpPr>
-          <p:cNvPr id="5" name="직사각형 4">
-            <a:extLst>
-              <a:ext uri="{FF2B5EF4-FFF2-40B4-BE49-F238E27FC236}">
-                <a16:creationId xmlns:a16="http://schemas.microsoft.com/office/drawing/2014/main" id="{9310ACA1-DE0E-4E1C-ACA4-945A3B6FBD1A}"/>
-              </a:ext>
-            </a:extLst>
-          </p:cNvPr>
-          <p:cNvSpPr/>
-          <p:nvPr/>
-        </p:nvSpPr>
-        <p:spPr>
-          <a:xfrm>
-            <a:off x="2779986" y="1072055"/>
-            <a:ext cx="2186152" cy="1135118"/>
-          </a:xfrm>
-          <a:prstGeom prst="rect">
-            <a:avLst/>
-          </a:prstGeom>
-        </p:spPr>
-        <p:style>
-          <a:lnRef idx="2">
-            <a:schemeClr val="accent1">
-              <a:shade val="50000"/>
-            </a:schemeClr>
-          </a:lnRef>
-          <a:fillRef idx="1">
-            <a:schemeClr val="accent1"/>
-          </a:fillRef>
-          <a:effectRef idx="0">
-            <a:schemeClr val="accent1"/>
-          </a:effectRef>
-          <a:fontRef idx="minor">
-            <a:schemeClr val="lt1"/>
-          </a:fontRef>
-        </p:style>
-        <p:txBody>
-          <a:bodyPr rtlCol="0" anchor="ctr"/>
-          <a:lstStyle/>
-          <a:p>
-            <a:pPr algn="ctr"/>
-            <a:r>
-              <a:rPr kumimoji="1" lang="en-US" altLang="ko-Kore-KR" dirty="0"/>
-              <a:t>Stack</a:t>
-            </a:r>
-          </a:p>
-          <a:p>
-            <a:pPr algn="ctr"/>
-            <a:r>
-              <a:rPr kumimoji="1" lang="en-US" altLang="ko-Kore-KR" dirty="0"/>
-              <a:t>class</a:t>
-            </a:r>
-            <a:endParaRPr kumimoji="1" lang="ko-Kore-KR" altLang="en-US" dirty="0"/>
-          </a:p>
-        </p:txBody>
-      </p:sp>
-      <p:sp>
-        <p:nvSpPr>
-          <p:cNvPr id="10" name="직사각형 9">
-            <a:extLst>
-              <a:ext uri="{FF2B5EF4-FFF2-40B4-BE49-F238E27FC236}">
-                <a16:creationId xmlns:a16="http://schemas.microsoft.com/office/drawing/2014/main" id="{62AAE4F7-4F0B-81DB-D297-35693DED6847}"/>
-              </a:ext>
-            </a:extLst>
-          </p:cNvPr>
-          <p:cNvSpPr/>
-          <p:nvPr/>
-        </p:nvSpPr>
-        <p:spPr>
-          <a:xfrm>
-            <a:off x="5754413" y="1072055"/>
-            <a:ext cx="2349062" cy="1135118"/>
-          </a:xfrm>
-          <a:prstGeom prst="rect">
-            <a:avLst/>
-          </a:prstGeom>
-        </p:spPr>
-        <p:style>
-          <a:lnRef idx="2">
-            <a:schemeClr val="accent1">
-              <a:shade val="50000"/>
-            </a:schemeClr>
-          </a:lnRef>
-          <a:fillRef idx="1">
-            <a:schemeClr val="accent1"/>
-          </a:fillRef>
-          <a:effectRef idx="0">
-            <a:schemeClr val="accent1"/>
-          </a:effectRef>
-          <a:fontRef idx="minor">
-            <a:schemeClr val="lt1"/>
-          </a:fontRef>
-        </p:style>
-        <p:txBody>
-          <a:bodyPr rtlCol="0" anchor="ctr"/>
-          <a:lstStyle/>
-          <a:p>
-            <a:pPr algn="ctr"/>
-            <a:r>
-              <a:rPr kumimoji="1" lang="en-US" altLang="ko-Kore-KR" dirty="0"/>
-              <a:t>LinkedList</a:t>
-            </a:r>
-          </a:p>
-          <a:p>
-            <a:pPr algn="ctr"/>
-            <a:r>
-              <a:rPr kumimoji="1" lang="en-US" altLang="ko-Kore-KR" dirty="0"/>
-              <a:t>class</a:t>
-            </a:r>
-            <a:endParaRPr kumimoji="1" lang="ko-Kore-KR" altLang="en-US" dirty="0"/>
-          </a:p>
-        </p:txBody>
-      </p:sp>
-      <p:cxnSp>
-        <p:nvCxnSpPr>
-          <p:cNvPr id="19" name="직선 화살표 연결선 18">
-            <a:extLst>
-              <a:ext uri="{FF2B5EF4-FFF2-40B4-BE49-F238E27FC236}">
-                <a16:creationId xmlns:a16="http://schemas.microsoft.com/office/drawing/2014/main" id="{740A34E6-73C1-1FAA-6647-4E8BBD9E3C54}"/>
-              </a:ext>
-            </a:extLst>
-          </p:cNvPr>
-          <p:cNvCxnSpPr>
-            <a:cxnSpLocks/>
-            <a:stCxn id="5" idx="3"/>
-            <a:endCxn id="10" idx="1"/>
-          </p:cNvCxnSpPr>
-          <p:nvPr/>
-        </p:nvCxnSpPr>
-        <p:spPr>
-          <a:xfrm>
-            <a:off x="4966138" y="1639614"/>
-            <a:ext cx="788275" cy="0"/>
-          </a:xfrm>
-          <a:prstGeom prst="straightConnector1">
-            <a:avLst/>
-          </a:prstGeom>
-          <a:ln>
-            <a:tailEnd type="triangle"/>
-          </a:ln>
-        </p:spPr>
-        <p:style>
-          <a:lnRef idx="3">
-            <a:schemeClr val="accent1"/>
-          </a:lnRef>
-          <a:fillRef idx="0">
-            <a:schemeClr val="accent1"/>
-          </a:fillRef>
-          <a:effectRef idx="2">
-            <a:schemeClr val="accent1"/>
-          </a:effectRef>
-          <a:fontRef idx="minor">
-            <a:schemeClr val="tx1"/>
-          </a:fontRef>
-        </p:style>
-      </p:cxnSp>
-      <p:sp>
-        <p:nvSpPr>
-          <p:cNvPr id="2" name="TextBox 1">
-            <a:extLst>
-              <a:ext uri="{FF2B5EF4-FFF2-40B4-BE49-F238E27FC236}">
-                <a16:creationId xmlns:a16="http://schemas.microsoft.com/office/drawing/2014/main" id="{832783B5-97B9-6D3B-882E-19928C171A64}"/>
-              </a:ext>
-            </a:extLst>
-          </p:cNvPr>
-          <p:cNvSpPr txBox="1"/>
-          <p:nvPr/>
-        </p:nvSpPr>
-        <p:spPr>
-          <a:xfrm>
-            <a:off x="2779986" y="2905877"/>
-            <a:ext cx="2186152" cy="646331"/>
-          </a:xfrm>
-          <a:prstGeom prst="rect">
-            <a:avLst/>
-          </a:prstGeom>
-        </p:spPr>
-        <p:style>
-          <a:lnRef idx="2">
-            <a:schemeClr val="accent1"/>
-          </a:lnRef>
-          <a:fillRef idx="1">
-            <a:schemeClr val="lt1"/>
-          </a:fillRef>
-          <a:effectRef idx="0">
-            <a:schemeClr val="accent1"/>
-          </a:effectRef>
-          <a:fontRef idx="minor">
-            <a:schemeClr val="dk1"/>
-          </a:fontRef>
-        </p:style>
-        <p:txBody>
-          <a:bodyPr wrap="square" rtlCol="0">
-            <a:spAutoFit/>
-          </a:bodyPr>
-          <a:lstStyle/>
-          <a:p>
-            <a:pPr marL="285750" indent="-285750">
-              <a:buFont typeface="Arial" panose="020B0604020202020204" pitchFamily="34" charset="0"/>
-              <a:buChar char="•"/>
-            </a:pPr>
-            <a:r>
-              <a:rPr kumimoji="1" lang="en-US" altLang="ko-KR" dirty="0"/>
-              <a:t>push()</a:t>
-            </a:r>
-          </a:p>
-          <a:p>
-            <a:pPr marL="285750" indent="-285750">
-              <a:buFont typeface="Arial" panose="020B0604020202020204" pitchFamily="34" charset="0"/>
-              <a:buChar char="•"/>
-            </a:pPr>
-            <a:r>
-              <a:rPr kumimoji="1" lang="en-US" altLang="ko-Kore-KR" dirty="0"/>
-              <a:t>pop()</a:t>
-            </a:r>
-          </a:p>
-        </p:txBody>
-      </p:sp>
-      <p:sp>
-        <p:nvSpPr>
-          <p:cNvPr id="9" name="TextBox 8">
-            <a:extLst>
-              <a:ext uri="{FF2B5EF4-FFF2-40B4-BE49-F238E27FC236}">
-                <a16:creationId xmlns:a16="http://schemas.microsoft.com/office/drawing/2014/main" id="{ED025236-608E-E7AC-E71F-7108FFD393F6}"/>
-              </a:ext>
-            </a:extLst>
-          </p:cNvPr>
-          <p:cNvSpPr txBox="1"/>
-          <p:nvPr/>
-        </p:nvSpPr>
-        <p:spPr>
-          <a:xfrm>
-            <a:off x="5754413" y="2905877"/>
-            <a:ext cx="2186152" cy="646331"/>
-          </a:xfrm>
-          <a:prstGeom prst="rect">
-            <a:avLst/>
-          </a:prstGeom>
-        </p:spPr>
-        <p:style>
-          <a:lnRef idx="2">
-            <a:schemeClr val="accent1"/>
-          </a:lnRef>
-          <a:fillRef idx="1">
-            <a:schemeClr val="lt1"/>
-          </a:fillRef>
-          <a:effectRef idx="0">
-            <a:schemeClr val="accent1"/>
-          </a:effectRef>
-          <a:fontRef idx="minor">
-            <a:schemeClr val="dk1"/>
-          </a:fontRef>
-        </p:style>
-        <p:txBody>
-          <a:bodyPr wrap="square" rtlCol="0">
-            <a:spAutoFit/>
-          </a:bodyPr>
-          <a:lstStyle/>
-          <a:p>
-            <a:pPr marL="285750" indent="-285750">
-              <a:buFont typeface="Arial" panose="020B0604020202020204" pitchFamily="34" charset="0"/>
-              <a:buChar char="•"/>
-            </a:pPr>
-            <a:r>
-              <a:rPr kumimoji="1" lang="en-US" altLang="ko-KR" dirty="0"/>
-              <a:t>add()</a:t>
-            </a:r>
-          </a:p>
-          <a:p>
-            <a:pPr marL="285750" indent="-285750">
-              <a:buFont typeface="Arial" panose="020B0604020202020204" pitchFamily="34" charset="0"/>
-              <a:buChar char="•"/>
-            </a:pPr>
-            <a:r>
-              <a:rPr kumimoji="1" lang="en-US" altLang="ko-Kore-KR" dirty="0"/>
-              <a:t>remove()</a:t>
-            </a:r>
-          </a:p>
-        </p:txBody>
-      </p:sp>
-      <p:cxnSp>
-        <p:nvCxnSpPr>
-          <p:cNvPr id="11" name="직선 화살표 연결선 10">
-            <a:extLst>
-              <a:ext uri="{FF2B5EF4-FFF2-40B4-BE49-F238E27FC236}">
-                <a16:creationId xmlns:a16="http://schemas.microsoft.com/office/drawing/2014/main" id="{88675960-3BF2-54C0-A3B3-77E9E67B7927}"/>
-              </a:ext>
-            </a:extLst>
-          </p:cNvPr>
-          <p:cNvCxnSpPr>
-            <a:cxnSpLocks/>
-            <a:stCxn id="2" idx="3"/>
-            <a:endCxn id="9" idx="1"/>
-          </p:cNvCxnSpPr>
-          <p:nvPr/>
-        </p:nvCxnSpPr>
-        <p:spPr>
-          <a:xfrm>
-            <a:off x="4966138" y="3229043"/>
-            <a:ext cx="788275" cy="0"/>
-          </a:xfrm>
-          <a:prstGeom prst="straightConnector1">
-            <a:avLst/>
-          </a:prstGeom>
-          <a:ln>
-            <a:tailEnd type="triangle"/>
-          </a:ln>
-        </p:spPr>
-        <p:style>
-          <a:lnRef idx="3">
-            <a:schemeClr val="accent1"/>
-          </a:lnRef>
-          <a:fillRef idx="0">
-            <a:schemeClr val="accent1"/>
-          </a:fillRef>
-          <a:effectRef idx="2">
-            <a:schemeClr val="accent1"/>
-          </a:effectRef>
-          <a:fontRef idx="minor">
-            <a:schemeClr val="tx1"/>
-          </a:fontRef>
-        </p:style>
-      </p:cxnSp>
-      <p:sp>
-        <p:nvSpPr>
-          <p:cNvPr id="15" name="TextBox 14">
-            <a:extLst>
-              <a:ext uri="{FF2B5EF4-FFF2-40B4-BE49-F238E27FC236}">
-                <a16:creationId xmlns:a16="http://schemas.microsoft.com/office/drawing/2014/main" id="{7285BA7F-C2EC-9E63-D128-50C82C1E1E3C}"/>
-              </a:ext>
-            </a:extLst>
-          </p:cNvPr>
-          <p:cNvSpPr txBox="1"/>
-          <p:nvPr/>
-        </p:nvSpPr>
-        <p:spPr>
-          <a:xfrm>
-            <a:off x="5004996" y="2817221"/>
-            <a:ext cx="759853" cy="369332"/>
-          </a:xfrm>
-          <a:prstGeom prst="rect">
-            <a:avLst/>
-          </a:prstGeom>
-          <a:noFill/>
-        </p:spPr>
-        <p:txBody>
-          <a:bodyPr wrap="square" rtlCol="0">
-            <a:spAutoFit/>
-          </a:bodyPr>
-          <a:lstStyle/>
-          <a:p>
-            <a:r>
-              <a:rPr kumimoji="1" lang="ko-Kore-KR" altLang="en-US" dirty="0">
-                <a:solidFill>
-                  <a:srgbClr val="FF0000"/>
-                </a:solidFill>
-              </a:rPr>
-              <a:t>호출</a:t>
-            </a:r>
-          </a:p>
-        </p:txBody>
-      </p:sp>
-    </p:spTree>
-    <p:extLst>
-      <p:ext uri="{BB962C8B-B14F-4D97-AF65-F5344CB8AC3E}">
-        <p14:creationId xmlns:p14="http://schemas.microsoft.com/office/powerpoint/2010/main" val="2389268134"/>
-      </p:ext>
-    </p:extLst>
-  </p:cSld>
-  <p:clrMapOvr>
-    <a:masterClrMapping/>
-  </p:clrMapOvr>
-</p:sld>
-</file>
-
-<file path=ppt/slides/slide7.xml><?xml version="1.0" encoding="utf-8"?>
-<p:sld xmlns:a="http://schemas.openxmlformats.org/drawingml/2006/main" xmlns:r="http://schemas.openxmlformats.org/officeDocument/2006/relationships" xmlns:p="http://schemas.openxmlformats.org/presentationml/2006/main">
-  <p:cSld>
-    <p:spTree>
-      <p:nvGrpSpPr>
-        <p:cNvPr id="1" name=""/>
-        <p:cNvGrpSpPr/>
-        <p:nvPr/>
-      </p:nvGrpSpPr>
-      <p:grpSpPr>
-        <a:xfrm>
-          <a:off x="0" y="0"/>
-          <a:ext cx="0" cy="0"/>
-          <a:chOff x="0" y="0"/>
-          <a:chExt cx="0" cy="0"/>
-        </a:xfrm>
-      </p:grpSpPr>
-      <p:sp>
-        <p:nvSpPr>
-          <p:cNvPr id="2" name="직사각형 1">
-            <a:extLst>
-              <a:ext uri="{FF2B5EF4-FFF2-40B4-BE49-F238E27FC236}">
-                <a16:creationId xmlns:a16="http://schemas.microsoft.com/office/drawing/2014/main" id="{01CA0D7D-5EDB-0FF9-8973-AA1A5206BCDC}"/>
-              </a:ext>
-            </a:extLst>
-          </p:cNvPr>
-          <p:cNvSpPr/>
-          <p:nvPr/>
-        </p:nvSpPr>
-        <p:spPr>
-          <a:xfrm>
-            <a:off x="80436" y="2825503"/>
-            <a:ext cx="1324304" cy="1072055"/>
-          </a:xfrm>
-          <a:prstGeom prst="rect">
-            <a:avLst/>
-          </a:prstGeom>
-        </p:spPr>
-        <p:style>
-          <a:lnRef idx="2">
-            <a:schemeClr val="accent1">
-              <a:shade val="50000"/>
-            </a:schemeClr>
-          </a:lnRef>
-          <a:fillRef idx="1">
-            <a:schemeClr val="accent1"/>
-          </a:fillRef>
-          <a:effectRef idx="0">
-            <a:schemeClr val="accent1"/>
-          </a:effectRef>
-          <a:fontRef idx="minor">
-            <a:schemeClr val="lt1"/>
-          </a:fontRef>
-        </p:style>
-        <p:txBody>
-          <a:bodyPr rtlCol="0" anchor="ctr"/>
-          <a:lstStyle/>
-          <a:p>
-            <a:pPr algn="ctr"/>
-            <a:r>
-              <a:rPr kumimoji="1" lang="en-US" altLang="ko-Kore-KR" dirty="0"/>
-              <a:t>App</a:t>
-            </a:r>
-          </a:p>
-          <a:p>
-            <a:pPr algn="ctr"/>
-            <a:r>
-              <a:rPr kumimoji="1" lang="en-US" altLang="ko-Kore-KR" dirty="0"/>
-              <a:t>class</a:t>
-            </a:r>
-            <a:endParaRPr kumimoji="1" lang="ko-Kore-KR" altLang="en-US" dirty="0"/>
-          </a:p>
-        </p:txBody>
-      </p:sp>
-      <p:sp>
-        <p:nvSpPr>
-          <p:cNvPr id="9" name="직사각형 8">
-            <a:extLst>
-              <a:ext uri="{FF2B5EF4-FFF2-40B4-BE49-F238E27FC236}">
-                <a16:creationId xmlns:a16="http://schemas.microsoft.com/office/drawing/2014/main" id="{440E7F1B-8FEC-C5DF-68F0-A4A0DE25C1EA}"/>
-              </a:ext>
-            </a:extLst>
-          </p:cNvPr>
-          <p:cNvSpPr/>
-          <p:nvPr/>
-        </p:nvSpPr>
-        <p:spPr>
-          <a:xfrm>
-            <a:off x="2066892" y="411007"/>
+            <a:off x="2066892" y="5384999"/>
             <a:ext cx="2186152" cy="1072055"/>
           </a:xfrm>
           <a:prstGeom prst="rect">
@@ -7454,7 +4525,7 @@
             <a:pPr algn="ctr"/>
             <a:r>
               <a:rPr kumimoji="1" lang="en-US" altLang="ko-Kore-KR" dirty="0" err="1"/>
-              <a:t>BoardHandler</a:t>
+              <a:t>MemberHandler</a:t>
             </a:r>
             <a:endParaRPr kumimoji="1" lang="en-US" altLang="ko-Kore-KR" dirty="0"/>
           </a:p>
@@ -7468,55 +4539,12 @@
           </a:p>
         </p:txBody>
       </p:sp>
-      <p:cxnSp>
-        <p:nvCxnSpPr>
-          <p:cNvPr id="11" name="직선 화살표 연결선 10">
-            <a:extLst>
-              <a:ext uri="{FF2B5EF4-FFF2-40B4-BE49-F238E27FC236}">
-                <a16:creationId xmlns:a16="http://schemas.microsoft.com/office/drawing/2014/main" id="{8AB7B69B-0DE7-B72F-2F3A-A7E4F62EAA73}"/>
-              </a:ext>
-            </a:extLst>
-          </p:cNvPr>
-          <p:cNvCxnSpPr>
-            <a:cxnSpLocks/>
-            <a:stCxn id="2" idx="3"/>
-            <a:endCxn id="9" idx="1"/>
-          </p:cNvCxnSpPr>
-          <p:nvPr/>
-        </p:nvCxnSpPr>
-        <p:spPr>
-          <a:xfrm flipV="1">
-            <a:off x="1404740" y="947035"/>
-            <a:ext cx="662152" cy="2414496"/>
-          </a:xfrm>
-          <a:prstGeom prst="straightConnector1">
-            <a:avLst/>
-          </a:prstGeom>
-          <a:ln>
-            <a:tailEnd type="triangle"/>
-          </a:ln>
-        </p:spPr>
-        <p:style>
-          <a:lnRef idx="3">
-            <a:schemeClr val="accent1"/>
-          </a:lnRef>
-          <a:fillRef idx="0">
-            <a:schemeClr val="accent1"/>
-          </a:fillRef>
-          <a:effectRef idx="2">
-            <a:schemeClr val="accent1"/>
-          </a:effectRef>
-          <a:fontRef idx="minor">
-            <a:schemeClr val="tx1"/>
-          </a:fontRef>
-        </p:style>
-      </p:cxnSp>
-      <p:sp>
-        <p:nvSpPr>
-          <p:cNvPr id="15" name="직사각형 14">
-            <a:extLst>
-              <a:ext uri="{FF2B5EF4-FFF2-40B4-BE49-F238E27FC236}">
-                <a16:creationId xmlns:a16="http://schemas.microsoft.com/office/drawing/2014/main" id="{69DC84EC-5B76-671D-9EA5-A6A8DF098DC7}"/>
+      <p:sp>
+        <p:nvSpPr>
+          <p:cNvPr id="5" name="직사각형 4">
+            <a:extLst>
+              <a:ext uri="{FF2B5EF4-FFF2-40B4-BE49-F238E27FC236}">
+                <a16:creationId xmlns:a16="http://schemas.microsoft.com/office/drawing/2014/main" id="{9BE81465-3947-9868-D87A-BDE88683111A}"/>
               </a:ext>
             </a:extLst>
           </p:cNvPr>
@@ -7525,7 +4553,7 @@
         </p:nvSpPr>
         <p:spPr>
           <a:xfrm>
-            <a:off x="4933311" y="411007"/>
+            <a:off x="5002924" y="5384999"/>
             <a:ext cx="2186152" cy="1072055"/>
           </a:xfrm>
           <a:prstGeom prst="rect">
@@ -7555,7 +4583,7 @@
             <a:pPr algn="ctr"/>
             <a:r>
               <a:rPr kumimoji="1" lang="en-US" altLang="ko-Kore-KR" dirty="0" err="1"/>
-              <a:t>BoardDao</a:t>
+              <a:t>MemberDao</a:t>
             </a:r>
             <a:endParaRPr kumimoji="1" lang="en-US" altLang="ko-Kore-KR" dirty="0"/>
           </a:p>
@@ -7571,24 +4599,24 @@
       </p:sp>
       <p:cxnSp>
         <p:nvCxnSpPr>
-          <p:cNvPr id="16" name="직선 화살표 연결선 15">
-            <a:extLst>
-              <a:ext uri="{FF2B5EF4-FFF2-40B4-BE49-F238E27FC236}">
-                <a16:creationId xmlns:a16="http://schemas.microsoft.com/office/drawing/2014/main" id="{247224D6-4BAB-98C0-8B10-7323A3F184CC}"/>
+          <p:cNvPr id="6" name="직선 화살표 연결선 5">
+            <a:extLst>
+              <a:ext uri="{FF2B5EF4-FFF2-40B4-BE49-F238E27FC236}">
+                <a16:creationId xmlns:a16="http://schemas.microsoft.com/office/drawing/2014/main" id="{6318B518-1612-16E2-400F-3D1FCAB88C20}"/>
               </a:ext>
             </a:extLst>
           </p:cNvPr>
           <p:cNvCxnSpPr>
             <a:cxnSpLocks/>
-            <a:stCxn id="9" idx="3"/>
-            <a:endCxn id="15" idx="1"/>
+            <a:stCxn id="4" idx="3"/>
+            <a:endCxn id="5" idx="1"/>
           </p:cNvCxnSpPr>
           <p:nvPr/>
         </p:nvCxnSpPr>
         <p:spPr>
           <a:xfrm>
-            <a:off x="4253044" y="947035"/>
-            <a:ext cx="680267" cy="0"/>
+            <a:off x="4253044" y="5921027"/>
+            <a:ext cx="749880" cy="0"/>
           </a:xfrm>
           <a:prstGeom prst="straightConnector1">
             <a:avLst/>
@@ -7612,12 +4640,98 @@
           </a:fontRef>
         </p:style>
       </p:cxnSp>
-      <p:sp>
-        <p:nvSpPr>
-          <p:cNvPr id="20" name="직사각형 19">
-            <a:extLst>
-              <a:ext uri="{FF2B5EF4-FFF2-40B4-BE49-F238E27FC236}">
-                <a16:creationId xmlns:a16="http://schemas.microsoft.com/office/drawing/2014/main" id="{A5D91493-3D40-5959-F45E-27828396AB97}"/>
+      <p:cxnSp>
+        <p:nvCxnSpPr>
+          <p:cNvPr id="7" name="직선 화살표 연결선 6">
+            <a:extLst>
+              <a:ext uri="{FF2B5EF4-FFF2-40B4-BE49-F238E27FC236}">
+                <a16:creationId xmlns:a16="http://schemas.microsoft.com/office/drawing/2014/main" id="{35DBA2E6-A38C-4879-361F-7AC601289669}"/>
+              </a:ext>
+            </a:extLst>
+          </p:cNvPr>
+          <p:cNvCxnSpPr>
+            <a:cxnSpLocks/>
+            <a:stCxn id="2" idx="3"/>
+            <a:endCxn id="4" idx="1"/>
+          </p:cNvCxnSpPr>
+          <p:nvPr/>
+        </p:nvCxnSpPr>
+        <p:spPr>
+          <a:xfrm>
+            <a:off x="1404740" y="3361531"/>
+            <a:ext cx="662152" cy="2559496"/>
+          </a:xfrm>
+          <a:prstGeom prst="straightConnector1">
+            <a:avLst/>
+          </a:prstGeom>
+          <a:ln>
+            <a:tailEnd type="triangle"/>
+          </a:ln>
+        </p:spPr>
+        <p:style>
+          <a:lnRef idx="3">
+            <a:schemeClr val="accent1"/>
+          </a:lnRef>
+          <a:fillRef idx="0">
+            <a:schemeClr val="accent1"/>
+          </a:fillRef>
+          <a:effectRef idx="2">
+            <a:schemeClr val="accent1"/>
+          </a:effectRef>
+          <a:fontRef idx="minor">
+            <a:schemeClr val="tx1"/>
+          </a:fontRef>
+        </p:style>
+      </p:cxnSp>
+      <p:cxnSp>
+        <p:nvCxnSpPr>
+          <p:cNvPr id="12" name="직선 화살표 연결선 11">
+            <a:extLst>
+              <a:ext uri="{FF2B5EF4-FFF2-40B4-BE49-F238E27FC236}">
+                <a16:creationId xmlns:a16="http://schemas.microsoft.com/office/drawing/2014/main" id="{51F2E450-6369-BB45-5192-403F005C9CD4}"/>
+              </a:ext>
+            </a:extLst>
+          </p:cNvPr>
+          <p:cNvCxnSpPr>
+            <a:cxnSpLocks/>
+            <a:stCxn id="5" idx="3"/>
+            <a:endCxn id="28" idx="1"/>
+          </p:cNvCxnSpPr>
+          <p:nvPr/>
+        </p:nvCxnSpPr>
+        <p:spPr>
+          <a:xfrm flipV="1">
+            <a:off x="7189076" y="4416345"/>
+            <a:ext cx="1103617" cy="1504682"/>
+          </a:xfrm>
+          <a:prstGeom prst="straightConnector1">
+            <a:avLst/>
+          </a:prstGeom>
+          <a:ln>
+            <a:tailEnd type="triangle"/>
+          </a:ln>
+        </p:spPr>
+        <p:style>
+          <a:lnRef idx="3">
+            <a:schemeClr val="accent1"/>
+          </a:lnRef>
+          <a:fillRef idx="0">
+            <a:schemeClr val="accent1"/>
+          </a:fillRef>
+          <a:effectRef idx="2">
+            <a:schemeClr val="accent1"/>
+          </a:effectRef>
+          <a:fontRef idx="minor">
+            <a:schemeClr val="tx1"/>
+          </a:fontRef>
+        </p:style>
+      </p:cxnSp>
+      <p:sp>
+        <p:nvSpPr>
+          <p:cNvPr id="27" name="직사각형 26">
+            <a:extLst>
+              <a:ext uri="{FF2B5EF4-FFF2-40B4-BE49-F238E27FC236}">
+                <a16:creationId xmlns:a16="http://schemas.microsoft.com/office/drawing/2014/main" id="{B2B9A638-4282-001F-2729-F7F1FEE51958}"/>
               </a:ext>
             </a:extLst>
           </p:cNvPr>
@@ -7626,8 +4740,8 @@
         </p:nvSpPr>
         <p:spPr>
           <a:xfrm>
-            <a:off x="8759077" y="363716"/>
-            <a:ext cx="2186152" cy="1072055"/>
+            <a:off x="3512305" y="1946406"/>
+            <a:ext cx="2186152" cy="699299"/>
           </a:xfrm>
           <a:prstGeom prst="rect">
             <a:avLst/>
@@ -7663,7 +4777,7 @@
             <a:pPr algn="ctr"/>
             <a:r>
               <a:rPr kumimoji="1" lang="en-US" altLang="ko-Kore-KR" dirty="0"/>
-              <a:t>List</a:t>
+              <a:t>Handler</a:t>
             </a:r>
             <a:endParaRPr kumimoji="1" lang="ko-Kore-KR" altLang="en-US" dirty="0"/>
           </a:p>
@@ -7671,225 +4785,24 @@
       </p:sp>
       <p:cxnSp>
         <p:nvCxnSpPr>
-          <p:cNvPr id="21" name="직선 화살표 연결선 20">
-            <a:extLst>
-              <a:ext uri="{FF2B5EF4-FFF2-40B4-BE49-F238E27FC236}">
-                <a16:creationId xmlns:a16="http://schemas.microsoft.com/office/drawing/2014/main" id="{B462A973-7519-A8A8-FCE8-3A02F897B323}"/>
+          <p:cNvPr id="33" name="직선 화살표 연결선 32">
+            <a:extLst>
+              <a:ext uri="{FF2B5EF4-FFF2-40B4-BE49-F238E27FC236}">
+                <a16:creationId xmlns:a16="http://schemas.microsoft.com/office/drawing/2014/main" id="{42639CD4-5821-9882-53A5-620A117AF502}"/>
               </a:ext>
             </a:extLst>
           </p:cNvPr>
           <p:cNvCxnSpPr>
             <a:cxnSpLocks/>
-            <a:stCxn id="15" idx="3"/>
-            <a:endCxn id="28" idx="1"/>
-          </p:cNvCxnSpPr>
-          <p:nvPr/>
-        </p:nvCxnSpPr>
-        <p:spPr>
-          <a:xfrm>
-            <a:off x="7119463" y="947035"/>
-            <a:ext cx="546538" cy="3469310"/>
-          </a:xfrm>
-          <a:prstGeom prst="straightConnector1">
-            <a:avLst/>
-          </a:prstGeom>
-          <a:ln>
-            <a:tailEnd type="triangle"/>
-          </a:ln>
-        </p:spPr>
-        <p:style>
-          <a:lnRef idx="3">
-            <a:schemeClr val="accent1"/>
-          </a:lnRef>
-          <a:fillRef idx="0">
-            <a:schemeClr val="accent1"/>
-          </a:fillRef>
-          <a:effectRef idx="2">
-            <a:schemeClr val="accent1"/>
-          </a:effectRef>
-          <a:fontRef idx="minor">
-            <a:schemeClr val="tx1"/>
-          </a:fontRef>
-        </p:style>
-      </p:cxnSp>
-      <p:sp>
-        <p:nvSpPr>
-          <p:cNvPr id="25" name="직사각형 24">
-            <a:extLst>
-              <a:ext uri="{FF2B5EF4-FFF2-40B4-BE49-F238E27FC236}">
-                <a16:creationId xmlns:a16="http://schemas.microsoft.com/office/drawing/2014/main" id="{AA843219-B5B5-D6ED-4ED9-900121BB2A5B}"/>
-              </a:ext>
-            </a:extLst>
-          </p:cNvPr>
-          <p:cNvSpPr/>
-          <p:nvPr/>
-        </p:nvSpPr>
-        <p:spPr>
-          <a:xfrm>
-            <a:off x="8759077" y="1971800"/>
-            <a:ext cx="2186152" cy="1072055"/>
-          </a:xfrm>
-          <a:prstGeom prst="rect">
-            <a:avLst/>
-          </a:prstGeom>
-        </p:spPr>
-        <p:style>
-          <a:lnRef idx="2">
-            <a:schemeClr val="accent1">
-              <a:shade val="50000"/>
-            </a:schemeClr>
-          </a:lnRef>
-          <a:fillRef idx="1">
-            <a:schemeClr val="accent1"/>
-          </a:fillRef>
-          <a:effectRef idx="0">
-            <a:schemeClr val="accent1"/>
-          </a:effectRef>
-          <a:fontRef idx="minor">
-            <a:schemeClr val="lt1"/>
-          </a:fontRef>
-        </p:style>
-        <p:txBody>
-          <a:bodyPr rtlCol="0" anchor="ctr"/>
-          <a:lstStyle/>
-          <a:p>
-            <a:pPr algn="ctr"/>
-            <a:r>
-              <a:rPr kumimoji="1" lang="en-US" altLang="ko-Kore-KR" dirty="0" err="1"/>
-              <a:t>AbstractList</a:t>
-            </a:r>
-            <a:endParaRPr kumimoji="1" lang="en-US" altLang="ko-Kore-KR" dirty="0"/>
-          </a:p>
-          <a:p>
-            <a:pPr algn="ctr"/>
-            <a:r>
-              <a:rPr kumimoji="1" lang="en-US" altLang="ko-Kore-KR" dirty="0"/>
-              <a:t>class</a:t>
-            </a:r>
-            <a:endParaRPr kumimoji="1" lang="ko-Kore-KR" altLang="en-US" dirty="0"/>
-          </a:p>
-        </p:txBody>
-      </p:sp>
-      <p:sp>
-        <p:nvSpPr>
-          <p:cNvPr id="26" name="직사각형 25">
-            <a:extLst>
-              <a:ext uri="{FF2B5EF4-FFF2-40B4-BE49-F238E27FC236}">
-                <a16:creationId xmlns:a16="http://schemas.microsoft.com/office/drawing/2014/main" id="{B6A2C458-B2EF-A010-713F-608E65465688}"/>
-              </a:ext>
-            </a:extLst>
-          </p:cNvPr>
-          <p:cNvSpPr/>
-          <p:nvPr/>
-        </p:nvSpPr>
-        <p:spPr>
-          <a:xfrm>
-            <a:off x="9931536" y="3885422"/>
-            <a:ext cx="2186152" cy="1072055"/>
-          </a:xfrm>
-          <a:prstGeom prst="rect">
-            <a:avLst/>
-          </a:prstGeom>
-        </p:spPr>
-        <p:style>
-          <a:lnRef idx="2">
-            <a:schemeClr val="accent1">
-              <a:shade val="50000"/>
-            </a:schemeClr>
-          </a:lnRef>
-          <a:fillRef idx="1">
-            <a:schemeClr val="accent1"/>
-          </a:fillRef>
-          <a:effectRef idx="0">
-            <a:schemeClr val="accent1"/>
-          </a:effectRef>
-          <a:fontRef idx="minor">
-            <a:schemeClr val="lt1"/>
-          </a:fontRef>
-        </p:style>
-        <p:txBody>
-          <a:bodyPr rtlCol="0" anchor="ctr"/>
-          <a:lstStyle/>
-          <a:p>
-            <a:pPr algn="ctr"/>
-            <a:r>
-              <a:rPr kumimoji="1" lang="en-US" altLang="ko-Kore-KR" dirty="0" err="1"/>
-              <a:t>ObjectList</a:t>
-            </a:r>
-            <a:endParaRPr kumimoji="1" lang="ko-Kore-KR" altLang="en-US" dirty="0"/>
-          </a:p>
-        </p:txBody>
-      </p:sp>
-      <p:sp>
-        <p:nvSpPr>
-          <p:cNvPr id="28" name="직사각형 27">
-            <a:extLst>
-              <a:ext uri="{FF2B5EF4-FFF2-40B4-BE49-F238E27FC236}">
-                <a16:creationId xmlns:a16="http://schemas.microsoft.com/office/drawing/2014/main" id="{AE36AB7C-DF80-4421-7E6A-2E168B3DEBED}"/>
-              </a:ext>
-            </a:extLst>
-          </p:cNvPr>
-          <p:cNvSpPr/>
-          <p:nvPr/>
-        </p:nvSpPr>
-        <p:spPr>
-          <a:xfrm>
-            <a:off x="7666001" y="3880317"/>
-            <a:ext cx="2186152" cy="1072055"/>
-          </a:xfrm>
-          <a:prstGeom prst="rect">
-            <a:avLst/>
-          </a:prstGeom>
-        </p:spPr>
-        <p:style>
-          <a:lnRef idx="2">
-            <a:schemeClr val="accent1">
-              <a:shade val="50000"/>
-            </a:schemeClr>
-          </a:lnRef>
-          <a:fillRef idx="1">
-            <a:schemeClr val="accent1"/>
-          </a:fillRef>
-          <a:effectRef idx="0">
-            <a:schemeClr val="accent1"/>
-          </a:effectRef>
-          <a:fontRef idx="minor">
-            <a:schemeClr val="lt1"/>
-          </a:fontRef>
-        </p:style>
-        <p:txBody>
-          <a:bodyPr rtlCol="0" anchor="ctr"/>
-          <a:lstStyle/>
-          <a:p>
-            <a:pPr algn="ctr"/>
-            <a:r>
-              <a:rPr kumimoji="1" lang="en-US" altLang="ko-Kore-KR" dirty="0"/>
-              <a:t>LinkedList</a:t>
-            </a:r>
-            <a:endParaRPr kumimoji="1" lang="ko-Kore-KR" altLang="en-US" dirty="0"/>
-          </a:p>
-        </p:txBody>
-      </p:sp>
-      <p:cxnSp>
-        <p:nvCxnSpPr>
-          <p:cNvPr id="32" name="직선 화살표 연결선 31">
-            <a:extLst>
-              <a:ext uri="{FF2B5EF4-FFF2-40B4-BE49-F238E27FC236}">
-                <a16:creationId xmlns:a16="http://schemas.microsoft.com/office/drawing/2014/main" id="{A17D4700-9BAC-0B87-DD68-51C04FA272DF}"/>
-              </a:ext>
-            </a:extLst>
-          </p:cNvPr>
-          <p:cNvCxnSpPr>
-            <a:cxnSpLocks/>
-            <a:stCxn id="25" idx="0"/>
-            <a:endCxn id="20" idx="2"/>
+            <a:stCxn id="10" idx="0"/>
+            <a:endCxn id="27" idx="2"/>
           </p:cNvCxnSpPr>
           <p:nvPr/>
         </p:nvCxnSpPr>
         <p:spPr>
           <a:xfrm flipV="1">
-            <a:off x="9852153" y="1435771"/>
-            <a:ext cx="0" cy="536029"/>
+            <a:off x="4605381" y="2645705"/>
+            <a:ext cx="0" cy="286786"/>
           </a:xfrm>
           <a:prstGeom prst="straightConnector1">
             <a:avLst/>
@@ -7921,10 +4834,10 @@
       </p:cxnSp>
       <p:sp>
         <p:nvSpPr>
-          <p:cNvPr id="36" name="삼각형 35">
-            <a:extLst>
-              <a:ext uri="{FF2B5EF4-FFF2-40B4-BE49-F238E27FC236}">
-                <a16:creationId xmlns:a16="http://schemas.microsoft.com/office/drawing/2014/main" id="{D89647EE-DBA6-34E6-E991-9414BC135FAB}"/>
+          <p:cNvPr id="34" name="삼각형 33">
+            <a:extLst>
+              <a:ext uri="{FF2B5EF4-FFF2-40B4-BE49-F238E27FC236}">
+                <a16:creationId xmlns:a16="http://schemas.microsoft.com/office/drawing/2014/main" id="{EDFB6E85-CE2C-964F-4DE7-E19E8B0F27B2}"/>
               </a:ext>
             </a:extLst>
           </p:cNvPr>
@@ -7933,7 +4846,7 @@
         </p:nvSpPr>
         <p:spPr>
           <a:xfrm>
-            <a:off x="9761519" y="1459424"/>
+            <a:off x="4514747" y="2652562"/>
             <a:ext cx="181267" cy="156265"/>
           </a:xfrm>
           <a:prstGeom prst="triangle">
@@ -7965,98 +4878,110 @@
           </a:p>
         </p:txBody>
       </p:sp>
-      <p:cxnSp>
-        <p:nvCxnSpPr>
-          <p:cNvPr id="37" name="직선 화살표 연결선 36">
-            <a:extLst>
-              <a:ext uri="{FF2B5EF4-FFF2-40B4-BE49-F238E27FC236}">
-                <a16:creationId xmlns:a16="http://schemas.microsoft.com/office/drawing/2014/main" id="{C430C6E5-4CA9-877D-A25F-4D7A062795EA}"/>
-              </a:ext>
-            </a:extLst>
-          </p:cNvPr>
-          <p:cNvCxnSpPr>
-            <a:cxnSpLocks/>
-            <a:stCxn id="26" idx="0"/>
-            <a:endCxn id="25" idx="2"/>
-          </p:cNvCxnSpPr>
+      <p:sp>
+        <p:nvSpPr>
+          <p:cNvPr id="3" name="TextBox 2">
+            <a:extLst>
+              <a:ext uri="{FF2B5EF4-FFF2-40B4-BE49-F238E27FC236}">
+                <a16:creationId xmlns:a16="http://schemas.microsoft.com/office/drawing/2014/main" id="{E31FCE8E-D75E-EBC0-B98A-401A2E27B3A6}"/>
+              </a:ext>
+            </a:extLst>
+          </p:cNvPr>
+          <p:cNvSpPr txBox="1"/>
           <p:nvPr/>
-        </p:nvCxnSpPr>
+        </p:nvSpPr>
         <p:spPr>
-          <a:xfrm flipH="1" flipV="1">
-            <a:off x="9852153" y="3043855"/>
-            <a:ext cx="1172459" cy="841567"/>
+          <a:xfrm>
+            <a:off x="1204728" y="1908510"/>
+            <a:ext cx="1135118" cy="369332"/>
           </a:xfrm>
-          <a:prstGeom prst="straightConnector1">
+          <a:prstGeom prst="rect">
             <a:avLst/>
           </a:prstGeom>
-          <a:ln>
-            <a:tailEnd type="triangle"/>
-          </a:ln>
         </p:spPr>
         <p:style>
-          <a:lnRef idx="3">
+          <a:lnRef idx="2">
             <a:schemeClr val="accent1"/>
           </a:lnRef>
-          <a:fillRef idx="0">
-            <a:schemeClr val="accent1"/>
+          <a:fillRef idx="1">
+            <a:schemeClr val="lt1"/>
           </a:fillRef>
-          <a:effectRef idx="2">
+          <a:effectRef idx="0">
             <a:schemeClr val="accent1"/>
           </a:effectRef>
           <a:fontRef idx="minor">
-            <a:schemeClr val="tx1"/>
+            <a:schemeClr val="dk1"/>
           </a:fontRef>
         </p:style>
-      </p:cxnSp>
-      <p:cxnSp>
-        <p:nvCxnSpPr>
-          <p:cNvPr id="40" name="직선 화살표 연결선 39">
-            <a:extLst>
-              <a:ext uri="{FF2B5EF4-FFF2-40B4-BE49-F238E27FC236}">
-                <a16:creationId xmlns:a16="http://schemas.microsoft.com/office/drawing/2014/main" id="{06DA23D7-374F-A885-6FD6-35A7BE9156E9}"/>
-              </a:ext>
-            </a:extLst>
-          </p:cNvPr>
-          <p:cNvCxnSpPr>
-            <a:cxnSpLocks/>
-            <a:stCxn id="28" idx="0"/>
-            <a:endCxn id="25" idx="2"/>
-          </p:cNvCxnSpPr>
+        <p:txBody>
+          <a:bodyPr wrap="square" rtlCol="0">
+            <a:spAutoFit/>
+          </a:bodyPr>
+          <a:lstStyle/>
+          <a:p>
+            <a:r>
+              <a:rPr kumimoji="1" lang="en-US" altLang="ko-Kore-KR" dirty="0"/>
+              <a:t>execute()</a:t>
+            </a:r>
+            <a:endParaRPr kumimoji="1" lang="ko-Kore-KR" altLang="en-US" dirty="0"/>
+          </a:p>
+        </p:txBody>
+      </p:sp>
+      <p:sp>
+        <p:nvSpPr>
+          <p:cNvPr id="8" name="TextBox 7">
+            <a:extLst>
+              <a:ext uri="{FF2B5EF4-FFF2-40B4-BE49-F238E27FC236}">
+                <a16:creationId xmlns:a16="http://schemas.microsoft.com/office/drawing/2014/main" id="{F337DC02-9690-5ABE-D634-AD7CCBE96AD3}"/>
+              </a:ext>
+            </a:extLst>
+          </p:cNvPr>
+          <p:cNvSpPr txBox="1"/>
           <p:nvPr/>
-        </p:nvCxnSpPr>
+        </p:nvSpPr>
         <p:spPr>
-          <a:xfrm flipV="1">
-            <a:off x="8759077" y="3043855"/>
-            <a:ext cx="1093076" cy="836462"/>
+          <a:xfrm>
+            <a:off x="1064450" y="4546572"/>
+            <a:ext cx="1135118" cy="369332"/>
           </a:xfrm>
-          <a:prstGeom prst="straightConnector1">
+          <a:prstGeom prst="rect">
             <a:avLst/>
           </a:prstGeom>
-          <a:ln>
-            <a:tailEnd type="triangle"/>
-          </a:ln>
         </p:spPr>
         <p:style>
-          <a:lnRef idx="3">
+          <a:lnRef idx="2">
             <a:schemeClr val="accent1"/>
           </a:lnRef>
-          <a:fillRef idx="0">
-            <a:schemeClr val="accent1"/>
+          <a:fillRef idx="1">
+            <a:schemeClr val="lt1"/>
           </a:fillRef>
-          <a:effectRef idx="2">
+          <a:effectRef idx="0">
             <a:schemeClr val="accent1"/>
           </a:effectRef>
           <a:fontRef idx="minor">
-            <a:schemeClr val="tx1"/>
+            <a:schemeClr val="dk1"/>
           </a:fontRef>
         </p:style>
-      </p:cxnSp>
-      <p:sp>
-        <p:nvSpPr>
-          <p:cNvPr id="4" name="직사각형 3">
-            <a:extLst>
-              <a:ext uri="{FF2B5EF4-FFF2-40B4-BE49-F238E27FC236}">
-                <a16:creationId xmlns:a16="http://schemas.microsoft.com/office/drawing/2014/main" id="{8281B416-959B-2160-1391-6C77AAF98A90}"/>
+        <p:txBody>
+          <a:bodyPr wrap="square" rtlCol="0">
+            <a:spAutoFit/>
+          </a:bodyPr>
+          <a:lstStyle/>
+          <a:p>
+            <a:r>
+              <a:rPr kumimoji="1" lang="en-US" altLang="ko-Kore-KR" dirty="0"/>
+              <a:t>execute()</a:t>
+            </a:r>
+            <a:endParaRPr kumimoji="1" lang="ko-Kore-KR" altLang="en-US" dirty="0"/>
+          </a:p>
+        </p:txBody>
+      </p:sp>
+      <p:sp>
+        <p:nvSpPr>
+          <p:cNvPr id="10" name="직사각형 9">
+            <a:extLst>
+              <a:ext uri="{FF2B5EF4-FFF2-40B4-BE49-F238E27FC236}">
+                <a16:creationId xmlns:a16="http://schemas.microsoft.com/office/drawing/2014/main" id="{E1A2EB96-3BE0-BB5B-B786-B283C8BE823E}"/>
               </a:ext>
             </a:extLst>
           </p:cNvPr>
@@ -8065,7 +4990,7 @@
         </p:nvSpPr>
         <p:spPr>
           <a:xfrm>
-            <a:off x="2066892" y="5384999"/>
+            <a:off x="3512305" y="2932491"/>
             <a:ext cx="2186152" cy="1072055"/>
           </a:xfrm>
           <a:prstGeom prst="rect">
@@ -8095,14 +5020,14 @@
             <a:pPr algn="ctr"/>
             <a:r>
               <a:rPr kumimoji="1" lang="en-US" altLang="ko-Kore-KR" dirty="0"/>
-              <a:t>&lt;&lt;Concrete&gt;&gt;</a:t>
+              <a:t>&lt;&lt;abstract&gt;&gt;</a:t>
             </a:r>
           </a:p>
           <a:p>
             <a:pPr algn="ctr"/>
             <a:r>
               <a:rPr kumimoji="1" lang="en-US" altLang="ko-Kore-KR" dirty="0" err="1"/>
-              <a:t>MemberHandler</a:t>
+              <a:t>AbstractHandler</a:t>
             </a:r>
             <a:endParaRPr kumimoji="1" lang="en-US" altLang="ko-Kore-KR" dirty="0"/>
           </a:p>
@@ -8116,84 +5041,26 @@
           </a:p>
         </p:txBody>
       </p:sp>
-      <p:sp>
-        <p:nvSpPr>
-          <p:cNvPr id="5" name="직사각형 4">
-            <a:extLst>
-              <a:ext uri="{FF2B5EF4-FFF2-40B4-BE49-F238E27FC236}">
-                <a16:creationId xmlns:a16="http://schemas.microsoft.com/office/drawing/2014/main" id="{9BE81465-3947-9868-D87A-BDE88683111A}"/>
-              </a:ext>
-            </a:extLst>
-          </p:cNvPr>
-          <p:cNvSpPr/>
-          <p:nvPr/>
-        </p:nvSpPr>
-        <p:spPr>
-          <a:xfrm>
-            <a:off x="4797935" y="5384999"/>
-            <a:ext cx="2186152" cy="1072055"/>
-          </a:xfrm>
-          <a:prstGeom prst="rect">
-            <a:avLst/>
-          </a:prstGeom>
-        </p:spPr>
-        <p:style>
-          <a:lnRef idx="2">
-            <a:schemeClr val="accent1">
-              <a:shade val="50000"/>
-            </a:schemeClr>
-          </a:lnRef>
-          <a:fillRef idx="1">
-            <a:schemeClr val="accent1"/>
-          </a:fillRef>
-          <a:effectRef idx="0">
-            <a:schemeClr val="accent1"/>
-          </a:effectRef>
-          <a:fontRef idx="minor">
-            <a:schemeClr val="lt1"/>
-          </a:fontRef>
-        </p:style>
-        <p:txBody>
-          <a:bodyPr rtlCol="0" anchor="ctr"/>
-          <a:lstStyle/>
-          <a:p>
-            <a:pPr algn="ctr"/>
-            <a:r>
-              <a:rPr kumimoji="1" lang="en-US" altLang="ko-Kore-KR" dirty="0" err="1"/>
-              <a:t>MemberDao</a:t>
-            </a:r>
-            <a:endParaRPr kumimoji="1" lang="en-US" altLang="ko-Kore-KR" dirty="0"/>
-          </a:p>
-          <a:p>
-            <a:pPr algn="ctr"/>
-            <a:r>
-              <a:rPr kumimoji="1" lang="en-US" altLang="ko-Kore-KR" dirty="0"/>
-              <a:t>class</a:t>
-            </a:r>
-            <a:endParaRPr kumimoji="1" lang="ko-Kore-KR" altLang="en-US" dirty="0"/>
-          </a:p>
-        </p:txBody>
-      </p:sp>
       <p:cxnSp>
         <p:nvCxnSpPr>
-          <p:cNvPr id="6" name="직선 화살표 연결선 5">
-            <a:extLst>
-              <a:ext uri="{FF2B5EF4-FFF2-40B4-BE49-F238E27FC236}">
-                <a16:creationId xmlns:a16="http://schemas.microsoft.com/office/drawing/2014/main" id="{6318B518-1612-16E2-400F-3D1FCAB88C20}"/>
+          <p:cNvPr id="17" name="직선 화살표 연결선 16">
+            <a:extLst>
+              <a:ext uri="{FF2B5EF4-FFF2-40B4-BE49-F238E27FC236}">
+                <a16:creationId xmlns:a16="http://schemas.microsoft.com/office/drawing/2014/main" id="{56B64B1F-4DBB-AA64-AC07-F0E571BCC02B}"/>
               </a:ext>
             </a:extLst>
           </p:cNvPr>
           <p:cNvCxnSpPr>
             <a:cxnSpLocks/>
-            <a:stCxn id="4" idx="3"/>
-            <a:endCxn id="5" idx="1"/>
+            <a:stCxn id="9" idx="2"/>
+            <a:endCxn id="10" idx="1"/>
           </p:cNvCxnSpPr>
           <p:nvPr/>
         </p:nvCxnSpPr>
         <p:spPr>
           <a:xfrm>
-            <a:off x="4253044" y="5921027"/>
-            <a:ext cx="544891" cy="0"/>
+            <a:off x="3214380" y="1374036"/>
+            <a:ext cx="297925" cy="2094483"/>
           </a:xfrm>
           <a:prstGeom prst="straightConnector1">
             <a:avLst/>
@@ -8219,24 +5086,24 @@
       </p:cxnSp>
       <p:cxnSp>
         <p:nvCxnSpPr>
-          <p:cNvPr id="7" name="직선 화살표 연결선 6">
-            <a:extLst>
-              <a:ext uri="{FF2B5EF4-FFF2-40B4-BE49-F238E27FC236}">
-                <a16:creationId xmlns:a16="http://schemas.microsoft.com/office/drawing/2014/main" id="{35DBA2E6-A38C-4879-361F-7AC601289669}"/>
+          <p:cNvPr id="52" name="직선 화살표 연결선 51">
+            <a:extLst>
+              <a:ext uri="{FF2B5EF4-FFF2-40B4-BE49-F238E27FC236}">
+                <a16:creationId xmlns:a16="http://schemas.microsoft.com/office/drawing/2014/main" id="{E1811206-14D5-38EE-B5A4-E98FEDA27ADA}"/>
               </a:ext>
             </a:extLst>
           </p:cNvPr>
           <p:cNvCxnSpPr>
             <a:cxnSpLocks/>
-            <a:stCxn id="2" idx="3"/>
-            <a:endCxn id="4" idx="1"/>
+            <a:stCxn id="4" idx="0"/>
+            <a:endCxn id="10" idx="1"/>
           </p:cNvCxnSpPr>
           <p:nvPr/>
         </p:nvCxnSpPr>
         <p:spPr>
-          <a:xfrm>
-            <a:off x="1404740" y="3361531"/>
-            <a:ext cx="662152" cy="2559496"/>
+          <a:xfrm flipV="1">
+            <a:off x="3159968" y="3468519"/>
+            <a:ext cx="352337" cy="1916480"/>
           </a:xfrm>
           <a:prstGeom prst="straightConnector1">
             <a:avLst/>
@@ -8260,296 +5127,6 @@
           </a:fontRef>
         </p:style>
       </p:cxnSp>
-      <p:cxnSp>
-        <p:nvCxnSpPr>
-          <p:cNvPr id="12" name="직선 화살표 연결선 11">
-            <a:extLst>
-              <a:ext uri="{FF2B5EF4-FFF2-40B4-BE49-F238E27FC236}">
-                <a16:creationId xmlns:a16="http://schemas.microsoft.com/office/drawing/2014/main" id="{51F2E450-6369-BB45-5192-403F005C9CD4}"/>
-              </a:ext>
-            </a:extLst>
-          </p:cNvPr>
-          <p:cNvCxnSpPr>
-            <a:cxnSpLocks/>
-            <a:stCxn id="5" idx="3"/>
-            <a:endCxn id="28" idx="1"/>
-          </p:cNvCxnSpPr>
-          <p:nvPr/>
-        </p:nvCxnSpPr>
-        <p:spPr>
-          <a:xfrm flipV="1">
-            <a:off x="6984087" y="4416345"/>
-            <a:ext cx="681914" cy="1504682"/>
-          </a:xfrm>
-          <a:prstGeom prst="straightConnector1">
-            <a:avLst/>
-          </a:prstGeom>
-          <a:ln>
-            <a:tailEnd type="triangle"/>
-          </a:ln>
-        </p:spPr>
-        <p:style>
-          <a:lnRef idx="3">
-            <a:schemeClr val="accent1"/>
-          </a:lnRef>
-          <a:fillRef idx="0">
-            <a:schemeClr val="accent1"/>
-          </a:fillRef>
-          <a:effectRef idx="2">
-            <a:schemeClr val="accent1"/>
-          </a:effectRef>
-          <a:fontRef idx="minor">
-            <a:schemeClr val="tx1"/>
-          </a:fontRef>
-        </p:style>
-      </p:cxnSp>
-      <p:sp>
-        <p:nvSpPr>
-          <p:cNvPr id="27" name="직사각형 26">
-            <a:extLst>
-              <a:ext uri="{FF2B5EF4-FFF2-40B4-BE49-F238E27FC236}">
-                <a16:creationId xmlns:a16="http://schemas.microsoft.com/office/drawing/2014/main" id="{B2B9A638-4282-001F-2729-F7F1FEE51958}"/>
-              </a:ext>
-            </a:extLst>
-          </p:cNvPr>
-          <p:cNvSpPr/>
-          <p:nvPr/>
-        </p:nvSpPr>
-        <p:spPr>
-          <a:xfrm>
-            <a:off x="2066892" y="2825503"/>
-            <a:ext cx="2186152" cy="1072055"/>
-          </a:xfrm>
-          <a:prstGeom prst="rect">
-            <a:avLst/>
-          </a:prstGeom>
-        </p:spPr>
-        <p:style>
-          <a:lnRef idx="2">
-            <a:schemeClr val="accent1">
-              <a:shade val="50000"/>
-            </a:schemeClr>
-          </a:lnRef>
-          <a:fillRef idx="1">
-            <a:schemeClr val="accent1"/>
-          </a:fillRef>
-          <a:effectRef idx="0">
-            <a:schemeClr val="accent1"/>
-          </a:effectRef>
-          <a:fontRef idx="minor">
-            <a:schemeClr val="lt1"/>
-          </a:fontRef>
-        </p:style>
-        <p:txBody>
-          <a:bodyPr rtlCol="0" anchor="ctr"/>
-          <a:lstStyle/>
-          <a:p>
-            <a:pPr algn="ctr"/>
-            <a:r>
-              <a:rPr kumimoji="1" lang="en-US" altLang="ko-Kore-KR" dirty="0"/>
-              <a:t>&lt;&lt;Interface&gt;&gt;</a:t>
-            </a:r>
-          </a:p>
-          <a:p>
-            <a:pPr algn="ctr"/>
-            <a:r>
-              <a:rPr kumimoji="1" lang="en-US" altLang="ko-Kore-KR" dirty="0"/>
-              <a:t>Handler</a:t>
-            </a:r>
-            <a:endParaRPr kumimoji="1" lang="ko-Kore-KR" altLang="en-US" dirty="0"/>
-          </a:p>
-        </p:txBody>
-      </p:sp>
-      <p:cxnSp>
-        <p:nvCxnSpPr>
-          <p:cNvPr id="29" name="직선 화살표 연결선 28">
-            <a:extLst>
-              <a:ext uri="{FF2B5EF4-FFF2-40B4-BE49-F238E27FC236}">
-                <a16:creationId xmlns:a16="http://schemas.microsoft.com/office/drawing/2014/main" id="{388763F5-AA32-41A0-4555-6BA3DD3935CD}"/>
-              </a:ext>
-            </a:extLst>
-          </p:cNvPr>
-          <p:cNvCxnSpPr>
-            <a:cxnSpLocks/>
-            <a:stCxn id="4" idx="0"/>
-            <a:endCxn id="27" idx="2"/>
-          </p:cNvCxnSpPr>
-          <p:nvPr/>
-        </p:nvCxnSpPr>
-        <p:spPr>
-          <a:xfrm flipV="1">
-            <a:off x="3159968" y="3897558"/>
-            <a:ext cx="0" cy="1487441"/>
-          </a:xfrm>
-          <a:prstGeom prst="straightConnector1">
-            <a:avLst/>
-          </a:prstGeom>
-          <a:ln w="9525" cap="flat" cmpd="sng" algn="ctr">
-            <a:solidFill>
-              <a:schemeClr val="accent1"/>
-            </a:solidFill>
-            <a:prstDash val="dash"/>
-            <a:round/>
-            <a:headEnd type="none" w="med" len="med"/>
-            <a:tailEnd type="none" w="med" len="med"/>
-          </a:ln>
-        </p:spPr>
-        <p:style>
-          <a:lnRef idx="0">
-            <a:scrgbClr r="0" g="0" b="0"/>
-          </a:lnRef>
-          <a:fillRef idx="0">
-            <a:scrgbClr r="0" g="0" b="0"/>
-          </a:fillRef>
-          <a:effectRef idx="0">
-            <a:scrgbClr r="0" g="0" b="0"/>
-          </a:effectRef>
-          <a:fontRef idx="minor">
-            <a:schemeClr val="tx1"/>
-          </a:fontRef>
-        </p:style>
-      </p:cxnSp>
-      <p:sp>
-        <p:nvSpPr>
-          <p:cNvPr id="30" name="삼각형 29">
-            <a:extLst>
-              <a:ext uri="{FF2B5EF4-FFF2-40B4-BE49-F238E27FC236}">
-                <a16:creationId xmlns:a16="http://schemas.microsoft.com/office/drawing/2014/main" id="{9F4B673C-7935-6F18-1034-E13000627D20}"/>
-              </a:ext>
-            </a:extLst>
-          </p:cNvPr>
-          <p:cNvSpPr/>
-          <p:nvPr/>
-        </p:nvSpPr>
-        <p:spPr>
-          <a:xfrm>
-            <a:off x="3069334" y="3921211"/>
-            <a:ext cx="181267" cy="156265"/>
-          </a:xfrm>
-          <a:prstGeom prst="triangle">
-            <a:avLst/>
-          </a:prstGeom>
-        </p:spPr>
-        <p:style>
-          <a:lnRef idx="2">
-            <a:schemeClr val="accent1">
-              <a:shade val="50000"/>
-            </a:schemeClr>
-          </a:lnRef>
-          <a:fillRef idx="1">
-            <a:schemeClr val="accent1"/>
-          </a:fillRef>
-          <a:effectRef idx="0">
-            <a:schemeClr val="accent1"/>
-          </a:effectRef>
-          <a:fontRef idx="minor">
-            <a:schemeClr val="lt1"/>
-          </a:fontRef>
-        </p:style>
-        <p:txBody>
-          <a:bodyPr rtlCol="0" anchor="ctr"/>
-          <a:lstStyle/>
-          <a:p>
-            <a:pPr algn="ctr"/>
-            <a:endParaRPr kumimoji="1" lang="ko-Kore-KR" altLang="en-US"/>
-          </a:p>
-        </p:txBody>
-      </p:sp>
-      <p:cxnSp>
-        <p:nvCxnSpPr>
-          <p:cNvPr id="33" name="직선 화살표 연결선 32">
-            <a:extLst>
-              <a:ext uri="{FF2B5EF4-FFF2-40B4-BE49-F238E27FC236}">
-                <a16:creationId xmlns:a16="http://schemas.microsoft.com/office/drawing/2014/main" id="{42639CD4-5821-9882-53A5-620A117AF502}"/>
-              </a:ext>
-            </a:extLst>
-          </p:cNvPr>
-          <p:cNvCxnSpPr>
-            <a:cxnSpLocks/>
-            <a:stCxn id="27" idx="0"/>
-            <a:endCxn id="9" idx="2"/>
-          </p:cNvCxnSpPr>
-          <p:nvPr/>
-        </p:nvCxnSpPr>
-        <p:spPr>
-          <a:xfrm flipV="1">
-            <a:off x="3159968" y="1483062"/>
-            <a:ext cx="0" cy="1342441"/>
-          </a:xfrm>
-          <a:prstGeom prst="straightConnector1">
-            <a:avLst/>
-          </a:prstGeom>
-          <a:ln w="9525" cap="flat" cmpd="sng" algn="ctr">
-            <a:solidFill>
-              <a:schemeClr val="accent1"/>
-            </a:solidFill>
-            <a:prstDash val="dash"/>
-            <a:round/>
-            <a:headEnd type="none" w="med" len="med"/>
-            <a:tailEnd type="none" w="med" len="med"/>
-          </a:ln>
-        </p:spPr>
-        <p:style>
-          <a:lnRef idx="0">
-            <a:scrgbClr r="0" g="0" b="0"/>
-          </a:lnRef>
-          <a:fillRef idx="0">
-            <a:scrgbClr r="0" g="0" b="0"/>
-          </a:fillRef>
-          <a:effectRef idx="0">
-            <a:scrgbClr r="0" g="0" b="0"/>
-          </a:effectRef>
-          <a:fontRef idx="minor">
-            <a:schemeClr val="tx1"/>
-          </a:fontRef>
-        </p:style>
-      </p:cxnSp>
-      <p:sp>
-        <p:nvSpPr>
-          <p:cNvPr id="34" name="삼각형 33">
-            <a:extLst>
-              <a:ext uri="{FF2B5EF4-FFF2-40B4-BE49-F238E27FC236}">
-                <a16:creationId xmlns:a16="http://schemas.microsoft.com/office/drawing/2014/main" id="{EDFB6E85-CE2C-964F-4DE7-E19E8B0F27B2}"/>
-              </a:ext>
-            </a:extLst>
-          </p:cNvPr>
-          <p:cNvSpPr/>
-          <p:nvPr/>
-        </p:nvSpPr>
-        <p:spPr>
-          <a:xfrm rot="10800000">
-            <a:off x="3069334" y="2622782"/>
-            <a:ext cx="181267" cy="156265"/>
-          </a:xfrm>
-          <a:prstGeom prst="triangle">
-            <a:avLst/>
-          </a:prstGeom>
-        </p:spPr>
-        <p:style>
-          <a:lnRef idx="2">
-            <a:schemeClr val="accent1">
-              <a:shade val="50000"/>
-            </a:schemeClr>
-          </a:lnRef>
-          <a:fillRef idx="1">
-            <a:schemeClr val="accent1"/>
-          </a:fillRef>
-          <a:effectRef idx="0">
-            <a:schemeClr val="accent1"/>
-          </a:effectRef>
-          <a:fontRef idx="minor">
-            <a:schemeClr val="lt1"/>
-          </a:fontRef>
-        </p:style>
-        <p:txBody>
-          <a:bodyPr rtlCol="0" anchor="ctr"/>
-          <a:lstStyle/>
-          <a:p>
-            <a:pPr algn="ctr"/>
-            <a:endParaRPr kumimoji="1" lang="ko-Kore-KR" altLang="en-US"/>
-          </a:p>
-        </p:txBody>
-      </p:sp>
     </p:spTree>
     <p:extLst>
       <p:ext uri="{BB962C8B-B14F-4D97-AF65-F5344CB8AC3E}">

</xml_diff>

<commit_message>
board-app Add BoardHandler - service method
</commit_message>
<xml_diff>
--- a/study-note/자바/2022-08-04 내용정리 .pptx
+++ b/study-note/자바/2022-08-04 내용정리 .pptx
@@ -3769,6 +3769,49 @@
           <a:chExt cx="0" cy="0"/>
         </a:xfrm>
       </p:grpSpPr>
+      <p:cxnSp>
+        <p:nvCxnSpPr>
+          <p:cNvPr id="52" name="직선 화살표 연결선 51">
+            <a:extLst>
+              <a:ext uri="{FF2B5EF4-FFF2-40B4-BE49-F238E27FC236}">
+                <a16:creationId xmlns:a16="http://schemas.microsoft.com/office/drawing/2014/main" id="{E1811206-14D5-38EE-B5A4-E98FEDA27ADA}"/>
+              </a:ext>
+            </a:extLst>
+          </p:cNvPr>
+          <p:cNvCxnSpPr>
+            <a:cxnSpLocks/>
+            <a:stCxn id="4" idx="0"/>
+            <a:endCxn id="10" idx="2"/>
+          </p:cNvCxnSpPr>
+          <p:nvPr/>
+        </p:nvCxnSpPr>
+        <p:spPr>
+          <a:xfrm flipH="1" flipV="1">
+            <a:off x="4139313" y="2753206"/>
+            <a:ext cx="3749" cy="2073994"/>
+          </a:xfrm>
+          <a:prstGeom prst="straightConnector1">
+            <a:avLst/>
+          </a:prstGeom>
+          <a:ln>
+            <a:tailEnd type="triangle"/>
+          </a:ln>
+        </p:spPr>
+        <p:style>
+          <a:lnRef idx="3">
+            <a:schemeClr val="accent1"/>
+          </a:lnRef>
+          <a:fillRef idx="0">
+            <a:schemeClr val="accent1"/>
+          </a:fillRef>
+          <a:effectRef idx="2">
+            <a:schemeClr val="accent1"/>
+          </a:effectRef>
+          <a:fontRef idx="minor">
+            <a:schemeClr val="tx1"/>
+          </a:fontRef>
+        </p:style>
+      </p:cxnSp>
       <p:sp>
         <p:nvSpPr>
           <p:cNvPr id="2" name="직사각형 1">
@@ -3783,7 +3826,7 @@
         </p:nvSpPr>
         <p:spPr>
           <a:xfrm>
-            <a:off x="80436" y="2825503"/>
+            <a:off x="118153" y="4036249"/>
             <a:ext cx="1324304" cy="1072055"/>
           </a:xfrm>
           <a:prstGeom prst="rect">
@@ -3840,7 +3883,7 @@
         </p:nvSpPr>
         <p:spPr>
           <a:xfrm>
-            <a:off x="2121304" y="301981"/>
+            <a:off x="3048352" y="3429000"/>
             <a:ext cx="2186152" cy="1072055"/>
           </a:xfrm>
           <a:prstGeom prst="rect">
@@ -3909,8 +3952,8 @@
         </p:nvCxnSpPr>
         <p:spPr>
           <a:xfrm flipV="1">
-            <a:off x="1404740" y="838009"/>
-            <a:ext cx="716564" cy="2523522"/>
+            <a:off x="1442457" y="3965028"/>
+            <a:ext cx="1605895" cy="607249"/>
           </a:xfrm>
           <a:prstGeom prst="straightConnector1">
             <a:avLst/>
@@ -3948,7 +3991,108 @@
         </p:nvSpPr>
         <p:spPr>
           <a:xfrm>
-            <a:off x="5871183" y="301982"/>
+            <a:off x="6323831" y="3423679"/>
+            <a:ext cx="1546429" cy="1072055"/>
+          </a:xfrm>
+          <a:prstGeom prst="rect">
+            <a:avLst/>
+          </a:prstGeom>
+        </p:spPr>
+        <p:style>
+          <a:lnRef idx="2">
+            <a:schemeClr val="accent1">
+              <a:shade val="50000"/>
+            </a:schemeClr>
+          </a:lnRef>
+          <a:fillRef idx="1">
+            <a:schemeClr val="accent1"/>
+          </a:fillRef>
+          <a:effectRef idx="0">
+            <a:schemeClr val="accent1"/>
+          </a:effectRef>
+          <a:fontRef idx="minor">
+            <a:schemeClr val="lt1"/>
+          </a:fontRef>
+        </p:style>
+        <p:txBody>
+          <a:bodyPr rtlCol="0" anchor="ctr"/>
+          <a:lstStyle/>
+          <a:p>
+            <a:pPr algn="ctr"/>
+            <a:r>
+              <a:rPr kumimoji="1" lang="en-US" altLang="ko-Kore-KR" dirty="0" err="1"/>
+              <a:t>BoardDao</a:t>
+            </a:r>
+            <a:endParaRPr kumimoji="1" lang="en-US" altLang="ko-Kore-KR" dirty="0"/>
+          </a:p>
+          <a:p>
+            <a:pPr algn="ctr"/>
+            <a:r>
+              <a:rPr kumimoji="1" lang="en-US" altLang="ko-Kore-KR" dirty="0"/>
+              <a:t>class</a:t>
+            </a:r>
+            <a:endParaRPr kumimoji="1" lang="ko-Kore-KR" altLang="en-US" dirty="0"/>
+          </a:p>
+        </p:txBody>
+      </p:sp>
+      <p:cxnSp>
+        <p:nvCxnSpPr>
+          <p:cNvPr id="16" name="직선 화살표 연결선 15">
+            <a:extLst>
+              <a:ext uri="{FF2B5EF4-FFF2-40B4-BE49-F238E27FC236}">
+                <a16:creationId xmlns:a16="http://schemas.microsoft.com/office/drawing/2014/main" id="{247224D6-4BAB-98C0-8B10-7323A3F184CC}"/>
+              </a:ext>
+            </a:extLst>
+          </p:cNvPr>
+          <p:cNvCxnSpPr>
+            <a:cxnSpLocks/>
+            <a:stCxn id="9" idx="3"/>
+            <a:endCxn id="15" idx="1"/>
+          </p:cNvCxnSpPr>
+          <p:nvPr/>
+        </p:nvCxnSpPr>
+        <p:spPr>
+          <a:xfrm flipV="1">
+            <a:off x="5234504" y="3959707"/>
+            <a:ext cx="1089327" cy="5321"/>
+          </a:xfrm>
+          <a:prstGeom prst="straightConnector1">
+            <a:avLst/>
+          </a:prstGeom>
+          <a:ln>
+            <a:tailEnd type="triangle"/>
+          </a:ln>
+        </p:spPr>
+        <p:style>
+          <a:lnRef idx="3">
+            <a:schemeClr val="accent1"/>
+          </a:lnRef>
+          <a:fillRef idx="0">
+            <a:schemeClr val="accent1"/>
+          </a:fillRef>
+          <a:effectRef idx="2">
+            <a:schemeClr val="accent1"/>
+          </a:effectRef>
+          <a:fontRef idx="minor">
+            <a:schemeClr val="tx1"/>
+          </a:fontRef>
+        </p:style>
+      </p:cxnSp>
+      <p:sp>
+        <p:nvSpPr>
+          <p:cNvPr id="20" name="직사각형 19">
+            <a:extLst>
+              <a:ext uri="{FF2B5EF4-FFF2-40B4-BE49-F238E27FC236}">
+                <a16:creationId xmlns:a16="http://schemas.microsoft.com/office/drawing/2014/main" id="{A5D91493-3D40-5959-F45E-27828396AB97}"/>
+              </a:ext>
+            </a:extLst>
+          </p:cNvPr>
+          <p:cNvSpPr/>
+          <p:nvPr/>
+        </p:nvSpPr>
+        <p:spPr>
+          <a:xfrm>
+            <a:off x="9164670" y="514543"/>
             <a:ext cx="2186152" cy="1072055"/>
           </a:xfrm>
           <a:prstGeom prst="rect">
@@ -3977,16 +4121,15 @@
           <a:p>
             <a:pPr algn="ctr"/>
             <a:r>
-              <a:rPr kumimoji="1" lang="en-US" altLang="ko-Kore-KR" dirty="0" err="1"/>
-              <a:t>BoardDao</a:t>
-            </a:r>
-            <a:endParaRPr kumimoji="1" lang="en-US" altLang="ko-Kore-KR" dirty="0"/>
+              <a:rPr kumimoji="1" lang="en-US" altLang="ko-Kore-KR" dirty="0"/>
+              <a:t>&lt;&lt;Interface&gt;&gt;</a:t>
+            </a:r>
           </a:p>
           <a:p>
             <a:pPr algn="ctr"/>
             <a:r>
               <a:rPr kumimoji="1" lang="en-US" altLang="ko-Kore-KR" dirty="0"/>
-              <a:t>class</a:t>
+              <a:t>List</a:t>
             </a:r>
             <a:endParaRPr kumimoji="1" lang="ko-Kore-KR" altLang="en-US" dirty="0"/>
           </a:p>
@@ -3994,24 +4137,24 @@
       </p:sp>
       <p:cxnSp>
         <p:nvCxnSpPr>
-          <p:cNvPr id="16" name="직선 화살표 연결선 15">
-            <a:extLst>
-              <a:ext uri="{FF2B5EF4-FFF2-40B4-BE49-F238E27FC236}">
-                <a16:creationId xmlns:a16="http://schemas.microsoft.com/office/drawing/2014/main" id="{247224D6-4BAB-98C0-8B10-7323A3F184CC}"/>
+          <p:cNvPr id="21" name="직선 화살표 연결선 20">
+            <a:extLst>
+              <a:ext uri="{FF2B5EF4-FFF2-40B4-BE49-F238E27FC236}">
+                <a16:creationId xmlns:a16="http://schemas.microsoft.com/office/drawing/2014/main" id="{B462A973-7519-A8A8-FCE8-3A02F897B323}"/>
               </a:ext>
             </a:extLst>
           </p:cNvPr>
           <p:cNvCxnSpPr>
             <a:cxnSpLocks/>
-            <a:stCxn id="9" idx="3"/>
-            <a:endCxn id="15" idx="1"/>
+            <a:stCxn id="15" idx="3"/>
+            <a:endCxn id="28" idx="1"/>
           </p:cNvCxnSpPr>
           <p:nvPr/>
         </p:nvCxnSpPr>
         <p:spPr>
           <a:xfrm>
-            <a:off x="4307456" y="838009"/>
-            <a:ext cx="1563727" cy="1"/>
+            <a:off x="7870260" y="3959707"/>
+            <a:ext cx="897693" cy="612570"/>
           </a:xfrm>
           <a:prstGeom prst="straightConnector1">
             <a:avLst/>
@@ -4037,10 +4180,10 @@
       </p:cxnSp>
       <p:sp>
         <p:nvSpPr>
-          <p:cNvPr id="20" name="직사각형 19">
-            <a:extLst>
-              <a:ext uri="{FF2B5EF4-FFF2-40B4-BE49-F238E27FC236}">
-                <a16:creationId xmlns:a16="http://schemas.microsoft.com/office/drawing/2014/main" id="{A5D91493-3D40-5959-F45E-27828396AB97}"/>
+          <p:cNvPr id="25" name="직사각형 24">
+            <a:extLst>
+              <a:ext uri="{FF2B5EF4-FFF2-40B4-BE49-F238E27FC236}">
+                <a16:creationId xmlns:a16="http://schemas.microsoft.com/office/drawing/2014/main" id="{AA843219-B5B5-D6ED-4ED9-900121BB2A5B}"/>
               </a:ext>
             </a:extLst>
           </p:cNvPr>
@@ -4049,7 +4192,7 @@
         </p:nvSpPr>
         <p:spPr>
           <a:xfrm>
-            <a:off x="8759077" y="363716"/>
+            <a:off x="9164670" y="2122627"/>
             <a:ext cx="2186152" cy="1072055"/>
           </a:xfrm>
           <a:prstGeom prst="rect">
@@ -4078,79 +4221,37 @@
           <a:p>
             <a:pPr algn="ctr"/>
             <a:r>
+              <a:rPr kumimoji="1" lang="en-US" altLang="ko-Kore-KR" dirty="0" err="1"/>
+              <a:t>AbstractList</a:t>
+            </a:r>
+            <a:endParaRPr kumimoji="1" lang="en-US" altLang="ko-Kore-KR" dirty="0"/>
+          </a:p>
+          <a:p>
+            <a:pPr algn="ctr"/>
+            <a:r>
               <a:rPr kumimoji="1" lang="en-US" altLang="ko-Kore-KR" dirty="0"/>
-              <a:t>&lt;&lt;Interface&gt;&gt;</a:t>
-            </a:r>
-          </a:p>
-          <a:p>
-            <a:pPr algn="ctr"/>
-            <a:r>
-              <a:rPr kumimoji="1" lang="en-US" altLang="ko-Kore-KR" dirty="0"/>
-              <a:t>List</a:t>
+              <a:t>class</a:t>
             </a:r>
             <a:endParaRPr kumimoji="1" lang="ko-Kore-KR" altLang="en-US" dirty="0"/>
           </a:p>
         </p:txBody>
       </p:sp>
-      <p:cxnSp>
-        <p:nvCxnSpPr>
-          <p:cNvPr id="21" name="직선 화살표 연결선 20">
-            <a:extLst>
-              <a:ext uri="{FF2B5EF4-FFF2-40B4-BE49-F238E27FC236}">
-                <a16:creationId xmlns:a16="http://schemas.microsoft.com/office/drawing/2014/main" id="{B462A973-7519-A8A8-FCE8-3A02F897B323}"/>
-              </a:ext>
-            </a:extLst>
-          </p:cNvPr>
-          <p:cNvCxnSpPr>
-            <a:cxnSpLocks/>
-            <a:stCxn id="15" idx="3"/>
-            <a:endCxn id="28" idx="1"/>
-          </p:cNvCxnSpPr>
+      <p:sp>
+        <p:nvSpPr>
+          <p:cNvPr id="26" name="직사각형 25">
+            <a:extLst>
+              <a:ext uri="{FF2B5EF4-FFF2-40B4-BE49-F238E27FC236}">
+                <a16:creationId xmlns:a16="http://schemas.microsoft.com/office/drawing/2014/main" id="{B6A2C458-B2EF-A010-713F-608E65465688}"/>
+              </a:ext>
+            </a:extLst>
+          </p:cNvPr>
+          <p:cNvSpPr/>
           <p:nvPr/>
-        </p:nvCxnSpPr>
+        </p:nvSpPr>
         <p:spPr>
           <a:xfrm>
-            <a:off x="8057335" y="838010"/>
-            <a:ext cx="235358" cy="3578335"/>
-          </a:xfrm>
-          <a:prstGeom prst="straightConnector1">
-            <a:avLst/>
-          </a:prstGeom>
-          <a:ln>
-            <a:tailEnd type="triangle"/>
-          </a:ln>
-        </p:spPr>
-        <p:style>
-          <a:lnRef idx="3">
-            <a:schemeClr val="accent1"/>
-          </a:lnRef>
-          <a:fillRef idx="0">
-            <a:schemeClr val="accent1"/>
-          </a:fillRef>
-          <a:effectRef idx="2">
-            <a:schemeClr val="accent1"/>
-          </a:effectRef>
-          <a:fontRef idx="minor">
-            <a:schemeClr val="tx1"/>
-          </a:fontRef>
-        </p:style>
-      </p:cxnSp>
-      <p:sp>
-        <p:nvSpPr>
-          <p:cNvPr id="25" name="직사각형 24">
-            <a:extLst>
-              <a:ext uri="{FF2B5EF4-FFF2-40B4-BE49-F238E27FC236}">
-                <a16:creationId xmlns:a16="http://schemas.microsoft.com/office/drawing/2014/main" id="{AA843219-B5B5-D6ED-4ED9-900121BB2A5B}"/>
-              </a:ext>
-            </a:extLst>
-          </p:cNvPr>
-          <p:cNvSpPr/>
-          <p:nvPr/>
-        </p:nvSpPr>
-        <p:spPr>
-          <a:xfrm>
-            <a:off x="8759077" y="1971800"/>
-            <a:ext cx="2186152" cy="1072055"/>
+            <a:off x="10333380" y="4036249"/>
+            <a:ext cx="1521404" cy="1072055"/>
           </a:xfrm>
           <a:prstGeom prst="rect">
             <a:avLst/>
@@ -4179,15 +4280,7 @@
             <a:pPr algn="ctr"/>
             <a:r>
               <a:rPr kumimoji="1" lang="en-US" altLang="ko-Kore-KR" dirty="0" err="1"/>
-              <a:t>AbstractList</a:t>
-            </a:r>
-            <a:endParaRPr kumimoji="1" lang="en-US" altLang="ko-Kore-KR" dirty="0"/>
-          </a:p>
-          <a:p>
-            <a:pPr algn="ctr"/>
-            <a:r>
-              <a:rPr kumimoji="1" lang="en-US" altLang="ko-Kore-KR" dirty="0"/>
-              <a:t>class</a:t>
+              <a:t>ObjectList</a:t>
             </a:r>
             <a:endParaRPr kumimoji="1" lang="ko-Kore-KR" altLang="en-US" dirty="0"/>
           </a:p>
@@ -4195,10 +4288,10 @@
       </p:sp>
       <p:sp>
         <p:nvSpPr>
-          <p:cNvPr id="26" name="직사각형 25">
-            <a:extLst>
-              <a:ext uri="{FF2B5EF4-FFF2-40B4-BE49-F238E27FC236}">
-                <a16:creationId xmlns:a16="http://schemas.microsoft.com/office/drawing/2014/main" id="{B6A2C458-B2EF-A010-713F-608E65465688}"/>
+          <p:cNvPr id="28" name="직사각형 27">
+            <a:extLst>
+              <a:ext uri="{FF2B5EF4-FFF2-40B4-BE49-F238E27FC236}">
+                <a16:creationId xmlns:a16="http://schemas.microsoft.com/office/drawing/2014/main" id="{AE36AB7C-DF80-4421-7E6A-2E168B3DEBED}"/>
               </a:ext>
             </a:extLst>
           </p:cNvPr>
@@ -4207,8 +4300,8 @@
         </p:nvSpPr>
         <p:spPr>
           <a:xfrm>
-            <a:off x="10322868" y="3885422"/>
-            <a:ext cx="1794819" cy="1072055"/>
+            <a:off x="8767953" y="4036249"/>
+            <a:ext cx="1521403" cy="1072055"/>
           </a:xfrm>
           <a:prstGeom prst="rect">
             <a:avLst/>
@@ -4236,56 +4329,6 @@
           <a:p>
             <a:pPr algn="ctr"/>
             <a:r>
-              <a:rPr kumimoji="1" lang="en-US" altLang="ko-Kore-KR" dirty="0" err="1"/>
-              <a:t>ObjectList</a:t>
-            </a:r>
-            <a:endParaRPr kumimoji="1" lang="ko-Kore-KR" altLang="en-US" dirty="0"/>
-          </a:p>
-        </p:txBody>
-      </p:sp>
-      <p:sp>
-        <p:nvSpPr>
-          <p:cNvPr id="28" name="직사각형 27">
-            <a:extLst>
-              <a:ext uri="{FF2B5EF4-FFF2-40B4-BE49-F238E27FC236}">
-                <a16:creationId xmlns:a16="http://schemas.microsoft.com/office/drawing/2014/main" id="{AE36AB7C-DF80-4421-7E6A-2E168B3DEBED}"/>
-              </a:ext>
-            </a:extLst>
-          </p:cNvPr>
-          <p:cNvSpPr/>
-          <p:nvPr/>
-        </p:nvSpPr>
-        <p:spPr>
-          <a:xfrm>
-            <a:off x="8292693" y="3880317"/>
-            <a:ext cx="1794818" cy="1072055"/>
-          </a:xfrm>
-          <a:prstGeom prst="rect">
-            <a:avLst/>
-          </a:prstGeom>
-        </p:spPr>
-        <p:style>
-          <a:lnRef idx="2">
-            <a:schemeClr val="accent1">
-              <a:shade val="50000"/>
-            </a:schemeClr>
-          </a:lnRef>
-          <a:fillRef idx="1">
-            <a:schemeClr val="accent1"/>
-          </a:fillRef>
-          <a:effectRef idx="0">
-            <a:schemeClr val="accent1"/>
-          </a:effectRef>
-          <a:fontRef idx="minor">
-            <a:schemeClr val="lt1"/>
-          </a:fontRef>
-        </p:style>
-        <p:txBody>
-          <a:bodyPr rtlCol="0" anchor="ctr"/>
-          <a:lstStyle/>
-          <a:p>
-            <a:pPr algn="ctr"/>
-            <a:r>
               <a:rPr kumimoji="1" lang="en-US" altLang="ko-Kore-KR" dirty="0"/>
               <a:t>LinkedList</a:t>
             </a:r>
@@ -4311,7 +4354,7 @@
         </p:nvCxnSpPr>
         <p:spPr>
           <a:xfrm flipV="1">
-            <a:off x="9852153" y="1435771"/>
+            <a:off x="10257746" y="1586598"/>
             <a:ext cx="0" cy="536029"/>
           </a:xfrm>
           <a:prstGeom prst="straightConnector1">
@@ -4356,7 +4399,7 @@
         </p:nvSpPr>
         <p:spPr>
           <a:xfrm>
-            <a:off x="9761519" y="1459424"/>
+            <a:off x="10167112" y="1610251"/>
             <a:ext cx="181267" cy="156265"/>
           </a:xfrm>
           <a:prstGeom prst="triangle">
@@ -4406,8 +4449,8 @@
         </p:nvCxnSpPr>
         <p:spPr>
           <a:xfrm flipH="1" flipV="1">
-            <a:off x="9852153" y="3043855"/>
-            <a:ext cx="1368125" cy="841567"/>
+            <a:off x="10257746" y="3194682"/>
+            <a:ext cx="836336" cy="841567"/>
           </a:xfrm>
           <a:prstGeom prst="straightConnector1">
             <a:avLst/>
@@ -4449,8 +4492,8 @@
         </p:nvCxnSpPr>
         <p:spPr>
           <a:xfrm flipV="1">
-            <a:off x="9190102" y="3043855"/>
-            <a:ext cx="662051" cy="836462"/>
+            <a:off x="9528655" y="3194682"/>
+            <a:ext cx="729091" cy="841567"/>
           </a:xfrm>
           <a:prstGeom prst="straightConnector1">
             <a:avLst/>
@@ -4488,7 +4531,7 @@
         </p:nvSpPr>
         <p:spPr>
           <a:xfrm>
-            <a:off x="2066892" y="5384999"/>
+            <a:off x="3049986" y="4827200"/>
             <a:ext cx="2186152" cy="1072055"/>
           </a:xfrm>
           <a:prstGeom prst="rect">
@@ -4553,8 +4596,8 @@
         </p:nvSpPr>
         <p:spPr>
           <a:xfrm>
-            <a:off x="5002924" y="5384999"/>
-            <a:ext cx="2186152" cy="1072055"/>
+            <a:off x="6308379" y="4827199"/>
+            <a:ext cx="1605903" cy="1072055"/>
           </a:xfrm>
           <a:prstGeom prst="rect">
             <a:avLst/>
@@ -4614,9 +4657,9 @@
           <p:nvPr/>
         </p:nvCxnSpPr>
         <p:spPr>
-          <a:xfrm>
-            <a:off x="4253044" y="5921027"/>
-            <a:ext cx="749880" cy="0"/>
+          <a:xfrm flipV="1">
+            <a:off x="5236138" y="5363227"/>
+            <a:ext cx="1072241" cy="1"/>
           </a:xfrm>
           <a:prstGeom prst="straightConnector1">
             <a:avLst/>
@@ -4658,8 +4701,8 @@
         </p:nvCxnSpPr>
         <p:spPr>
           <a:xfrm>
-            <a:off x="1404740" y="3361531"/>
-            <a:ext cx="662152" cy="2559496"/>
+            <a:off x="1442457" y="4572277"/>
+            <a:ext cx="1607529" cy="790951"/>
           </a:xfrm>
           <a:prstGeom prst="straightConnector1">
             <a:avLst/>
@@ -4701,8 +4744,8 @@
         </p:nvCxnSpPr>
         <p:spPr>
           <a:xfrm flipV="1">
-            <a:off x="7189076" y="4416345"/>
-            <a:ext cx="1103617" cy="1504682"/>
+            <a:off x="7914282" y="4572277"/>
+            <a:ext cx="853671" cy="790950"/>
           </a:xfrm>
           <a:prstGeom prst="straightConnector1">
             <a:avLst/>
@@ -4740,7 +4783,7 @@
         </p:nvSpPr>
         <p:spPr>
           <a:xfrm>
-            <a:off x="3512305" y="1946406"/>
+            <a:off x="3048352" y="655707"/>
             <a:ext cx="2186152" cy="699299"/>
           </a:xfrm>
           <a:prstGeom prst="rect">
@@ -4794,15 +4837,15 @@
           </p:cNvPr>
           <p:cNvCxnSpPr>
             <a:cxnSpLocks/>
-            <a:stCxn id="10" idx="0"/>
-            <a:endCxn id="27" idx="2"/>
+            <a:stCxn id="27" idx="2"/>
+            <a:endCxn id="10" idx="0"/>
           </p:cNvCxnSpPr>
           <p:nvPr/>
         </p:nvCxnSpPr>
         <p:spPr>
-          <a:xfrm flipV="1">
-            <a:off x="4605381" y="2645705"/>
-            <a:ext cx="0" cy="286786"/>
+          <a:xfrm flipH="1">
+            <a:off x="4139313" y="1355006"/>
+            <a:ext cx="2115" cy="326145"/>
           </a:xfrm>
           <a:prstGeom prst="straightConnector1">
             <a:avLst/>
@@ -4846,7 +4889,7 @@
         </p:nvSpPr>
         <p:spPr>
           <a:xfrm>
-            <a:off x="4514747" y="2652562"/>
+            <a:off x="4043050" y="1365028"/>
             <a:ext cx="181267" cy="156265"/>
           </a:xfrm>
           <a:prstGeom prst="triangle">
@@ -4880,10 +4923,10 @@
       </p:sp>
       <p:sp>
         <p:nvSpPr>
-          <p:cNvPr id="3" name="TextBox 2">
-            <a:extLst>
-              <a:ext uri="{FF2B5EF4-FFF2-40B4-BE49-F238E27FC236}">
-                <a16:creationId xmlns:a16="http://schemas.microsoft.com/office/drawing/2014/main" id="{E31FCE8E-D75E-EBC0-B98A-401A2E27B3A6}"/>
+          <p:cNvPr id="8" name="TextBox 7">
+            <a:extLst>
+              <a:ext uri="{FF2B5EF4-FFF2-40B4-BE49-F238E27FC236}">
+                <a16:creationId xmlns:a16="http://schemas.microsoft.com/office/drawing/2014/main" id="{F337DC02-9690-5ABE-D634-AD7CCBE96AD3}"/>
               </a:ext>
             </a:extLst>
           </p:cNvPr>
@@ -4892,7 +4935,7 @@
         </p:nvSpPr>
         <p:spPr>
           <a:xfrm>
-            <a:off x="1204728" y="1908510"/>
+            <a:off x="1621395" y="4352000"/>
             <a:ext cx="1135118" cy="369332"/>
           </a:xfrm>
           <a:prstGeom prst="rect">
@@ -4929,68 +4972,19 @@
       </p:sp>
       <p:sp>
         <p:nvSpPr>
-          <p:cNvPr id="8" name="TextBox 7">
-            <a:extLst>
-              <a:ext uri="{FF2B5EF4-FFF2-40B4-BE49-F238E27FC236}">
-                <a16:creationId xmlns:a16="http://schemas.microsoft.com/office/drawing/2014/main" id="{F337DC02-9690-5ABE-D634-AD7CCBE96AD3}"/>
-              </a:ext>
-            </a:extLst>
-          </p:cNvPr>
-          <p:cNvSpPr txBox="1"/>
+          <p:cNvPr id="10" name="직사각형 9">
+            <a:extLst>
+              <a:ext uri="{FF2B5EF4-FFF2-40B4-BE49-F238E27FC236}">
+                <a16:creationId xmlns:a16="http://schemas.microsoft.com/office/drawing/2014/main" id="{E1A2EB96-3BE0-BB5B-B786-B283C8BE823E}"/>
+              </a:ext>
+            </a:extLst>
+          </p:cNvPr>
+          <p:cNvSpPr/>
           <p:nvPr/>
         </p:nvSpPr>
         <p:spPr>
           <a:xfrm>
-            <a:off x="1064450" y="4546572"/>
-            <a:ext cx="1135118" cy="369332"/>
-          </a:xfrm>
-          <a:prstGeom prst="rect">
-            <a:avLst/>
-          </a:prstGeom>
-        </p:spPr>
-        <p:style>
-          <a:lnRef idx="2">
-            <a:schemeClr val="accent1"/>
-          </a:lnRef>
-          <a:fillRef idx="1">
-            <a:schemeClr val="lt1"/>
-          </a:fillRef>
-          <a:effectRef idx="0">
-            <a:schemeClr val="accent1"/>
-          </a:effectRef>
-          <a:fontRef idx="minor">
-            <a:schemeClr val="dk1"/>
-          </a:fontRef>
-        </p:style>
-        <p:txBody>
-          <a:bodyPr wrap="square" rtlCol="0">
-            <a:spAutoFit/>
-          </a:bodyPr>
-          <a:lstStyle/>
-          <a:p>
-            <a:r>
-              <a:rPr kumimoji="1" lang="en-US" altLang="ko-Kore-KR" dirty="0"/>
-              <a:t>execute()</a:t>
-            </a:r>
-            <a:endParaRPr kumimoji="1" lang="ko-Kore-KR" altLang="en-US" dirty="0"/>
-          </a:p>
-        </p:txBody>
-      </p:sp>
-      <p:sp>
-        <p:nvSpPr>
-          <p:cNvPr id="10" name="직사각형 9">
-            <a:extLst>
-              <a:ext uri="{FF2B5EF4-FFF2-40B4-BE49-F238E27FC236}">
-                <a16:creationId xmlns:a16="http://schemas.microsoft.com/office/drawing/2014/main" id="{E1A2EB96-3BE0-BB5B-B786-B283C8BE823E}"/>
-              </a:ext>
-            </a:extLst>
-          </p:cNvPr>
-          <p:cNvSpPr/>
-          <p:nvPr/>
-        </p:nvSpPr>
-        <p:spPr>
-          <a:xfrm>
-            <a:off x="3512305" y="2932491"/>
+            <a:off x="3046237" y="1681151"/>
             <a:ext cx="2186152" cy="1072055"/>
           </a:xfrm>
           <a:prstGeom prst="rect">
@@ -5052,58 +5046,15 @@
           </p:cNvPr>
           <p:cNvCxnSpPr>
             <a:cxnSpLocks/>
-            <a:stCxn id="9" idx="2"/>
-            <a:endCxn id="10" idx="1"/>
+            <a:stCxn id="9" idx="0"/>
+            <a:endCxn id="10" idx="2"/>
           </p:cNvCxnSpPr>
           <p:nvPr/>
         </p:nvCxnSpPr>
         <p:spPr>
-          <a:xfrm>
-            <a:off x="3214380" y="1374036"/>
-            <a:ext cx="297925" cy="2094483"/>
-          </a:xfrm>
-          <a:prstGeom prst="straightConnector1">
-            <a:avLst/>
-          </a:prstGeom>
-          <a:ln>
-            <a:tailEnd type="triangle"/>
-          </a:ln>
-        </p:spPr>
-        <p:style>
-          <a:lnRef idx="3">
-            <a:schemeClr val="accent1"/>
-          </a:lnRef>
-          <a:fillRef idx="0">
-            <a:schemeClr val="accent1"/>
-          </a:fillRef>
-          <a:effectRef idx="2">
-            <a:schemeClr val="accent1"/>
-          </a:effectRef>
-          <a:fontRef idx="minor">
-            <a:schemeClr val="tx1"/>
-          </a:fontRef>
-        </p:style>
-      </p:cxnSp>
-      <p:cxnSp>
-        <p:nvCxnSpPr>
-          <p:cNvPr id="52" name="직선 화살표 연결선 51">
-            <a:extLst>
-              <a:ext uri="{FF2B5EF4-FFF2-40B4-BE49-F238E27FC236}">
-                <a16:creationId xmlns:a16="http://schemas.microsoft.com/office/drawing/2014/main" id="{E1811206-14D5-38EE-B5A4-E98FEDA27ADA}"/>
-              </a:ext>
-            </a:extLst>
-          </p:cNvPr>
-          <p:cNvCxnSpPr>
-            <a:cxnSpLocks/>
-            <a:stCxn id="4" idx="0"/>
-            <a:endCxn id="10" idx="1"/>
-          </p:cNvCxnSpPr>
-          <p:nvPr/>
-        </p:nvCxnSpPr>
-        <p:spPr>
-          <a:xfrm flipV="1">
-            <a:off x="3159968" y="3468519"/>
-            <a:ext cx="352337" cy="1916480"/>
+          <a:xfrm flipH="1" flipV="1">
+            <a:off x="4139313" y="2753206"/>
+            <a:ext cx="2115" cy="675794"/>
           </a:xfrm>
           <a:prstGeom prst="straightConnector1">
             <a:avLst/>

</xml_diff>

<commit_message>
board-app Delete test classes, Edit List interface to Generic
</commit_message>
<xml_diff>
--- a/study-note/자바/2022-08-04 내용정리 .pptx
+++ b/study-note/자바/2022-08-04 내용정리 .pptx
@@ -5,11 +5,12 @@
     <p:sldMasterId id="2147483648" r:id="rId1"/>
   </p:sldMasterIdLst>
   <p:notesMasterIdLst>
-    <p:notesMasterId r:id="rId4"/>
+    <p:notesMasterId r:id="rId5"/>
   </p:notesMasterIdLst>
   <p:sldIdLst>
     <p:sldId id="256" r:id="rId2"/>
     <p:sldId id="276" r:id="rId3"/>
+    <p:sldId id="277" r:id="rId4"/>
   </p:sldIdLst>
   <p:sldSz cx="12192000" cy="6858000"/>
   <p:notesSz cx="6858000" cy="9144000"/>
@@ -3769,55 +3770,12 @@
           <a:chExt cx="0" cy="0"/>
         </a:xfrm>
       </p:grpSpPr>
-      <p:cxnSp>
-        <p:nvCxnSpPr>
-          <p:cNvPr id="52" name="직선 화살표 연결선 51">
-            <a:extLst>
-              <a:ext uri="{FF2B5EF4-FFF2-40B4-BE49-F238E27FC236}">
-                <a16:creationId xmlns:a16="http://schemas.microsoft.com/office/drawing/2014/main" id="{E1811206-14D5-38EE-B5A4-E98FEDA27ADA}"/>
-              </a:ext>
-            </a:extLst>
-          </p:cNvPr>
-          <p:cNvCxnSpPr>
-            <a:cxnSpLocks/>
-            <a:stCxn id="4" idx="0"/>
-            <a:endCxn id="10" idx="2"/>
-          </p:cNvCxnSpPr>
-          <p:nvPr/>
-        </p:nvCxnSpPr>
-        <p:spPr>
-          <a:xfrm flipH="1" flipV="1">
-            <a:off x="4139313" y="2753206"/>
-            <a:ext cx="3749" cy="2073994"/>
-          </a:xfrm>
-          <a:prstGeom prst="straightConnector1">
-            <a:avLst/>
-          </a:prstGeom>
-          <a:ln>
-            <a:tailEnd type="triangle"/>
-          </a:ln>
-        </p:spPr>
-        <p:style>
-          <a:lnRef idx="3">
-            <a:schemeClr val="accent1"/>
-          </a:lnRef>
-          <a:fillRef idx="0">
-            <a:schemeClr val="accent1"/>
-          </a:fillRef>
-          <a:effectRef idx="2">
-            <a:schemeClr val="accent1"/>
-          </a:effectRef>
-          <a:fontRef idx="minor">
-            <a:schemeClr val="tx1"/>
-          </a:fontRef>
-        </p:style>
-      </p:cxnSp>
-      <p:sp>
-        <p:nvSpPr>
-          <p:cNvPr id="2" name="직사각형 1">
-            <a:extLst>
-              <a:ext uri="{FF2B5EF4-FFF2-40B4-BE49-F238E27FC236}">
-                <a16:creationId xmlns:a16="http://schemas.microsoft.com/office/drawing/2014/main" id="{01CA0D7D-5EDB-0FF9-8973-AA1A5206BCDC}"/>
+      <p:sp>
+        <p:nvSpPr>
+          <p:cNvPr id="254" name="직사각형 253">
+            <a:extLst>
+              <a:ext uri="{FF2B5EF4-FFF2-40B4-BE49-F238E27FC236}">
+                <a16:creationId xmlns:a16="http://schemas.microsoft.com/office/drawing/2014/main" id="{4FB5303A-DD5D-7BCA-50B8-EC79040F5254}"/>
               </a:ext>
             </a:extLst>
           </p:cNvPr>
@@ -3826,7 +3784,7 @@
         </p:nvSpPr>
         <p:spPr>
           <a:xfrm>
-            <a:off x="118153" y="4036249"/>
+            <a:off x="80436" y="2825503"/>
             <a:ext cx="1324304" cy="1072055"/>
           </a:xfrm>
           <a:prstGeom prst="rect">
@@ -3871,10 +3829,10 @@
       </p:sp>
       <p:sp>
         <p:nvSpPr>
-          <p:cNvPr id="9" name="직사각형 8">
-            <a:extLst>
-              <a:ext uri="{FF2B5EF4-FFF2-40B4-BE49-F238E27FC236}">
-                <a16:creationId xmlns:a16="http://schemas.microsoft.com/office/drawing/2014/main" id="{440E7F1B-8FEC-C5DF-68F0-A4A0DE25C1EA}"/>
+          <p:cNvPr id="255" name="직사각형 254">
+            <a:extLst>
+              <a:ext uri="{FF2B5EF4-FFF2-40B4-BE49-F238E27FC236}">
+                <a16:creationId xmlns:a16="http://schemas.microsoft.com/office/drawing/2014/main" id="{0A6F8338-B151-0E16-2E74-9780EBE3FDD3}"/>
               </a:ext>
             </a:extLst>
           </p:cNvPr>
@@ -3883,7 +3841,7 @@
         </p:nvSpPr>
         <p:spPr>
           <a:xfrm>
-            <a:off x="3048352" y="3429000"/>
+            <a:off x="2066892" y="411007"/>
             <a:ext cx="2186152" cy="1072055"/>
           </a:xfrm>
           <a:prstGeom prst="rect">
@@ -3936,24 +3894,24 @@
       </p:sp>
       <p:cxnSp>
         <p:nvCxnSpPr>
-          <p:cNvPr id="11" name="직선 화살표 연결선 10">
-            <a:extLst>
-              <a:ext uri="{FF2B5EF4-FFF2-40B4-BE49-F238E27FC236}">
-                <a16:creationId xmlns:a16="http://schemas.microsoft.com/office/drawing/2014/main" id="{8AB7B69B-0DE7-B72F-2F3A-A7E4F62EAA73}"/>
+          <p:cNvPr id="256" name="직선 화살표 연결선 255">
+            <a:extLst>
+              <a:ext uri="{FF2B5EF4-FFF2-40B4-BE49-F238E27FC236}">
+                <a16:creationId xmlns:a16="http://schemas.microsoft.com/office/drawing/2014/main" id="{6D2F0346-DEC3-05AF-A6B8-28841234CB35}"/>
               </a:ext>
             </a:extLst>
           </p:cNvPr>
           <p:cNvCxnSpPr>
             <a:cxnSpLocks/>
-            <a:stCxn id="2" idx="3"/>
-            <a:endCxn id="9" idx="1"/>
+            <a:stCxn id="254" idx="3"/>
+            <a:endCxn id="255" idx="1"/>
           </p:cNvCxnSpPr>
           <p:nvPr/>
         </p:nvCxnSpPr>
         <p:spPr>
           <a:xfrm flipV="1">
-            <a:off x="1442457" y="3965028"/>
-            <a:ext cx="1605895" cy="607249"/>
+            <a:off x="1404740" y="947035"/>
+            <a:ext cx="662152" cy="2414496"/>
           </a:xfrm>
           <a:prstGeom prst="straightConnector1">
             <a:avLst/>
@@ -3979,10 +3937,10 @@
       </p:cxnSp>
       <p:sp>
         <p:nvSpPr>
-          <p:cNvPr id="15" name="직사각형 14">
-            <a:extLst>
-              <a:ext uri="{FF2B5EF4-FFF2-40B4-BE49-F238E27FC236}">
-                <a16:creationId xmlns:a16="http://schemas.microsoft.com/office/drawing/2014/main" id="{69DC84EC-5B76-671D-9EA5-A6A8DF098DC7}"/>
+          <p:cNvPr id="257" name="직사각형 256">
+            <a:extLst>
+              <a:ext uri="{FF2B5EF4-FFF2-40B4-BE49-F238E27FC236}">
+                <a16:creationId xmlns:a16="http://schemas.microsoft.com/office/drawing/2014/main" id="{6D077D42-E2E1-C995-7E8A-371B9B684F66}"/>
               </a:ext>
             </a:extLst>
           </p:cNvPr>
@@ -3991,8 +3949,8 @@
         </p:nvSpPr>
         <p:spPr>
           <a:xfrm>
-            <a:off x="6323831" y="3423679"/>
-            <a:ext cx="1546429" cy="1072055"/>
+            <a:off x="4933311" y="411007"/>
+            <a:ext cx="2186152" cy="1072055"/>
           </a:xfrm>
           <a:prstGeom prst="rect">
             <a:avLst/>
@@ -4037,24 +3995,24 @@
       </p:sp>
       <p:cxnSp>
         <p:nvCxnSpPr>
-          <p:cNvPr id="16" name="직선 화살표 연결선 15">
-            <a:extLst>
-              <a:ext uri="{FF2B5EF4-FFF2-40B4-BE49-F238E27FC236}">
-                <a16:creationId xmlns:a16="http://schemas.microsoft.com/office/drawing/2014/main" id="{247224D6-4BAB-98C0-8B10-7323A3F184CC}"/>
+          <p:cNvPr id="258" name="직선 화살표 연결선 257">
+            <a:extLst>
+              <a:ext uri="{FF2B5EF4-FFF2-40B4-BE49-F238E27FC236}">
+                <a16:creationId xmlns:a16="http://schemas.microsoft.com/office/drawing/2014/main" id="{F781B8FC-EC7B-E206-1145-CAD546D7938B}"/>
               </a:ext>
             </a:extLst>
           </p:cNvPr>
           <p:cNvCxnSpPr>
             <a:cxnSpLocks/>
-            <a:stCxn id="9" idx="3"/>
-            <a:endCxn id="15" idx="1"/>
+            <a:stCxn id="255" idx="3"/>
+            <a:endCxn id="257" idx="1"/>
           </p:cNvCxnSpPr>
           <p:nvPr/>
         </p:nvCxnSpPr>
         <p:spPr>
-          <a:xfrm flipV="1">
-            <a:off x="5234504" y="3959707"/>
-            <a:ext cx="1089327" cy="5321"/>
+          <a:xfrm>
+            <a:off x="4253044" y="947035"/>
+            <a:ext cx="680267" cy="0"/>
           </a:xfrm>
           <a:prstGeom prst="straightConnector1">
             <a:avLst/>
@@ -4080,10 +4038,10 @@
       </p:cxnSp>
       <p:sp>
         <p:nvSpPr>
-          <p:cNvPr id="20" name="직사각형 19">
-            <a:extLst>
-              <a:ext uri="{FF2B5EF4-FFF2-40B4-BE49-F238E27FC236}">
-                <a16:creationId xmlns:a16="http://schemas.microsoft.com/office/drawing/2014/main" id="{A5D91493-3D40-5959-F45E-27828396AB97}"/>
+          <p:cNvPr id="259" name="직사각형 258">
+            <a:extLst>
+              <a:ext uri="{FF2B5EF4-FFF2-40B4-BE49-F238E27FC236}">
+                <a16:creationId xmlns:a16="http://schemas.microsoft.com/office/drawing/2014/main" id="{AE109D66-A818-9C6C-6B86-5496CF1FD60C}"/>
               </a:ext>
             </a:extLst>
           </p:cNvPr>
@@ -4092,7 +4050,7 @@
         </p:nvSpPr>
         <p:spPr>
           <a:xfrm>
-            <a:off x="9164670" y="514543"/>
+            <a:off x="8759077" y="363716"/>
             <a:ext cx="2186152" cy="1072055"/>
           </a:xfrm>
           <a:prstGeom prst="rect">
@@ -4137,24 +4095,24 @@
       </p:sp>
       <p:cxnSp>
         <p:nvCxnSpPr>
-          <p:cNvPr id="21" name="직선 화살표 연결선 20">
-            <a:extLst>
-              <a:ext uri="{FF2B5EF4-FFF2-40B4-BE49-F238E27FC236}">
-                <a16:creationId xmlns:a16="http://schemas.microsoft.com/office/drawing/2014/main" id="{B462A973-7519-A8A8-FCE8-3A02F897B323}"/>
+          <p:cNvPr id="260" name="직선 화살표 연결선 259">
+            <a:extLst>
+              <a:ext uri="{FF2B5EF4-FFF2-40B4-BE49-F238E27FC236}">
+                <a16:creationId xmlns:a16="http://schemas.microsoft.com/office/drawing/2014/main" id="{44CDA04F-9E1D-E16E-53B5-3FF53A506A54}"/>
               </a:ext>
             </a:extLst>
           </p:cNvPr>
           <p:cNvCxnSpPr>
             <a:cxnSpLocks/>
-            <a:stCxn id="15" idx="3"/>
-            <a:endCxn id="28" idx="1"/>
+            <a:stCxn id="257" idx="3"/>
+            <a:endCxn id="263" idx="1"/>
           </p:cNvCxnSpPr>
           <p:nvPr/>
         </p:nvCxnSpPr>
         <p:spPr>
           <a:xfrm>
-            <a:off x="7870260" y="3959707"/>
-            <a:ext cx="897693" cy="612570"/>
+            <a:off x="7119463" y="947035"/>
+            <a:ext cx="546538" cy="3469310"/>
           </a:xfrm>
           <a:prstGeom prst="straightConnector1">
             <a:avLst/>
@@ -4180,10 +4138,10 @@
       </p:cxnSp>
       <p:sp>
         <p:nvSpPr>
-          <p:cNvPr id="25" name="직사각형 24">
-            <a:extLst>
-              <a:ext uri="{FF2B5EF4-FFF2-40B4-BE49-F238E27FC236}">
-                <a16:creationId xmlns:a16="http://schemas.microsoft.com/office/drawing/2014/main" id="{AA843219-B5B5-D6ED-4ED9-900121BB2A5B}"/>
+          <p:cNvPr id="261" name="직사각형 260">
+            <a:extLst>
+              <a:ext uri="{FF2B5EF4-FFF2-40B4-BE49-F238E27FC236}">
+                <a16:creationId xmlns:a16="http://schemas.microsoft.com/office/drawing/2014/main" id="{E0179C8D-CF36-16F2-A368-E0512DD6098A}"/>
               </a:ext>
             </a:extLst>
           </p:cNvPr>
@@ -4192,7 +4150,7 @@
         </p:nvSpPr>
         <p:spPr>
           <a:xfrm>
-            <a:off x="9164670" y="2122627"/>
+            <a:off x="8759077" y="1971800"/>
             <a:ext cx="2186152" cy="1072055"/>
           </a:xfrm>
           <a:prstGeom prst="rect">
@@ -4238,10 +4196,10 @@
       </p:sp>
       <p:sp>
         <p:nvSpPr>
-          <p:cNvPr id="26" name="직사각형 25">
-            <a:extLst>
-              <a:ext uri="{FF2B5EF4-FFF2-40B4-BE49-F238E27FC236}">
-                <a16:creationId xmlns:a16="http://schemas.microsoft.com/office/drawing/2014/main" id="{B6A2C458-B2EF-A010-713F-608E65465688}"/>
+          <p:cNvPr id="262" name="직사각형 261">
+            <a:extLst>
+              <a:ext uri="{FF2B5EF4-FFF2-40B4-BE49-F238E27FC236}">
+                <a16:creationId xmlns:a16="http://schemas.microsoft.com/office/drawing/2014/main" id="{356EE8D1-938B-71C0-D06F-B3B49294DEC5}"/>
               </a:ext>
             </a:extLst>
           </p:cNvPr>
@@ -4250,8 +4208,8 @@
         </p:nvSpPr>
         <p:spPr>
           <a:xfrm>
-            <a:off x="10333380" y="4036249"/>
-            <a:ext cx="1521404" cy="1072055"/>
+            <a:off x="9931536" y="3885422"/>
+            <a:ext cx="2186152" cy="1072055"/>
           </a:xfrm>
           <a:prstGeom prst="rect">
             <a:avLst/>
@@ -4288,10 +4246,10 @@
       </p:sp>
       <p:sp>
         <p:nvSpPr>
-          <p:cNvPr id="28" name="직사각형 27">
-            <a:extLst>
-              <a:ext uri="{FF2B5EF4-FFF2-40B4-BE49-F238E27FC236}">
-                <a16:creationId xmlns:a16="http://schemas.microsoft.com/office/drawing/2014/main" id="{AE36AB7C-DF80-4421-7E6A-2E168B3DEBED}"/>
+          <p:cNvPr id="263" name="직사각형 262">
+            <a:extLst>
+              <a:ext uri="{FF2B5EF4-FFF2-40B4-BE49-F238E27FC236}">
+                <a16:creationId xmlns:a16="http://schemas.microsoft.com/office/drawing/2014/main" id="{AD08EE50-6B41-7A91-5E6D-A190A24F3D85}"/>
               </a:ext>
             </a:extLst>
           </p:cNvPr>
@@ -4300,8 +4258,8 @@
         </p:nvSpPr>
         <p:spPr>
           <a:xfrm>
-            <a:off x="8767953" y="4036249"/>
-            <a:ext cx="1521403" cy="1072055"/>
+            <a:off x="7666001" y="3880317"/>
+            <a:ext cx="2186152" cy="1072055"/>
           </a:xfrm>
           <a:prstGeom prst="rect">
             <a:avLst/>
@@ -4338,23 +4296,23 @@
       </p:sp>
       <p:cxnSp>
         <p:nvCxnSpPr>
-          <p:cNvPr id="32" name="직선 화살표 연결선 31">
-            <a:extLst>
-              <a:ext uri="{FF2B5EF4-FFF2-40B4-BE49-F238E27FC236}">
-                <a16:creationId xmlns:a16="http://schemas.microsoft.com/office/drawing/2014/main" id="{A17D4700-9BAC-0B87-DD68-51C04FA272DF}"/>
+          <p:cNvPr id="264" name="직선 화살표 연결선 263">
+            <a:extLst>
+              <a:ext uri="{FF2B5EF4-FFF2-40B4-BE49-F238E27FC236}">
+                <a16:creationId xmlns:a16="http://schemas.microsoft.com/office/drawing/2014/main" id="{93FE2817-FC78-B894-F556-94BC94A018A0}"/>
               </a:ext>
             </a:extLst>
           </p:cNvPr>
           <p:cNvCxnSpPr>
             <a:cxnSpLocks/>
-            <a:stCxn id="25" idx="0"/>
-            <a:endCxn id="20" idx="2"/>
+            <a:stCxn id="261" idx="0"/>
+            <a:endCxn id="259" idx="2"/>
           </p:cNvCxnSpPr>
           <p:nvPr/>
         </p:nvCxnSpPr>
         <p:spPr>
           <a:xfrm flipV="1">
-            <a:off x="10257746" y="1586598"/>
+            <a:off x="9852153" y="1435771"/>
             <a:ext cx="0" cy="536029"/>
           </a:xfrm>
           <a:prstGeom prst="straightConnector1">
@@ -4387,10 +4345,10 @@
       </p:cxnSp>
       <p:sp>
         <p:nvSpPr>
-          <p:cNvPr id="36" name="삼각형 35">
-            <a:extLst>
-              <a:ext uri="{FF2B5EF4-FFF2-40B4-BE49-F238E27FC236}">
-                <a16:creationId xmlns:a16="http://schemas.microsoft.com/office/drawing/2014/main" id="{D89647EE-DBA6-34E6-E991-9414BC135FAB}"/>
+          <p:cNvPr id="265" name="삼각형 264">
+            <a:extLst>
+              <a:ext uri="{FF2B5EF4-FFF2-40B4-BE49-F238E27FC236}">
+                <a16:creationId xmlns:a16="http://schemas.microsoft.com/office/drawing/2014/main" id="{D3BD2F8B-9DD0-ABC8-324A-0D6D5B746948}"/>
               </a:ext>
             </a:extLst>
           </p:cNvPr>
@@ -4399,7 +4357,7 @@
         </p:nvSpPr>
         <p:spPr>
           <a:xfrm>
-            <a:off x="10167112" y="1610251"/>
+            <a:off x="9761519" y="1459424"/>
             <a:ext cx="181267" cy="156265"/>
           </a:xfrm>
           <a:prstGeom prst="triangle">
@@ -4433,24 +4391,24 @@
       </p:sp>
       <p:cxnSp>
         <p:nvCxnSpPr>
-          <p:cNvPr id="37" name="직선 화살표 연결선 36">
-            <a:extLst>
-              <a:ext uri="{FF2B5EF4-FFF2-40B4-BE49-F238E27FC236}">
-                <a16:creationId xmlns:a16="http://schemas.microsoft.com/office/drawing/2014/main" id="{C430C6E5-4CA9-877D-A25F-4D7A062795EA}"/>
+          <p:cNvPr id="266" name="직선 화살표 연결선 265">
+            <a:extLst>
+              <a:ext uri="{FF2B5EF4-FFF2-40B4-BE49-F238E27FC236}">
+                <a16:creationId xmlns:a16="http://schemas.microsoft.com/office/drawing/2014/main" id="{DBB2B144-BC5A-D5F9-FEE6-684CCB796B1A}"/>
               </a:ext>
             </a:extLst>
           </p:cNvPr>
           <p:cNvCxnSpPr>
             <a:cxnSpLocks/>
-            <a:stCxn id="26" idx="0"/>
-            <a:endCxn id="25" idx="2"/>
+            <a:stCxn id="262" idx="0"/>
+            <a:endCxn id="261" idx="2"/>
           </p:cNvCxnSpPr>
           <p:nvPr/>
         </p:nvCxnSpPr>
         <p:spPr>
           <a:xfrm flipH="1" flipV="1">
-            <a:off x="10257746" y="3194682"/>
-            <a:ext cx="836336" cy="841567"/>
+            <a:off x="9852153" y="3043855"/>
+            <a:ext cx="1172459" cy="841567"/>
           </a:xfrm>
           <a:prstGeom prst="straightConnector1">
             <a:avLst/>
@@ -4476,24 +4434,24 @@
       </p:cxnSp>
       <p:cxnSp>
         <p:nvCxnSpPr>
-          <p:cNvPr id="40" name="직선 화살표 연결선 39">
-            <a:extLst>
-              <a:ext uri="{FF2B5EF4-FFF2-40B4-BE49-F238E27FC236}">
-                <a16:creationId xmlns:a16="http://schemas.microsoft.com/office/drawing/2014/main" id="{06DA23D7-374F-A885-6FD6-35A7BE9156E9}"/>
+          <p:cNvPr id="267" name="직선 화살표 연결선 266">
+            <a:extLst>
+              <a:ext uri="{FF2B5EF4-FFF2-40B4-BE49-F238E27FC236}">
+                <a16:creationId xmlns:a16="http://schemas.microsoft.com/office/drawing/2014/main" id="{A275AF87-B91E-6710-3559-EF8FA3E025FF}"/>
               </a:ext>
             </a:extLst>
           </p:cNvPr>
           <p:cNvCxnSpPr>
             <a:cxnSpLocks/>
-            <a:stCxn id="28" idx="0"/>
-            <a:endCxn id="25" idx="2"/>
+            <a:stCxn id="263" idx="0"/>
+            <a:endCxn id="261" idx="2"/>
           </p:cNvCxnSpPr>
           <p:nvPr/>
         </p:nvCxnSpPr>
         <p:spPr>
           <a:xfrm flipV="1">
-            <a:off x="9528655" y="3194682"/>
-            <a:ext cx="729091" cy="841567"/>
+            <a:off x="8759077" y="3043855"/>
+            <a:ext cx="1093076" cy="836462"/>
           </a:xfrm>
           <a:prstGeom prst="straightConnector1">
             <a:avLst/>
@@ -4519,10 +4477,10 @@
       </p:cxnSp>
       <p:sp>
         <p:nvSpPr>
-          <p:cNvPr id="4" name="직사각형 3">
-            <a:extLst>
-              <a:ext uri="{FF2B5EF4-FFF2-40B4-BE49-F238E27FC236}">
-                <a16:creationId xmlns:a16="http://schemas.microsoft.com/office/drawing/2014/main" id="{8281B416-959B-2160-1391-6C77AAF98A90}"/>
+          <p:cNvPr id="268" name="직사각형 267">
+            <a:extLst>
+              <a:ext uri="{FF2B5EF4-FFF2-40B4-BE49-F238E27FC236}">
+                <a16:creationId xmlns:a16="http://schemas.microsoft.com/office/drawing/2014/main" id="{A9085A46-FBAF-ADCF-F8C8-A43DB8194A44}"/>
               </a:ext>
             </a:extLst>
           </p:cNvPr>
@@ -4531,7 +4489,7 @@
         </p:nvSpPr>
         <p:spPr>
           <a:xfrm>
-            <a:off x="3049986" y="4827200"/>
+            <a:off x="1929869" y="4838910"/>
             <a:ext cx="2186152" cy="1072055"/>
           </a:xfrm>
           <a:prstGeom prst="rect">
@@ -4584,10 +4542,10 @@
       </p:sp>
       <p:sp>
         <p:nvSpPr>
-          <p:cNvPr id="5" name="직사각형 4">
-            <a:extLst>
-              <a:ext uri="{FF2B5EF4-FFF2-40B4-BE49-F238E27FC236}">
-                <a16:creationId xmlns:a16="http://schemas.microsoft.com/office/drawing/2014/main" id="{9BE81465-3947-9868-D87A-BDE88683111A}"/>
+          <p:cNvPr id="269" name="직사각형 268">
+            <a:extLst>
+              <a:ext uri="{FF2B5EF4-FFF2-40B4-BE49-F238E27FC236}">
+                <a16:creationId xmlns:a16="http://schemas.microsoft.com/office/drawing/2014/main" id="{BA5F791A-D6C3-F02D-FEDD-EDA479D8C9FA}"/>
               </a:ext>
             </a:extLst>
           </p:cNvPr>
@@ -4596,8 +4554,8 @@
         </p:nvSpPr>
         <p:spPr>
           <a:xfrm>
-            <a:off x="6308379" y="4827199"/>
-            <a:ext cx="1605903" cy="1072055"/>
+            <a:off x="4753663" y="4838909"/>
+            <a:ext cx="2186152" cy="1072055"/>
           </a:xfrm>
           <a:prstGeom prst="rect">
             <a:avLst/>
@@ -4642,24 +4600,24 @@
       </p:sp>
       <p:cxnSp>
         <p:nvCxnSpPr>
-          <p:cNvPr id="6" name="직선 화살표 연결선 5">
-            <a:extLst>
-              <a:ext uri="{FF2B5EF4-FFF2-40B4-BE49-F238E27FC236}">
-                <a16:creationId xmlns:a16="http://schemas.microsoft.com/office/drawing/2014/main" id="{6318B518-1612-16E2-400F-3D1FCAB88C20}"/>
+          <p:cNvPr id="270" name="직선 화살표 연결선 269">
+            <a:extLst>
+              <a:ext uri="{FF2B5EF4-FFF2-40B4-BE49-F238E27FC236}">
+                <a16:creationId xmlns:a16="http://schemas.microsoft.com/office/drawing/2014/main" id="{F7507426-58AB-AF01-F688-E0BE08FEA337}"/>
               </a:ext>
             </a:extLst>
           </p:cNvPr>
           <p:cNvCxnSpPr>
             <a:cxnSpLocks/>
-            <a:stCxn id="4" idx="3"/>
-            <a:endCxn id="5" idx="1"/>
+            <a:stCxn id="268" idx="3"/>
+            <a:endCxn id="269" idx="1"/>
           </p:cNvCxnSpPr>
           <p:nvPr/>
         </p:nvCxnSpPr>
         <p:spPr>
           <a:xfrm flipV="1">
-            <a:off x="5236138" y="5363227"/>
-            <a:ext cx="1072241" cy="1"/>
+            <a:off x="4116021" y="5374937"/>
+            <a:ext cx="637642" cy="1"/>
           </a:xfrm>
           <a:prstGeom prst="straightConnector1">
             <a:avLst/>
@@ -4685,24 +4643,24 @@
       </p:cxnSp>
       <p:cxnSp>
         <p:nvCxnSpPr>
-          <p:cNvPr id="7" name="직선 화살표 연결선 6">
-            <a:extLst>
-              <a:ext uri="{FF2B5EF4-FFF2-40B4-BE49-F238E27FC236}">
-                <a16:creationId xmlns:a16="http://schemas.microsoft.com/office/drawing/2014/main" id="{35DBA2E6-A38C-4879-361F-7AC601289669}"/>
+          <p:cNvPr id="271" name="직선 화살표 연결선 270">
+            <a:extLst>
+              <a:ext uri="{FF2B5EF4-FFF2-40B4-BE49-F238E27FC236}">
+                <a16:creationId xmlns:a16="http://schemas.microsoft.com/office/drawing/2014/main" id="{2524613A-50F7-5D1B-54AA-C42E0F83004E}"/>
               </a:ext>
             </a:extLst>
           </p:cNvPr>
           <p:cNvCxnSpPr>
             <a:cxnSpLocks/>
-            <a:stCxn id="2" idx="3"/>
-            <a:endCxn id="4" idx="1"/>
+            <a:stCxn id="254" idx="3"/>
+            <a:endCxn id="268" idx="1"/>
           </p:cNvCxnSpPr>
           <p:nvPr/>
         </p:nvCxnSpPr>
         <p:spPr>
           <a:xfrm>
-            <a:off x="1442457" y="4572277"/>
-            <a:ext cx="1607529" cy="790951"/>
+            <a:off x="1404740" y="3361531"/>
+            <a:ext cx="525129" cy="2013407"/>
           </a:xfrm>
           <a:prstGeom prst="straightConnector1">
             <a:avLst/>
@@ -4728,24 +4686,24 @@
       </p:cxnSp>
       <p:cxnSp>
         <p:nvCxnSpPr>
-          <p:cNvPr id="12" name="직선 화살표 연결선 11">
-            <a:extLst>
-              <a:ext uri="{FF2B5EF4-FFF2-40B4-BE49-F238E27FC236}">
-                <a16:creationId xmlns:a16="http://schemas.microsoft.com/office/drawing/2014/main" id="{51F2E450-6369-BB45-5192-403F005C9CD4}"/>
+          <p:cNvPr id="272" name="직선 화살표 연결선 271">
+            <a:extLst>
+              <a:ext uri="{FF2B5EF4-FFF2-40B4-BE49-F238E27FC236}">
+                <a16:creationId xmlns:a16="http://schemas.microsoft.com/office/drawing/2014/main" id="{8368E5BE-F33C-97C4-5D8C-2259806E9F65}"/>
               </a:ext>
             </a:extLst>
           </p:cNvPr>
           <p:cNvCxnSpPr>
             <a:cxnSpLocks/>
-            <a:stCxn id="5" idx="3"/>
-            <a:endCxn id="28" idx="1"/>
+            <a:stCxn id="269" idx="3"/>
+            <a:endCxn id="263" idx="1"/>
           </p:cNvCxnSpPr>
           <p:nvPr/>
         </p:nvCxnSpPr>
         <p:spPr>
           <a:xfrm flipV="1">
-            <a:off x="7914282" y="4572277"/>
-            <a:ext cx="853671" cy="790950"/>
+            <a:off x="6939815" y="4416345"/>
+            <a:ext cx="726186" cy="958592"/>
           </a:xfrm>
           <a:prstGeom prst="straightConnector1">
             <a:avLst/>
@@ -4771,10 +4729,10 @@
       </p:cxnSp>
       <p:sp>
         <p:nvSpPr>
-          <p:cNvPr id="27" name="직사각형 26">
-            <a:extLst>
-              <a:ext uri="{FF2B5EF4-FFF2-40B4-BE49-F238E27FC236}">
-                <a16:creationId xmlns:a16="http://schemas.microsoft.com/office/drawing/2014/main" id="{B2B9A638-4282-001F-2729-F7F1FEE51958}"/>
+          <p:cNvPr id="273" name="직사각형 272">
+            <a:extLst>
+              <a:ext uri="{FF2B5EF4-FFF2-40B4-BE49-F238E27FC236}">
+                <a16:creationId xmlns:a16="http://schemas.microsoft.com/office/drawing/2014/main" id="{D5C87ECC-8953-F000-9519-6A5E2EC9EC49}"/>
               </a:ext>
             </a:extLst>
           </p:cNvPr>
@@ -4783,8 +4741,8 @@
         </p:nvSpPr>
         <p:spPr>
           <a:xfrm>
-            <a:off x="3048352" y="655707"/>
-            <a:ext cx="2186152" cy="699299"/>
+            <a:off x="3610579" y="1689270"/>
+            <a:ext cx="2186152" cy="660013"/>
           </a:xfrm>
           <a:prstGeom prst="rect">
             <a:avLst/>
@@ -4828,24 +4786,24 @@
       </p:sp>
       <p:cxnSp>
         <p:nvCxnSpPr>
-          <p:cNvPr id="33" name="직선 화살표 연결선 32">
-            <a:extLst>
-              <a:ext uri="{FF2B5EF4-FFF2-40B4-BE49-F238E27FC236}">
-                <a16:creationId xmlns:a16="http://schemas.microsoft.com/office/drawing/2014/main" id="{42639CD4-5821-9882-53A5-620A117AF502}"/>
+          <p:cNvPr id="276" name="직선 화살표 연결선 275">
+            <a:extLst>
+              <a:ext uri="{FF2B5EF4-FFF2-40B4-BE49-F238E27FC236}">
+                <a16:creationId xmlns:a16="http://schemas.microsoft.com/office/drawing/2014/main" id="{6F096E37-8544-513F-9C8F-2203B577953A}"/>
               </a:ext>
             </a:extLst>
           </p:cNvPr>
           <p:cNvCxnSpPr>
             <a:cxnSpLocks/>
-            <a:stCxn id="27" idx="2"/>
-            <a:endCxn id="10" idx="0"/>
+            <a:stCxn id="273" idx="2"/>
+            <a:endCxn id="279" idx="0"/>
           </p:cNvCxnSpPr>
           <p:nvPr/>
         </p:nvCxnSpPr>
         <p:spPr>
-          <a:xfrm flipH="1">
-            <a:off x="4139313" y="1355006"/>
-            <a:ext cx="2115" cy="326145"/>
+          <a:xfrm>
+            <a:off x="4703655" y="2349283"/>
+            <a:ext cx="0" cy="408594"/>
           </a:xfrm>
           <a:prstGeom prst="straightConnector1">
             <a:avLst/>
@@ -4877,10 +4835,10 @@
       </p:cxnSp>
       <p:sp>
         <p:nvSpPr>
-          <p:cNvPr id="34" name="삼각형 33">
-            <a:extLst>
-              <a:ext uri="{FF2B5EF4-FFF2-40B4-BE49-F238E27FC236}">
-                <a16:creationId xmlns:a16="http://schemas.microsoft.com/office/drawing/2014/main" id="{EDFB6E85-CE2C-964F-4DE7-E19E8B0F27B2}"/>
+          <p:cNvPr id="277" name="삼각형 276">
+            <a:extLst>
+              <a:ext uri="{FF2B5EF4-FFF2-40B4-BE49-F238E27FC236}">
+                <a16:creationId xmlns:a16="http://schemas.microsoft.com/office/drawing/2014/main" id="{775A352E-6D1F-4D89-4220-6358CCFD519F}"/>
               </a:ext>
             </a:extLst>
           </p:cNvPr>
@@ -4889,7 +4847,7 @@
         </p:nvSpPr>
         <p:spPr>
           <a:xfrm>
-            <a:off x="4043050" y="1365028"/>
+            <a:off x="4628548" y="2363169"/>
             <a:ext cx="181267" cy="156265"/>
           </a:xfrm>
           <a:prstGeom prst="triangle">
@@ -4935,7 +4893,7 @@
         </p:nvSpPr>
         <p:spPr>
           <a:xfrm>
-            <a:off x="1621395" y="4352000"/>
+            <a:off x="1168257" y="2052965"/>
             <a:ext cx="1135118" cy="369332"/>
           </a:xfrm>
           <a:prstGeom prst="rect">
@@ -4972,10 +4930,59 @@
       </p:sp>
       <p:sp>
         <p:nvSpPr>
-          <p:cNvPr id="10" name="직사각형 9">
-            <a:extLst>
-              <a:ext uri="{FF2B5EF4-FFF2-40B4-BE49-F238E27FC236}">
-                <a16:creationId xmlns:a16="http://schemas.microsoft.com/office/drawing/2014/main" id="{E1A2EB96-3BE0-BB5B-B786-B283C8BE823E}"/>
+          <p:cNvPr id="278" name="TextBox 277">
+            <a:extLst>
+              <a:ext uri="{FF2B5EF4-FFF2-40B4-BE49-F238E27FC236}">
+                <a16:creationId xmlns:a16="http://schemas.microsoft.com/office/drawing/2014/main" id="{D689FD42-1A5B-15D3-1D58-9248BD37060E}"/>
+              </a:ext>
+            </a:extLst>
+          </p:cNvPr>
+          <p:cNvSpPr txBox="1"/>
+          <p:nvPr/>
+        </p:nvSpPr>
+        <p:spPr>
+          <a:xfrm>
+            <a:off x="1097079" y="4188599"/>
+            <a:ext cx="1135118" cy="369332"/>
+          </a:xfrm>
+          <a:prstGeom prst="rect">
+            <a:avLst/>
+          </a:prstGeom>
+        </p:spPr>
+        <p:style>
+          <a:lnRef idx="2">
+            <a:schemeClr val="accent1"/>
+          </a:lnRef>
+          <a:fillRef idx="1">
+            <a:schemeClr val="lt1"/>
+          </a:fillRef>
+          <a:effectRef idx="0">
+            <a:schemeClr val="accent1"/>
+          </a:effectRef>
+          <a:fontRef idx="minor">
+            <a:schemeClr val="dk1"/>
+          </a:fontRef>
+        </p:style>
+        <p:txBody>
+          <a:bodyPr wrap="square" rtlCol="0">
+            <a:spAutoFit/>
+          </a:bodyPr>
+          <a:lstStyle/>
+          <a:p>
+            <a:r>
+              <a:rPr kumimoji="1" lang="en-US" altLang="ko-Kore-KR" dirty="0"/>
+              <a:t>execute()</a:t>
+            </a:r>
+            <a:endParaRPr kumimoji="1" lang="ko-Kore-KR" altLang="en-US" dirty="0"/>
+          </a:p>
+        </p:txBody>
+      </p:sp>
+      <p:sp>
+        <p:nvSpPr>
+          <p:cNvPr id="279" name="직사각형 278">
+            <a:extLst>
+              <a:ext uri="{FF2B5EF4-FFF2-40B4-BE49-F238E27FC236}">
+                <a16:creationId xmlns:a16="http://schemas.microsoft.com/office/drawing/2014/main" id="{EDE636EB-7FE0-2E30-8F6A-025F277F0F2B}"/>
               </a:ext>
             </a:extLst>
           </p:cNvPr>
@@ -4984,7 +4991,7 @@
         </p:nvSpPr>
         <p:spPr>
           <a:xfrm>
-            <a:off x="3046237" y="1681151"/>
+            <a:off x="3610579" y="2757877"/>
             <a:ext cx="2186152" cy="1072055"/>
           </a:xfrm>
           <a:prstGeom prst="rect">
@@ -5037,24 +5044,24 @@
       </p:sp>
       <p:cxnSp>
         <p:nvCxnSpPr>
-          <p:cNvPr id="17" name="직선 화살표 연결선 16">
-            <a:extLst>
-              <a:ext uri="{FF2B5EF4-FFF2-40B4-BE49-F238E27FC236}">
-                <a16:creationId xmlns:a16="http://schemas.microsoft.com/office/drawing/2014/main" id="{56B64B1F-4DBB-AA64-AC07-F0E571BCC02B}"/>
+          <p:cNvPr id="280" name="직선 화살표 연결선 279">
+            <a:extLst>
+              <a:ext uri="{FF2B5EF4-FFF2-40B4-BE49-F238E27FC236}">
+                <a16:creationId xmlns:a16="http://schemas.microsoft.com/office/drawing/2014/main" id="{2D5942BD-3B2D-0FD4-C08D-59F4C74CEC09}"/>
               </a:ext>
             </a:extLst>
           </p:cNvPr>
           <p:cNvCxnSpPr>
             <a:cxnSpLocks/>
-            <a:stCxn id="9" idx="0"/>
-            <a:endCxn id="10" idx="2"/>
+            <a:stCxn id="255" idx="2"/>
+            <a:endCxn id="279" idx="1"/>
           </p:cNvCxnSpPr>
           <p:nvPr/>
         </p:nvCxnSpPr>
         <p:spPr>
-          <a:xfrm flipH="1" flipV="1">
-            <a:off x="4139313" y="2753206"/>
-            <a:ext cx="2115" cy="675794"/>
+          <a:xfrm>
+            <a:off x="3159968" y="1483062"/>
+            <a:ext cx="450611" cy="1810843"/>
           </a:xfrm>
           <a:prstGeom prst="straightConnector1">
             <a:avLst/>
@@ -5072,6 +5079,523 @@
           </a:fillRef>
           <a:effectRef idx="2">
             <a:schemeClr val="accent1"/>
+          </a:effectRef>
+          <a:fontRef idx="minor">
+            <a:schemeClr val="tx1"/>
+          </a:fontRef>
+        </p:style>
+      </p:cxnSp>
+      <p:cxnSp>
+        <p:nvCxnSpPr>
+          <p:cNvPr id="283" name="직선 화살표 연결선 282">
+            <a:extLst>
+              <a:ext uri="{FF2B5EF4-FFF2-40B4-BE49-F238E27FC236}">
+                <a16:creationId xmlns:a16="http://schemas.microsoft.com/office/drawing/2014/main" id="{51598370-5178-B09C-C226-F60A6EAB8168}"/>
+              </a:ext>
+            </a:extLst>
+          </p:cNvPr>
+          <p:cNvCxnSpPr>
+            <a:cxnSpLocks/>
+            <a:stCxn id="268" idx="0"/>
+            <a:endCxn id="279" idx="1"/>
+          </p:cNvCxnSpPr>
+          <p:nvPr/>
+        </p:nvCxnSpPr>
+        <p:spPr>
+          <a:xfrm flipV="1">
+            <a:off x="3022945" y="3293905"/>
+            <a:ext cx="587634" cy="1545005"/>
+          </a:xfrm>
+          <a:prstGeom prst="straightConnector1">
+            <a:avLst/>
+          </a:prstGeom>
+          <a:ln>
+            <a:tailEnd type="triangle"/>
+          </a:ln>
+        </p:spPr>
+        <p:style>
+          <a:lnRef idx="3">
+            <a:schemeClr val="accent1"/>
+          </a:lnRef>
+          <a:fillRef idx="0">
+            <a:schemeClr val="accent1"/>
+          </a:fillRef>
+          <a:effectRef idx="2">
+            <a:schemeClr val="accent1"/>
+          </a:effectRef>
+          <a:fontRef idx="minor">
+            <a:schemeClr val="tx1"/>
+          </a:fontRef>
+        </p:style>
+      </p:cxnSp>
+      <p:sp>
+        <p:nvSpPr>
+          <p:cNvPr id="295" name="TextBox 294">
+            <a:extLst>
+              <a:ext uri="{FF2B5EF4-FFF2-40B4-BE49-F238E27FC236}">
+                <a16:creationId xmlns:a16="http://schemas.microsoft.com/office/drawing/2014/main" id="{FBD75410-B048-FCB2-5351-7D0DC75CD11B}"/>
+              </a:ext>
+            </a:extLst>
+          </p:cNvPr>
+          <p:cNvSpPr txBox="1"/>
+          <p:nvPr/>
+        </p:nvSpPr>
+        <p:spPr>
+          <a:xfrm>
+            <a:off x="3636698" y="3943611"/>
+            <a:ext cx="2186152" cy="646331"/>
+          </a:xfrm>
+          <a:prstGeom prst="rect">
+            <a:avLst/>
+          </a:prstGeom>
+        </p:spPr>
+        <p:style>
+          <a:lnRef idx="2">
+            <a:schemeClr val="accent1"/>
+          </a:lnRef>
+          <a:fillRef idx="1">
+            <a:schemeClr val="lt1"/>
+          </a:fillRef>
+          <a:effectRef idx="0">
+            <a:schemeClr val="accent1"/>
+          </a:effectRef>
+          <a:fontRef idx="minor">
+            <a:schemeClr val="dk1"/>
+          </a:fontRef>
+        </p:style>
+        <p:txBody>
+          <a:bodyPr wrap="square" rtlCol="0">
+            <a:spAutoFit/>
+          </a:bodyPr>
+          <a:lstStyle/>
+          <a:p>
+            <a:pPr marL="285750" indent="-285750">
+              <a:buFont typeface="Arial" panose="020B0604020202020204" pitchFamily="34" charset="0"/>
+              <a:buChar char="•"/>
+            </a:pPr>
+            <a:r>
+              <a:rPr kumimoji="1" lang="en-US" altLang="ko-Kore-KR" dirty="0"/>
+              <a:t>execute(){}</a:t>
+            </a:r>
+          </a:p>
+          <a:p>
+            <a:pPr marL="285750" indent="-285750">
+              <a:buFont typeface="Arial" panose="020B0604020202020204" pitchFamily="34" charset="0"/>
+              <a:buChar char="•"/>
+            </a:pPr>
+            <a:r>
+              <a:rPr kumimoji="1" lang="en-US" altLang="ko-Kore-KR" dirty="0"/>
+              <a:t>service();</a:t>
+            </a:r>
+            <a:endParaRPr kumimoji="1" lang="ko-Kore-KR" altLang="en-US" dirty="0"/>
+          </a:p>
+        </p:txBody>
+      </p:sp>
+      <p:sp>
+        <p:nvSpPr>
+          <p:cNvPr id="301" name="TextBox 300">
+            <a:extLst>
+              <a:ext uri="{FF2B5EF4-FFF2-40B4-BE49-F238E27FC236}">
+                <a16:creationId xmlns:a16="http://schemas.microsoft.com/office/drawing/2014/main" id="{EBE36593-AFC7-FE82-0AEB-D1C8390BD8F1}"/>
+              </a:ext>
+            </a:extLst>
+          </p:cNvPr>
+          <p:cNvSpPr txBox="1"/>
+          <p:nvPr/>
+        </p:nvSpPr>
+        <p:spPr>
+          <a:xfrm>
+            <a:off x="1929869" y="6049629"/>
+            <a:ext cx="2186152" cy="369332"/>
+          </a:xfrm>
+          <a:prstGeom prst="rect">
+            <a:avLst/>
+          </a:prstGeom>
+        </p:spPr>
+        <p:style>
+          <a:lnRef idx="2">
+            <a:schemeClr val="accent1"/>
+          </a:lnRef>
+          <a:fillRef idx="1">
+            <a:schemeClr val="lt1"/>
+          </a:fillRef>
+          <a:effectRef idx="0">
+            <a:schemeClr val="accent1"/>
+          </a:effectRef>
+          <a:fontRef idx="minor">
+            <a:schemeClr val="dk1"/>
+          </a:fontRef>
+        </p:style>
+        <p:txBody>
+          <a:bodyPr wrap="square" rtlCol="0">
+            <a:spAutoFit/>
+          </a:bodyPr>
+          <a:lstStyle/>
+          <a:p>
+            <a:pPr marL="285750" indent="-285750">
+              <a:buFont typeface="Arial" panose="020B0604020202020204" pitchFamily="34" charset="0"/>
+              <a:buChar char="•"/>
+            </a:pPr>
+            <a:r>
+              <a:rPr kumimoji="1" lang="en-US" altLang="ko-Kore-KR" dirty="0"/>
+              <a:t>service() {};</a:t>
+            </a:r>
+            <a:endParaRPr kumimoji="1" lang="ko-Kore-KR" altLang="en-US" dirty="0"/>
+          </a:p>
+        </p:txBody>
+      </p:sp>
+      <p:sp>
+        <p:nvSpPr>
+          <p:cNvPr id="302" name="TextBox 301">
+            <a:extLst>
+              <a:ext uri="{FF2B5EF4-FFF2-40B4-BE49-F238E27FC236}">
+                <a16:creationId xmlns:a16="http://schemas.microsoft.com/office/drawing/2014/main" id="{325E2C5D-98D2-359C-05FE-7E866F25CCDF}"/>
+              </a:ext>
+            </a:extLst>
+          </p:cNvPr>
+          <p:cNvSpPr txBox="1"/>
+          <p:nvPr/>
+        </p:nvSpPr>
+        <p:spPr>
+          <a:xfrm>
+            <a:off x="4753663" y="6049629"/>
+            <a:ext cx="2186152" cy="369332"/>
+          </a:xfrm>
+          <a:prstGeom prst="rect">
+            <a:avLst/>
+          </a:prstGeom>
+        </p:spPr>
+        <p:style>
+          <a:lnRef idx="2">
+            <a:schemeClr val="accent1"/>
+          </a:lnRef>
+          <a:fillRef idx="1">
+            <a:schemeClr val="lt1"/>
+          </a:fillRef>
+          <a:effectRef idx="0">
+            <a:schemeClr val="accent1"/>
+          </a:effectRef>
+          <a:fontRef idx="minor">
+            <a:schemeClr val="dk1"/>
+          </a:fontRef>
+        </p:style>
+        <p:txBody>
+          <a:bodyPr wrap="square" rtlCol="0">
+            <a:spAutoFit/>
+          </a:bodyPr>
+          <a:lstStyle/>
+          <a:p>
+            <a:pPr marL="285750" indent="-285750">
+              <a:buFont typeface="Arial" panose="020B0604020202020204" pitchFamily="34" charset="0"/>
+              <a:buChar char="•"/>
+            </a:pPr>
+            <a:r>
+              <a:rPr kumimoji="1" lang="en-US" altLang="ko-Kore-KR" dirty="0"/>
+              <a:t>service() {};</a:t>
+            </a:r>
+            <a:endParaRPr kumimoji="1" lang="ko-Kore-KR" altLang="en-US" dirty="0"/>
+          </a:p>
+        </p:txBody>
+      </p:sp>
+      <p:sp>
+        <p:nvSpPr>
+          <p:cNvPr id="303" name="타원 302">
+            <a:extLst>
+              <a:ext uri="{FF2B5EF4-FFF2-40B4-BE49-F238E27FC236}">
+                <a16:creationId xmlns:a16="http://schemas.microsoft.com/office/drawing/2014/main" id="{10F4AE27-1F80-3AF9-CCC8-3F8160BF8772}"/>
+              </a:ext>
+            </a:extLst>
+          </p:cNvPr>
+          <p:cNvSpPr/>
+          <p:nvPr/>
+        </p:nvSpPr>
+        <p:spPr>
+          <a:xfrm>
+            <a:off x="2701160" y="2630262"/>
+            <a:ext cx="3871766" cy="2069982"/>
+          </a:xfrm>
+          <a:prstGeom prst="ellipse">
+            <a:avLst/>
+          </a:prstGeom>
+          <a:noFill/>
+          <a:ln w="41275">
+            <a:solidFill>
+              <a:schemeClr val="accent2">
+                <a:alpha val="64000"/>
+              </a:schemeClr>
+            </a:solidFill>
+          </a:ln>
+        </p:spPr>
+        <p:style>
+          <a:lnRef idx="2">
+            <a:schemeClr val="accent1">
+              <a:shade val="50000"/>
+            </a:schemeClr>
+          </a:lnRef>
+          <a:fillRef idx="1">
+            <a:schemeClr val="accent1"/>
+          </a:fillRef>
+          <a:effectRef idx="0">
+            <a:schemeClr val="accent1"/>
+          </a:effectRef>
+          <a:fontRef idx="minor">
+            <a:schemeClr val="lt1"/>
+          </a:fontRef>
+        </p:style>
+        <p:txBody>
+          <a:bodyPr rtlCol="0" anchor="ctr"/>
+          <a:lstStyle/>
+          <a:p>
+            <a:pPr algn="ctr"/>
+            <a:endParaRPr kumimoji="1" lang="ko-Kore-KR" altLang="en-US" dirty="0"/>
+          </a:p>
+        </p:txBody>
+      </p:sp>
+      <p:sp>
+        <p:nvSpPr>
+          <p:cNvPr id="309" name="TextBox 308">
+            <a:extLst>
+              <a:ext uri="{FF2B5EF4-FFF2-40B4-BE49-F238E27FC236}">
+                <a16:creationId xmlns:a16="http://schemas.microsoft.com/office/drawing/2014/main" id="{EA559852-BE11-5727-0119-2328E83159EC}"/>
+              </a:ext>
+            </a:extLst>
+          </p:cNvPr>
+          <p:cNvSpPr txBox="1"/>
+          <p:nvPr/>
+        </p:nvSpPr>
+        <p:spPr>
+          <a:xfrm>
+            <a:off x="7461169" y="5374936"/>
+            <a:ext cx="3484060" cy="369332"/>
+          </a:xfrm>
+          <a:prstGeom prst="rect">
+            <a:avLst/>
+          </a:prstGeom>
+        </p:spPr>
+        <p:style>
+          <a:lnRef idx="2">
+            <a:schemeClr val="accent2"/>
+          </a:lnRef>
+          <a:fillRef idx="1">
+            <a:schemeClr val="lt1"/>
+          </a:fillRef>
+          <a:effectRef idx="0">
+            <a:schemeClr val="accent2"/>
+          </a:effectRef>
+          <a:fontRef idx="minor">
+            <a:schemeClr val="dk1"/>
+          </a:fontRef>
+        </p:style>
+        <p:txBody>
+          <a:bodyPr wrap="square" rtlCol="0">
+            <a:spAutoFit/>
+          </a:bodyPr>
+          <a:lstStyle/>
+          <a:p>
+            <a:r>
+              <a:rPr kumimoji="1" lang="en-US" altLang="ko-Kore-KR" dirty="0"/>
+              <a:t>Template Method Pattern </a:t>
+            </a:r>
+            <a:r>
+              <a:rPr kumimoji="1" lang="ko-KR" altLang="en-US" dirty="0"/>
+              <a:t>적용</a:t>
+            </a:r>
+            <a:r>
+              <a:rPr kumimoji="1" lang="en-US" altLang="ko-KR" dirty="0"/>
+              <a:t>!</a:t>
+            </a:r>
+            <a:endParaRPr kumimoji="1" lang="ko-Kore-KR" altLang="en-US" dirty="0"/>
+          </a:p>
+        </p:txBody>
+      </p:sp>
+      <p:sp>
+        <p:nvSpPr>
+          <p:cNvPr id="314" name="타원 313">
+            <a:extLst>
+              <a:ext uri="{FF2B5EF4-FFF2-40B4-BE49-F238E27FC236}">
+                <a16:creationId xmlns:a16="http://schemas.microsoft.com/office/drawing/2014/main" id="{BB11805B-CE11-4DDD-3EFD-3DB769B72EE3}"/>
+              </a:ext>
+            </a:extLst>
+          </p:cNvPr>
+          <p:cNvSpPr/>
+          <p:nvPr/>
+        </p:nvSpPr>
+        <p:spPr>
+          <a:xfrm>
+            <a:off x="1662337" y="4826245"/>
+            <a:ext cx="2611613" cy="1836045"/>
+          </a:xfrm>
+          <a:prstGeom prst="ellipse">
+            <a:avLst/>
+          </a:prstGeom>
+          <a:noFill/>
+          <a:ln w="41275">
+            <a:solidFill>
+              <a:schemeClr val="accent2">
+                <a:alpha val="64000"/>
+              </a:schemeClr>
+            </a:solidFill>
+          </a:ln>
+        </p:spPr>
+        <p:style>
+          <a:lnRef idx="2">
+            <a:schemeClr val="accent1">
+              <a:shade val="50000"/>
+            </a:schemeClr>
+          </a:lnRef>
+          <a:fillRef idx="1">
+            <a:schemeClr val="accent1"/>
+          </a:fillRef>
+          <a:effectRef idx="0">
+            <a:schemeClr val="accent1"/>
+          </a:effectRef>
+          <a:fontRef idx="minor">
+            <a:schemeClr val="lt1"/>
+          </a:fontRef>
+        </p:style>
+        <p:txBody>
+          <a:bodyPr rtlCol="0" anchor="ctr"/>
+          <a:lstStyle/>
+          <a:p>
+            <a:pPr algn="ctr"/>
+            <a:endParaRPr kumimoji="1" lang="ko-Kore-KR" altLang="en-US" dirty="0"/>
+          </a:p>
+        </p:txBody>
+      </p:sp>
+      <p:sp>
+        <p:nvSpPr>
+          <p:cNvPr id="315" name="타원 314">
+            <a:extLst>
+              <a:ext uri="{FF2B5EF4-FFF2-40B4-BE49-F238E27FC236}">
+                <a16:creationId xmlns:a16="http://schemas.microsoft.com/office/drawing/2014/main" id="{FC24E273-5698-F21D-482B-6DDD7B2AC8A2}"/>
+              </a:ext>
+            </a:extLst>
+          </p:cNvPr>
+          <p:cNvSpPr/>
+          <p:nvPr/>
+        </p:nvSpPr>
+        <p:spPr>
+          <a:xfrm>
+            <a:off x="4607544" y="4826245"/>
+            <a:ext cx="2611613" cy="1836045"/>
+          </a:xfrm>
+          <a:prstGeom prst="ellipse">
+            <a:avLst/>
+          </a:prstGeom>
+          <a:noFill/>
+          <a:ln w="41275">
+            <a:solidFill>
+              <a:schemeClr val="accent2">
+                <a:alpha val="64000"/>
+              </a:schemeClr>
+            </a:solidFill>
+          </a:ln>
+        </p:spPr>
+        <p:style>
+          <a:lnRef idx="2">
+            <a:schemeClr val="accent1">
+              <a:shade val="50000"/>
+            </a:schemeClr>
+          </a:lnRef>
+          <a:fillRef idx="1">
+            <a:schemeClr val="accent1"/>
+          </a:fillRef>
+          <a:effectRef idx="0">
+            <a:schemeClr val="accent1"/>
+          </a:effectRef>
+          <a:fontRef idx="minor">
+            <a:schemeClr val="lt1"/>
+          </a:fontRef>
+        </p:style>
+        <p:txBody>
+          <a:bodyPr rtlCol="0" anchor="ctr"/>
+          <a:lstStyle/>
+          <a:p>
+            <a:pPr algn="ctr"/>
+            <a:endParaRPr kumimoji="1" lang="ko-Kore-KR" altLang="en-US" dirty="0"/>
+          </a:p>
+        </p:txBody>
+      </p:sp>
+      <p:cxnSp>
+        <p:nvCxnSpPr>
+          <p:cNvPr id="317" name="직선 화살표 연결선 316">
+            <a:extLst>
+              <a:ext uri="{FF2B5EF4-FFF2-40B4-BE49-F238E27FC236}">
+                <a16:creationId xmlns:a16="http://schemas.microsoft.com/office/drawing/2014/main" id="{620C5F69-13E5-4537-AA7D-3F47D08C611E}"/>
+              </a:ext>
+            </a:extLst>
+          </p:cNvPr>
+          <p:cNvCxnSpPr>
+            <a:cxnSpLocks/>
+            <a:stCxn id="303" idx="4"/>
+            <a:endCxn id="314" idx="7"/>
+          </p:cNvCxnSpPr>
+          <p:nvPr/>
+        </p:nvCxnSpPr>
+        <p:spPr>
+          <a:xfrm flipH="1">
+            <a:off x="3891488" y="4700244"/>
+            <a:ext cx="745555" cy="394884"/>
+          </a:xfrm>
+          <a:prstGeom prst="straightConnector1">
+            <a:avLst/>
+          </a:prstGeom>
+          <a:ln>
+            <a:tailEnd type="triangle"/>
+          </a:ln>
+        </p:spPr>
+        <p:style>
+          <a:lnRef idx="3">
+            <a:schemeClr val="accent2"/>
+          </a:lnRef>
+          <a:fillRef idx="0">
+            <a:schemeClr val="accent2"/>
+          </a:fillRef>
+          <a:effectRef idx="2">
+            <a:schemeClr val="accent2"/>
+          </a:effectRef>
+          <a:fontRef idx="minor">
+            <a:schemeClr val="tx1"/>
+          </a:fontRef>
+        </p:style>
+      </p:cxnSp>
+      <p:cxnSp>
+        <p:nvCxnSpPr>
+          <p:cNvPr id="319" name="직선 화살표 연결선 318">
+            <a:extLst>
+              <a:ext uri="{FF2B5EF4-FFF2-40B4-BE49-F238E27FC236}">
+                <a16:creationId xmlns:a16="http://schemas.microsoft.com/office/drawing/2014/main" id="{2DC1BFBB-660F-5FBE-C904-98BA829201FF}"/>
+              </a:ext>
+            </a:extLst>
+          </p:cNvPr>
+          <p:cNvCxnSpPr>
+            <a:cxnSpLocks/>
+            <a:stCxn id="303" idx="4"/>
+            <a:endCxn id="315" idx="1"/>
+          </p:cNvCxnSpPr>
+          <p:nvPr/>
+        </p:nvCxnSpPr>
+        <p:spPr>
+          <a:xfrm>
+            <a:off x="4637043" y="4700244"/>
+            <a:ext cx="352963" cy="394884"/>
+          </a:xfrm>
+          <a:prstGeom prst="straightConnector1">
+            <a:avLst/>
+          </a:prstGeom>
+          <a:ln>
+            <a:tailEnd type="triangle"/>
+          </a:ln>
+        </p:spPr>
+        <p:style>
+          <a:lnRef idx="3">
+            <a:schemeClr val="accent2"/>
+          </a:lnRef>
+          <a:fillRef idx="0">
+            <a:schemeClr val="accent2"/>
+          </a:fillRef>
+          <a:effectRef idx="2">
+            <a:schemeClr val="accent2"/>
           </a:effectRef>
           <a:fontRef idx="minor">
             <a:schemeClr val="tx1"/>
@@ -5082,6 +5606,471 @@
     <p:extLst>
       <p:ext uri="{BB962C8B-B14F-4D97-AF65-F5344CB8AC3E}">
         <p14:creationId xmlns:p14="http://schemas.microsoft.com/office/powerpoint/2010/main" val="3713779322"/>
+      </p:ext>
+    </p:extLst>
+  </p:cSld>
+  <p:clrMapOvr>
+    <a:masterClrMapping/>
+  </p:clrMapOvr>
+</p:sld>
+</file>
+
+<file path=ppt/slides/slide3.xml><?xml version="1.0" encoding="utf-8"?>
+<p:sld xmlns:a="http://schemas.openxmlformats.org/drawingml/2006/main" xmlns:r="http://schemas.openxmlformats.org/officeDocument/2006/relationships" xmlns:p="http://schemas.openxmlformats.org/presentationml/2006/main">
+  <p:cSld>
+    <p:spTree>
+      <p:nvGrpSpPr>
+        <p:cNvPr id="1" name=""/>
+        <p:cNvGrpSpPr/>
+        <p:nvPr/>
+      </p:nvGrpSpPr>
+      <p:grpSpPr>
+        <a:xfrm>
+          <a:off x="0" y="0"/>
+          <a:ext cx="0" cy="0"/>
+          <a:chOff x="0" y="0"/>
+          <a:chExt cx="0" cy="0"/>
+        </a:xfrm>
+      </p:grpSpPr>
+      <p:sp>
+        <p:nvSpPr>
+          <p:cNvPr id="257" name="직사각형 256">
+            <a:extLst>
+              <a:ext uri="{FF2B5EF4-FFF2-40B4-BE49-F238E27FC236}">
+                <a16:creationId xmlns:a16="http://schemas.microsoft.com/office/drawing/2014/main" id="{6D077D42-E2E1-C995-7E8A-371B9B684F66}"/>
+              </a:ext>
+            </a:extLst>
+          </p:cNvPr>
+          <p:cNvSpPr/>
+          <p:nvPr/>
+        </p:nvSpPr>
+        <p:spPr>
+          <a:xfrm>
+            <a:off x="2000924" y="2356945"/>
+            <a:ext cx="2186152" cy="1072055"/>
+          </a:xfrm>
+          <a:prstGeom prst="rect">
+            <a:avLst/>
+          </a:prstGeom>
+        </p:spPr>
+        <p:style>
+          <a:lnRef idx="2">
+            <a:schemeClr val="accent1">
+              <a:shade val="50000"/>
+            </a:schemeClr>
+          </a:lnRef>
+          <a:fillRef idx="1">
+            <a:schemeClr val="accent1"/>
+          </a:fillRef>
+          <a:effectRef idx="0">
+            <a:schemeClr val="accent1"/>
+          </a:effectRef>
+          <a:fontRef idx="minor">
+            <a:schemeClr val="lt1"/>
+          </a:fontRef>
+        </p:style>
+        <p:txBody>
+          <a:bodyPr rtlCol="0" anchor="ctr"/>
+          <a:lstStyle/>
+          <a:p>
+            <a:pPr algn="ctr"/>
+            <a:r>
+              <a:rPr kumimoji="1" lang="en-US" altLang="ko-Kore-KR" dirty="0" err="1"/>
+              <a:t>BoardDao</a:t>
+            </a:r>
+            <a:endParaRPr kumimoji="1" lang="en-US" altLang="ko-Kore-KR" dirty="0"/>
+          </a:p>
+          <a:p>
+            <a:pPr algn="ctr"/>
+            <a:r>
+              <a:rPr kumimoji="1" lang="en-US" altLang="ko-Kore-KR" dirty="0"/>
+              <a:t>class</a:t>
+            </a:r>
+            <a:endParaRPr kumimoji="1" lang="ko-Kore-KR" altLang="en-US" dirty="0"/>
+          </a:p>
+        </p:txBody>
+      </p:sp>
+      <p:cxnSp>
+        <p:nvCxnSpPr>
+          <p:cNvPr id="260" name="직선 화살표 연결선 259">
+            <a:extLst>
+              <a:ext uri="{FF2B5EF4-FFF2-40B4-BE49-F238E27FC236}">
+                <a16:creationId xmlns:a16="http://schemas.microsoft.com/office/drawing/2014/main" id="{44CDA04F-9E1D-E16E-53B5-3FF53A506A54}"/>
+              </a:ext>
+            </a:extLst>
+          </p:cNvPr>
+          <p:cNvCxnSpPr>
+            <a:cxnSpLocks/>
+            <a:stCxn id="257" idx="3"/>
+            <a:endCxn id="263" idx="1"/>
+          </p:cNvCxnSpPr>
+          <p:nvPr/>
+        </p:nvCxnSpPr>
+        <p:spPr>
+          <a:xfrm flipV="1">
+            <a:off x="4187076" y="2892972"/>
+            <a:ext cx="2585545" cy="1"/>
+          </a:xfrm>
+          <a:prstGeom prst="straightConnector1">
+            <a:avLst/>
+          </a:prstGeom>
+          <a:ln>
+            <a:tailEnd type="triangle"/>
+          </a:ln>
+        </p:spPr>
+        <p:style>
+          <a:lnRef idx="3">
+            <a:schemeClr val="accent1"/>
+          </a:lnRef>
+          <a:fillRef idx="0">
+            <a:schemeClr val="accent1"/>
+          </a:fillRef>
+          <a:effectRef idx="2">
+            <a:schemeClr val="accent1"/>
+          </a:effectRef>
+          <a:fontRef idx="minor">
+            <a:schemeClr val="tx1"/>
+          </a:fontRef>
+        </p:style>
+      </p:cxnSp>
+      <p:sp>
+        <p:nvSpPr>
+          <p:cNvPr id="263" name="직사각형 262">
+            <a:extLst>
+              <a:ext uri="{FF2B5EF4-FFF2-40B4-BE49-F238E27FC236}">
+                <a16:creationId xmlns:a16="http://schemas.microsoft.com/office/drawing/2014/main" id="{AD08EE50-6B41-7A91-5E6D-A190A24F3D85}"/>
+              </a:ext>
+            </a:extLst>
+          </p:cNvPr>
+          <p:cNvSpPr/>
+          <p:nvPr/>
+        </p:nvSpPr>
+        <p:spPr>
+          <a:xfrm>
+            <a:off x="6772621" y="2356944"/>
+            <a:ext cx="2186152" cy="1072055"/>
+          </a:xfrm>
+          <a:prstGeom prst="rect">
+            <a:avLst/>
+          </a:prstGeom>
+        </p:spPr>
+        <p:style>
+          <a:lnRef idx="2">
+            <a:schemeClr val="accent1">
+              <a:shade val="50000"/>
+            </a:schemeClr>
+          </a:lnRef>
+          <a:fillRef idx="1">
+            <a:schemeClr val="accent1"/>
+          </a:fillRef>
+          <a:effectRef idx="0">
+            <a:schemeClr val="accent1"/>
+          </a:effectRef>
+          <a:fontRef idx="minor">
+            <a:schemeClr val="lt1"/>
+          </a:fontRef>
+        </p:style>
+        <p:txBody>
+          <a:bodyPr rtlCol="0" anchor="ctr"/>
+          <a:lstStyle/>
+          <a:p>
+            <a:pPr algn="ctr"/>
+            <a:r>
+              <a:rPr kumimoji="1" lang="en-US" altLang="ko-Kore-KR" dirty="0"/>
+              <a:t>LinkedList</a:t>
+            </a:r>
+            <a:endParaRPr kumimoji="1" lang="ko-Kore-KR" altLang="en-US" dirty="0"/>
+          </a:p>
+        </p:txBody>
+      </p:sp>
+      <p:sp>
+        <p:nvSpPr>
+          <p:cNvPr id="5" name="직사각형 4">
+            <a:extLst>
+              <a:ext uri="{FF2B5EF4-FFF2-40B4-BE49-F238E27FC236}">
+                <a16:creationId xmlns:a16="http://schemas.microsoft.com/office/drawing/2014/main" id="{4B736A98-8EA5-6608-C066-34BE4384BA15}"/>
+              </a:ext>
+            </a:extLst>
+          </p:cNvPr>
+          <p:cNvSpPr/>
+          <p:nvPr/>
+        </p:nvSpPr>
+        <p:spPr>
+          <a:xfrm>
+            <a:off x="6337738" y="3965026"/>
+            <a:ext cx="3415862" cy="1072055"/>
+          </a:xfrm>
+          <a:prstGeom prst="rect">
+            <a:avLst/>
+          </a:prstGeom>
+        </p:spPr>
+        <p:style>
+          <a:lnRef idx="2">
+            <a:schemeClr val="accent2">
+              <a:shade val="50000"/>
+            </a:schemeClr>
+          </a:lnRef>
+          <a:fillRef idx="1">
+            <a:schemeClr val="accent2"/>
+          </a:fillRef>
+          <a:effectRef idx="0">
+            <a:schemeClr val="accent2"/>
+          </a:effectRef>
+          <a:fontRef idx="minor">
+            <a:schemeClr val="lt1"/>
+          </a:fontRef>
+        </p:style>
+        <p:txBody>
+          <a:bodyPr rtlCol="0" anchor="ctr"/>
+          <a:lstStyle/>
+          <a:p>
+            <a:pPr algn="ctr"/>
+            <a:r>
+              <a:rPr kumimoji="1" lang="en-US" altLang="ko-Kore-KR" dirty="0"/>
+              <a:t>LinkedList</a:t>
+            </a:r>
+            <a:r>
+              <a:rPr kumimoji="1" lang="ko-KR" altLang="en-US" dirty="0"/>
+              <a:t> </a:t>
+            </a:r>
+            <a:r>
+              <a:rPr kumimoji="1" lang="en-US" altLang="ko-KR" dirty="0"/>
+              <a:t>&lt;Board&gt;</a:t>
+            </a:r>
+            <a:endParaRPr kumimoji="1" lang="ko-Kore-KR" altLang="en-US" dirty="0"/>
+          </a:p>
+        </p:txBody>
+      </p:sp>
+      <p:cxnSp>
+        <p:nvCxnSpPr>
+          <p:cNvPr id="6" name="직선 화살표 연결선 5">
+            <a:extLst>
+              <a:ext uri="{FF2B5EF4-FFF2-40B4-BE49-F238E27FC236}">
+                <a16:creationId xmlns:a16="http://schemas.microsoft.com/office/drawing/2014/main" id="{AF16B19E-2FB8-92A5-2F0D-CE48CE4BF90C}"/>
+              </a:ext>
+            </a:extLst>
+          </p:cNvPr>
+          <p:cNvCxnSpPr>
+            <a:cxnSpLocks/>
+            <a:stCxn id="257" idx="3"/>
+            <a:endCxn id="5" idx="1"/>
+          </p:cNvCxnSpPr>
+          <p:nvPr/>
+        </p:nvCxnSpPr>
+        <p:spPr>
+          <a:xfrm>
+            <a:off x="4187076" y="2892973"/>
+            <a:ext cx="2150662" cy="1608081"/>
+          </a:xfrm>
+          <a:prstGeom prst="straightConnector1">
+            <a:avLst/>
+          </a:prstGeom>
+          <a:ln>
+            <a:solidFill>
+              <a:schemeClr val="accent2"/>
+            </a:solidFill>
+            <a:tailEnd type="triangle"/>
+          </a:ln>
+        </p:spPr>
+        <p:style>
+          <a:lnRef idx="3">
+            <a:schemeClr val="accent1"/>
+          </a:lnRef>
+          <a:fillRef idx="0">
+            <a:schemeClr val="accent1"/>
+          </a:fillRef>
+          <a:effectRef idx="2">
+            <a:schemeClr val="accent1"/>
+          </a:effectRef>
+          <a:fontRef idx="minor">
+            <a:schemeClr val="tx1"/>
+          </a:fontRef>
+        </p:style>
+      </p:cxnSp>
+      <p:sp>
+        <p:nvSpPr>
+          <p:cNvPr id="11" name="왼쪽으로 구부러진 화살표[C] 10">
+            <a:extLst>
+              <a:ext uri="{FF2B5EF4-FFF2-40B4-BE49-F238E27FC236}">
+                <a16:creationId xmlns:a16="http://schemas.microsoft.com/office/drawing/2014/main" id="{85302F02-B925-7E6E-D327-A5F855295EF7}"/>
+              </a:ext>
+            </a:extLst>
+          </p:cNvPr>
+          <p:cNvSpPr/>
+          <p:nvPr/>
+        </p:nvSpPr>
+        <p:spPr>
+          <a:xfrm rot="5400000">
+            <a:off x="7945820" y="4487917"/>
+            <a:ext cx="525517" cy="861849"/>
+          </a:xfrm>
+          <a:prstGeom prst="curvedLeftArrow">
+            <a:avLst>
+              <a:gd name="adj1" fmla="val 25000"/>
+              <a:gd name="adj2" fmla="val 47284"/>
+              <a:gd name="adj3" fmla="val 25000"/>
+            </a:avLst>
+          </a:prstGeom>
+        </p:spPr>
+        <p:style>
+          <a:lnRef idx="2">
+            <a:schemeClr val="accent4">
+              <a:shade val="50000"/>
+            </a:schemeClr>
+          </a:lnRef>
+          <a:fillRef idx="1">
+            <a:schemeClr val="accent4"/>
+          </a:fillRef>
+          <a:effectRef idx="0">
+            <a:schemeClr val="accent4"/>
+          </a:effectRef>
+          <a:fontRef idx="minor">
+            <a:schemeClr val="lt1"/>
+          </a:fontRef>
+        </p:style>
+        <p:txBody>
+          <a:bodyPr rtlCol="0" anchor="ctr"/>
+          <a:lstStyle/>
+          <a:p>
+            <a:pPr algn="ctr"/>
+            <a:endParaRPr kumimoji="1" lang="ko-Kore-KR" altLang="en-US">
+              <a:solidFill>
+                <a:schemeClr val="tx1"/>
+              </a:solidFill>
+            </a:endParaRPr>
+          </a:p>
+        </p:txBody>
+      </p:sp>
+      <p:sp>
+        <p:nvSpPr>
+          <p:cNvPr id="12" name="TextBox 11">
+            <a:extLst>
+              <a:ext uri="{FF2B5EF4-FFF2-40B4-BE49-F238E27FC236}">
+                <a16:creationId xmlns:a16="http://schemas.microsoft.com/office/drawing/2014/main" id="{F57E57DE-10C7-EE86-C799-0BDD82A476EE}"/>
+              </a:ext>
+            </a:extLst>
+          </p:cNvPr>
+          <p:cNvSpPr txBox="1"/>
+          <p:nvPr/>
+        </p:nvSpPr>
+        <p:spPr>
+          <a:xfrm>
+            <a:off x="6337738" y="5404972"/>
+            <a:ext cx="4046484" cy="646331"/>
+          </a:xfrm>
+          <a:prstGeom prst="rect">
+            <a:avLst/>
+          </a:prstGeom>
+        </p:spPr>
+        <p:style>
+          <a:lnRef idx="2">
+            <a:schemeClr val="accent4"/>
+          </a:lnRef>
+          <a:fillRef idx="1">
+            <a:schemeClr val="lt1"/>
+          </a:fillRef>
+          <a:effectRef idx="0">
+            <a:schemeClr val="accent4"/>
+          </a:effectRef>
+          <a:fontRef idx="minor">
+            <a:schemeClr val="dk1"/>
+          </a:fontRef>
+        </p:style>
+        <p:txBody>
+          <a:bodyPr wrap="square" rtlCol="0">
+            <a:spAutoFit/>
+          </a:bodyPr>
+          <a:lstStyle/>
+          <a:p>
+            <a:r>
+              <a:rPr kumimoji="1" lang="en-US" altLang="ko-Kore-KR" dirty="0"/>
+              <a:t>LinkedList </a:t>
+            </a:r>
+            <a:r>
+              <a:rPr kumimoji="1" lang="ko-Kore-KR" altLang="en-US" dirty="0"/>
+              <a:t>클래스가</a:t>
+            </a:r>
+            <a:r>
+              <a:rPr kumimoji="1" lang="ko-KR" altLang="en-US" dirty="0"/>
+              <a:t> 다뤄야할</a:t>
+            </a:r>
+            <a:endParaRPr kumimoji="1" lang="en-US" altLang="ko-KR" dirty="0"/>
+          </a:p>
+          <a:p>
+            <a:r>
+              <a:rPr kumimoji="1" lang="ko-KR" altLang="en-US" dirty="0"/>
+              <a:t>항목의 타입을 파라미터로 전달한다</a:t>
+            </a:r>
+            <a:r>
+              <a:rPr kumimoji="1" lang="en-US" altLang="ko-KR" dirty="0"/>
+              <a:t>.</a:t>
+            </a:r>
+            <a:endParaRPr kumimoji="1" lang="ko-Kore-KR" altLang="en-US" dirty="0"/>
+          </a:p>
+        </p:txBody>
+      </p:sp>
+      <p:sp>
+        <p:nvSpPr>
+          <p:cNvPr id="13" name="곱하기 12">
+            <a:extLst>
+              <a:ext uri="{FF2B5EF4-FFF2-40B4-BE49-F238E27FC236}">
+                <a16:creationId xmlns:a16="http://schemas.microsoft.com/office/drawing/2014/main" id="{F88D150E-0F31-115C-67EC-8D7AFB57935A}"/>
+              </a:ext>
+            </a:extLst>
+          </p:cNvPr>
+          <p:cNvSpPr/>
+          <p:nvPr/>
+        </p:nvSpPr>
+        <p:spPr>
+          <a:xfrm>
+            <a:off x="3258206" y="2062625"/>
+            <a:ext cx="9038896" cy="1534510"/>
+          </a:xfrm>
+          <a:prstGeom prst="mathMultiply">
+            <a:avLst/>
+          </a:prstGeom>
+          <a:solidFill>
+            <a:srgbClr val="FDA9F7">
+              <a:alpha val="68000"/>
+            </a:srgbClr>
+          </a:solidFill>
+          <a:ln>
+            <a:solidFill>
+              <a:schemeClr val="accent1">
+                <a:shade val="50000"/>
+              </a:schemeClr>
+            </a:solidFill>
+          </a:ln>
+        </p:spPr>
+        <p:style>
+          <a:lnRef idx="2">
+            <a:schemeClr val="accent1">
+              <a:shade val="50000"/>
+            </a:schemeClr>
+          </a:lnRef>
+          <a:fillRef idx="1">
+            <a:schemeClr val="accent1"/>
+          </a:fillRef>
+          <a:effectRef idx="0">
+            <a:schemeClr val="accent1"/>
+          </a:effectRef>
+          <a:fontRef idx="minor">
+            <a:schemeClr val="lt1"/>
+          </a:fontRef>
+        </p:style>
+        <p:txBody>
+          <a:bodyPr rtlCol="0" anchor="ctr"/>
+          <a:lstStyle/>
+          <a:p>
+            <a:pPr algn="ctr"/>
+            <a:endParaRPr kumimoji="1" lang="ko-Kore-KR" altLang="en-US" dirty="0"/>
+          </a:p>
+        </p:txBody>
+      </p:sp>
+    </p:spTree>
+    <p:extLst>
+      <p:ext uri="{BB962C8B-B14F-4D97-AF65-F5344CB8AC3E}">
+        <p14:creationId xmlns:p14="http://schemas.microsoft.com/office/powerpoint/2010/main" val="3523101145"/>
       </p:ext>
     </p:extLst>
   </p:cSld>

</xml_diff>